<commit_message>
a bunch of last minute changes for the presentation
</commit_message>
<xml_diff>
--- a/Visuals/Presentation.pptx
+++ b/Visuals/Presentation.pptx
@@ -5,13 +5,12 @@
     <p:sldMasterId id="2147483648" r:id="rId4"/>
   </p:sldMasterIdLst>
   <p:notesMasterIdLst>
-    <p:notesMasterId r:id="rId9"/>
+    <p:notesMasterId r:id="rId8"/>
   </p:notesMasterIdLst>
   <p:sldIdLst>
     <p:sldId id="257" r:id="rId5"/>
     <p:sldId id="258" r:id="rId6"/>
     <p:sldId id="275" r:id="rId7"/>
-    <p:sldId id="265" r:id="rId8"/>
   </p:sldIdLst>
   <p:sldSz cx="12192000" cy="6858000"/>
   <p:notesSz cx="6858000" cy="9144000"/>
@@ -200,7 +199,7 @@
           <a:p>
             <a:fld id="{B565716D-39C9-48C4-A3EB-B88E4515427D}" type="datetimeFigureOut">
               <a:rPr lang="en-US" smtClean="0"/>
-              <a:t>6/26/2019</a:t>
+              <a:t>6/27/19</a:t>
             </a:fld>
             <a:endParaRPr lang="en-US" dirty="0"/>
           </a:p>
@@ -467,102 +466,6 @@
 </p:notesMaster>
 </file>
 
-<file path=ppt/notesSlides/notesSlide1.xml><?xml version="1.0" encoding="utf-8"?>
-<p:notes xmlns:a="http://schemas.openxmlformats.org/drawingml/2006/main" xmlns:r="http://schemas.openxmlformats.org/officeDocument/2006/relationships" xmlns:p="http://schemas.openxmlformats.org/presentationml/2006/main">
-  <p:cSld>
-    <p:spTree>
-      <p:nvGrpSpPr>
-        <p:cNvPr id="1" name=""/>
-        <p:cNvGrpSpPr/>
-        <p:nvPr/>
-      </p:nvGrpSpPr>
-      <p:grpSpPr>
-        <a:xfrm>
-          <a:off x="0" y="0"/>
-          <a:ext cx="0" cy="0"/>
-          <a:chOff x="0" y="0"/>
-          <a:chExt cx="0" cy="0"/>
-        </a:xfrm>
-      </p:grpSpPr>
-      <p:sp>
-        <p:nvSpPr>
-          <p:cNvPr id="2" name="Slide Image Placeholder 1"/>
-          <p:cNvSpPr>
-            <a:spLocks noGrp="1" noRot="1" noChangeAspect="1"/>
-          </p:cNvSpPr>
-          <p:nvPr>
-            <p:ph type="sldImg"/>
-          </p:nvPr>
-        </p:nvSpPr>
-        <p:spPr/>
-      </p:sp>
-      <p:sp>
-        <p:nvSpPr>
-          <p:cNvPr id="3" name="Notes Placeholder 2"/>
-          <p:cNvSpPr>
-            <a:spLocks noGrp="1"/>
-          </p:cNvSpPr>
-          <p:nvPr>
-            <p:ph type="body" idx="1"/>
-          </p:nvPr>
-        </p:nvSpPr>
-        <p:spPr/>
-        <p:txBody>
-          <a:bodyPr/>
-          <a:lstStyle/>
-          <a:p>
-            <a:r>
-              <a:rPr lang="en-US" dirty="0" smtClean="0"/>
-              <a:t>Notes</a:t>
-            </a:r>
-            <a:r>
-              <a:rPr lang="en-US" baseline="0" dirty="0" smtClean="0"/>
-              <a:t> </a:t>
-            </a:r>
-            <a:r>
-              <a:rPr lang="en-US" baseline="0" smtClean="0"/>
-              <a:t>notes</a:t>
-            </a:r>
-            <a:endParaRPr lang="en-US"/>
-          </a:p>
-        </p:txBody>
-      </p:sp>
-      <p:sp>
-        <p:nvSpPr>
-          <p:cNvPr id="4" name="Slide Number Placeholder 3"/>
-          <p:cNvSpPr>
-            <a:spLocks noGrp="1"/>
-          </p:cNvSpPr>
-          <p:nvPr>
-            <p:ph type="sldNum" sz="quarter" idx="10"/>
-          </p:nvPr>
-        </p:nvSpPr>
-        <p:spPr/>
-        <p:txBody>
-          <a:bodyPr/>
-          <a:lstStyle/>
-          <a:p>
-            <a:fld id="{060C6D3C-9EB0-4F2C-9026-3887D1CDB44E}" type="slidenum">
-              <a:rPr lang="en-US" smtClean="0"/>
-              <a:t>4</a:t>
-            </a:fld>
-            <a:endParaRPr lang="en-US" dirty="0"/>
-          </a:p>
-        </p:txBody>
-      </p:sp>
-    </p:spTree>
-    <p:extLst>
-      <p:ext uri="{BB962C8B-B14F-4D97-AF65-F5344CB8AC3E}">
-        <p14:creationId xmlns:p14="http://schemas.microsoft.com/office/powerpoint/2010/main" val="302234507"/>
-      </p:ext>
-    </p:extLst>
-  </p:cSld>
-  <p:clrMapOvr>
-    <a:masterClrMapping/>
-  </p:clrMapOvr>
-</p:notes>
-</file>
-
 <file path=ppt/slideLayouts/slideLayout1.xml><?xml version="1.0" encoding="utf-8"?>
 <p:sldLayout xmlns:a="http://schemas.openxmlformats.org/drawingml/2006/main" xmlns:r="http://schemas.openxmlformats.org/officeDocument/2006/relationships" xmlns:p="http://schemas.openxmlformats.org/presentationml/2006/main" preserve="1" userDrawn="1">
   <p:cSld name="1_Title Slide">
@@ -585,7 +488,7 @@
           <p:cNvPr id="5" name="Picture Placeholder 4">
             <a:extLst>
               <a:ext uri="{FF2B5EF4-FFF2-40B4-BE49-F238E27FC236}">
-                <a16:creationId xmlns="" xmlns:a16="http://schemas.microsoft.com/office/drawing/2014/main" id="{48D39141-3E8E-4545-90DB-291A0E5F139B}"/>
+                <a16:creationId xmlns:a16="http://schemas.microsoft.com/office/drawing/2014/main" id="{48D39141-3E8E-4545-90DB-291A0E5F139B}"/>
               </a:ext>
             </a:extLst>
           </p:cNvPr>
@@ -645,7 +548,7 @@
           <p:cNvPr id="2" name="Title 1">
             <a:extLst>
               <a:ext uri="{FF2B5EF4-FFF2-40B4-BE49-F238E27FC236}">
-                <a16:creationId xmlns="" xmlns:a16="http://schemas.microsoft.com/office/drawing/2014/main" id="{AD90A062-54B3-47F2-9D6A-5BC9575208D2}"/>
+                <a16:creationId xmlns:a16="http://schemas.microsoft.com/office/drawing/2014/main" id="{AD90A062-54B3-47F2-9D6A-5BC9575208D2}"/>
               </a:ext>
             </a:extLst>
           </p:cNvPr>
@@ -692,7 +595,7 @@
           <p:cNvPr id="3" name="Subtitle 2">
             <a:extLst>
               <a:ext uri="{FF2B5EF4-FFF2-40B4-BE49-F238E27FC236}">
-                <a16:creationId xmlns="" xmlns:a16="http://schemas.microsoft.com/office/drawing/2014/main" id="{35C97F3D-57FA-4E82-9EEC-E93088055A15}"/>
+                <a16:creationId xmlns:a16="http://schemas.microsoft.com/office/drawing/2014/main" id="{35C97F3D-57FA-4E82-9EEC-E93088055A15}"/>
               </a:ext>
             </a:extLst>
           </p:cNvPr>
@@ -778,7 +681,7 @@
           <p:cNvPr id="7" name="Footer Placeholder 6">
             <a:extLst>
               <a:ext uri="{FF2B5EF4-FFF2-40B4-BE49-F238E27FC236}">
-                <a16:creationId xmlns="" xmlns:a16="http://schemas.microsoft.com/office/drawing/2014/main" id="{E31775C8-C7F0-4EC5-A9C0-53AE3A0C5F7B}"/>
+                <a16:creationId xmlns:a16="http://schemas.microsoft.com/office/drawing/2014/main" id="{E31775C8-C7F0-4EC5-A9C0-53AE3A0C5F7B}"/>
               </a:ext>
             </a:extLst>
           </p:cNvPr>
@@ -808,7 +711,7 @@
           <p:cNvPr id="8" name="Slide Number Placeholder 7">
             <a:extLst>
               <a:ext uri="{FF2B5EF4-FFF2-40B4-BE49-F238E27FC236}">
-                <a16:creationId xmlns="" xmlns:a16="http://schemas.microsoft.com/office/drawing/2014/main" id="{9E8B0AE2-DA19-49E2-AC81-5272385D304C}"/>
+                <a16:creationId xmlns:a16="http://schemas.microsoft.com/office/drawing/2014/main" id="{9E8B0AE2-DA19-49E2-AC81-5272385D304C}"/>
               </a:ext>
             </a:extLst>
           </p:cNvPr>
@@ -868,7 +771,7 @@
           <p:cNvPr id="20" name="Text Placeholder 3">
             <a:extLst>
               <a:ext uri="{FF2B5EF4-FFF2-40B4-BE49-F238E27FC236}">
-                <a16:creationId xmlns="" xmlns:a16="http://schemas.microsoft.com/office/drawing/2014/main" id="{6A395197-9758-40F0-B747-F8B134C175EB}"/>
+                <a16:creationId xmlns:a16="http://schemas.microsoft.com/office/drawing/2014/main" id="{6A395197-9758-40F0-B747-F8B134C175EB}"/>
               </a:ext>
             </a:extLst>
           </p:cNvPr>
@@ -1107,7 +1010,7 @@
           <p:cNvPr id="19" name="Freeform: Shape 18">
             <a:extLst>
               <a:ext uri="{FF2B5EF4-FFF2-40B4-BE49-F238E27FC236}">
-                <a16:creationId xmlns="" xmlns:a16="http://schemas.microsoft.com/office/drawing/2014/main" id="{78907576-77BD-4FD0-A9FE-48D249CB435B}"/>
+                <a16:creationId xmlns:a16="http://schemas.microsoft.com/office/drawing/2014/main" id="{78907576-77BD-4FD0-A9FE-48D249CB435B}"/>
               </a:ext>
             </a:extLst>
           </p:cNvPr>
@@ -1266,7 +1169,7 @@
           <p:cNvPr id="7" name="Footer Placeholder 6">
             <a:extLst>
               <a:ext uri="{FF2B5EF4-FFF2-40B4-BE49-F238E27FC236}">
-                <a16:creationId xmlns="" xmlns:a16="http://schemas.microsoft.com/office/drawing/2014/main" id="{A557D1A2-E2DD-4CD8-B7DB-2864D4A97E02}"/>
+                <a16:creationId xmlns:a16="http://schemas.microsoft.com/office/drawing/2014/main" id="{A557D1A2-E2DD-4CD8-B7DB-2864D4A97E02}"/>
               </a:ext>
             </a:extLst>
           </p:cNvPr>
@@ -1291,7 +1194,7 @@
           <p:cNvPr id="8" name="Slide Number Placeholder 7">
             <a:extLst>
               <a:ext uri="{FF2B5EF4-FFF2-40B4-BE49-F238E27FC236}">
-                <a16:creationId xmlns="" xmlns:a16="http://schemas.microsoft.com/office/drawing/2014/main" id="{86B08B7A-4219-4973-8C9B-BF5BCC64480F}"/>
+                <a16:creationId xmlns:a16="http://schemas.microsoft.com/office/drawing/2014/main" id="{86B08B7A-4219-4973-8C9B-BF5BCC64480F}"/>
               </a:ext>
             </a:extLst>
           </p:cNvPr>
@@ -1321,7 +1224,7 @@
           <p:cNvPr id="5" name="Text Placeholder 4">
             <a:extLst>
               <a:ext uri="{FF2B5EF4-FFF2-40B4-BE49-F238E27FC236}">
-                <a16:creationId xmlns="" xmlns:a16="http://schemas.microsoft.com/office/drawing/2014/main" id="{C430C70C-09F9-40EE-9A89-ED9A5DCFD98D}"/>
+                <a16:creationId xmlns:a16="http://schemas.microsoft.com/office/drawing/2014/main" id="{C430C70C-09F9-40EE-9A89-ED9A5DCFD98D}"/>
               </a:ext>
             </a:extLst>
           </p:cNvPr>
@@ -1400,7 +1303,7 @@
           <p:cNvPr id="13" name="Text Placeholder 12">
             <a:extLst>
               <a:ext uri="{FF2B5EF4-FFF2-40B4-BE49-F238E27FC236}">
-                <a16:creationId xmlns="" xmlns:a16="http://schemas.microsoft.com/office/drawing/2014/main" id="{278D9ACA-AB64-4D04-A5E0-23AC8B81EC2C}"/>
+                <a16:creationId xmlns:a16="http://schemas.microsoft.com/office/drawing/2014/main" id="{278D9ACA-AB64-4D04-A5E0-23AC8B81EC2C}"/>
               </a:ext>
             </a:extLst>
           </p:cNvPr>
@@ -1479,7 +1382,7 @@
           <p:cNvPr id="15" name="Text Placeholder 4">
             <a:extLst>
               <a:ext uri="{FF2B5EF4-FFF2-40B4-BE49-F238E27FC236}">
-                <a16:creationId xmlns="" xmlns:a16="http://schemas.microsoft.com/office/drawing/2014/main" id="{F3B4EB62-0A18-46F9-98F0-E8FC5EBAF37E}"/>
+                <a16:creationId xmlns:a16="http://schemas.microsoft.com/office/drawing/2014/main" id="{F3B4EB62-0A18-46F9-98F0-E8FC5EBAF37E}"/>
               </a:ext>
             </a:extLst>
           </p:cNvPr>
@@ -1558,7 +1461,7 @@
           <p:cNvPr id="16" name="Text Placeholder 12">
             <a:extLst>
               <a:ext uri="{FF2B5EF4-FFF2-40B4-BE49-F238E27FC236}">
-                <a16:creationId xmlns="" xmlns:a16="http://schemas.microsoft.com/office/drawing/2014/main" id="{A3B2D4DF-9952-49C7-B850-559AD0DF27D5}"/>
+                <a16:creationId xmlns:a16="http://schemas.microsoft.com/office/drawing/2014/main" id="{A3B2D4DF-9952-49C7-B850-559AD0DF27D5}"/>
               </a:ext>
             </a:extLst>
           </p:cNvPr>
@@ -1637,7 +1540,7 @@
           <p:cNvPr id="17" name="Text Placeholder 4">
             <a:extLst>
               <a:ext uri="{FF2B5EF4-FFF2-40B4-BE49-F238E27FC236}">
-                <a16:creationId xmlns="" xmlns:a16="http://schemas.microsoft.com/office/drawing/2014/main" id="{BCE373B8-7ADE-4DC4-9900-59147BFA16E7}"/>
+                <a16:creationId xmlns:a16="http://schemas.microsoft.com/office/drawing/2014/main" id="{BCE373B8-7ADE-4DC4-9900-59147BFA16E7}"/>
               </a:ext>
             </a:extLst>
           </p:cNvPr>
@@ -1716,7 +1619,7 @@
           <p:cNvPr id="18" name="Text Placeholder 12">
             <a:extLst>
               <a:ext uri="{FF2B5EF4-FFF2-40B4-BE49-F238E27FC236}">
-                <a16:creationId xmlns="" xmlns:a16="http://schemas.microsoft.com/office/drawing/2014/main" id="{28F027FF-E9AF-4E49-AC44-48D21AD761AA}"/>
+                <a16:creationId xmlns:a16="http://schemas.microsoft.com/office/drawing/2014/main" id="{28F027FF-E9AF-4E49-AC44-48D21AD761AA}"/>
               </a:ext>
             </a:extLst>
           </p:cNvPr>
@@ -1795,7 +1698,7 @@
           <p:cNvPr id="29" name="Picture Placeholder 25">
             <a:extLst>
               <a:ext uri="{FF2B5EF4-FFF2-40B4-BE49-F238E27FC236}">
-                <a16:creationId xmlns="" xmlns:a16="http://schemas.microsoft.com/office/drawing/2014/main" id="{8989EC4C-4E3F-457F-8CF6-8A88DE68A930}"/>
+                <a16:creationId xmlns:a16="http://schemas.microsoft.com/office/drawing/2014/main" id="{8989EC4C-4E3F-457F-8CF6-8A88DE68A930}"/>
               </a:ext>
             </a:extLst>
           </p:cNvPr>
@@ -1837,7 +1740,7 @@
           <p:cNvPr id="30" name="Picture Placeholder 25">
             <a:extLst>
               <a:ext uri="{FF2B5EF4-FFF2-40B4-BE49-F238E27FC236}">
-                <a16:creationId xmlns="" xmlns:a16="http://schemas.microsoft.com/office/drawing/2014/main" id="{67FB2730-3D12-4D72-AE64-AC3955C5CD99}"/>
+                <a16:creationId xmlns:a16="http://schemas.microsoft.com/office/drawing/2014/main" id="{67FB2730-3D12-4D72-AE64-AC3955C5CD99}"/>
               </a:ext>
             </a:extLst>
           </p:cNvPr>
@@ -1879,7 +1782,7 @@
           <p:cNvPr id="31" name="Picture Placeholder 25">
             <a:extLst>
               <a:ext uri="{FF2B5EF4-FFF2-40B4-BE49-F238E27FC236}">
-                <a16:creationId xmlns="" xmlns:a16="http://schemas.microsoft.com/office/drawing/2014/main" id="{4F2BB90C-4866-4DB3-B05C-0BB7DBFF8EA3}"/>
+                <a16:creationId xmlns:a16="http://schemas.microsoft.com/office/drawing/2014/main" id="{4F2BB90C-4866-4DB3-B05C-0BB7DBFF8EA3}"/>
               </a:ext>
             </a:extLst>
           </p:cNvPr>
@@ -1921,7 +1824,7 @@
           <p:cNvPr id="22" name="Text Placeholder 4">
             <a:extLst>
               <a:ext uri="{FF2B5EF4-FFF2-40B4-BE49-F238E27FC236}">
-                <a16:creationId xmlns="" xmlns:a16="http://schemas.microsoft.com/office/drawing/2014/main" id="{FE407FE5-15DF-40F7-B14C-0A04CC30CD66}"/>
+                <a16:creationId xmlns:a16="http://schemas.microsoft.com/office/drawing/2014/main" id="{FE407FE5-15DF-40F7-B14C-0A04CC30CD66}"/>
               </a:ext>
             </a:extLst>
           </p:cNvPr>
@@ -2000,7 +1903,7 @@
           <p:cNvPr id="23" name="Text Placeholder 12">
             <a:extLst>
               <a:ext uri="{FF2B5EF4-FFF2-40B4-BE49-F238E27FC236}">
-                <a16:creationId xmlns="" xmlns:a16="http://schemas.microsoft.com/office/drawing/2014/main" id="{7DD73F77-2E6A-450D-B4AF-8643D8AE1ECE}"/>
+                <a16:creationId xmlns:a16="http://schemas.microsoft.com/office/drawing/2014/main" id="{7DD73F77-2E6A-450D-B4AF-8643D8AE1ECE}"/>
               </a:ext>
             </a:extLst>
           </p:cNvPr>
@@ -2079,7 +1982,7 @@
           <p:cNvPr id="24" name="Text Placeholder 4">
             <a:extLst>
               <a:ext uri="{FF2B5EF4-FFF2-40B4-BE49-F238E27FC236}">
-                <a16:creationId xmlns="" xmlns:a16="http://schemas.microsoft.com/office/drawing/2014/main" id="{7F1CAED2-2A78-4780-A303-060C24C56526}"/>
+                <a16:creationId xmlns:a16="http://schemas.microsoft.com/office/drawing/2014/main" id="{7F1CAED2-2A78-4780-A303-060C24C56526}"/>
               </a:ext>
             </a:extLst>
           </p:cNvPr>
@@ -2158,7 +2061,7 @@
           <p:cNvPr id="27" name="Text Placeholder 12">
             <a:extLst>
               <a:ext uri="{FF2B5EF4-FFF2-40B4-BE49-F238E27FC236}">
-                <a16:creationId xmlns="" xmlns:a16="http://schemas.microsoft.com/office/drawing/2014/main" id="{4E77CA0B-49F8-4EE9-84A7-AB28FD1CC1ED}"/>
+                <a16:creationId xmlns:a16="http://schemas.microsoft.com/office/drawing/2014/main" id="{4E77CA0B-49F8-4EE9-84A7-AB28FD1CC1ED}"/>
               </a:ext>
             </a:extLst>
           </p:cNvPr>
@@ -2237,7 +2140,7 @@
           <p:cNvPr id="28" name="Text Placeholder 4">
             <a:extLst>
               <a:ext uri="{FF2B5EF4-FFF2-40B4-BE49-F238E27FC236}">
-                <a16:creationId xmlns="" xmlns:a16="http://schemas.microsoft.com/office/drawing/2014/main" id="{5D4F2294-CE3A-4705-BCB3-C5DAFA373C25}"/>
+                <a16:creationId xmlns:a16="http://schemas.microsoft.com/office/drawing/2014/main" id="{5D4F2294-CE3A-4705-BCB3-C5DAFA373C25}"/>
               </a:ext>
             </a:extLst>
           </p:cNvPr>
@@ -2316,7 +2219,7 @@
           <p:cNvPr id="32" name="Text Placeholder 12">
             <a:extLst>
               <a:ext uri="{FF2B5EF4-FFF2-40B4-BE49-F238E27FC236}">
-                <a16:creationId xmlns="" xmlns:a16="http://schemas.microsoft.com/office/drawing/2014/main" id="{7B49F9AF-7698-444D-8D12-FA0B6A713E03}"/>
+                <a16:creationId xmlns:a16="http://schemas.microsoft.com/office/drawing/2014/main" id="{7B49F9AF-7698-444D-8D12-FA0B6A713E03}"/>
               </a:ext>
             </a:extLst>
           </p:cNvPr>
@@ -2395,7 +2298,7 @@
           <p:cNvPr id="33" name="Picture Placeholder 25">
             <a:extLst>
               <a:ext uri="{FF2B5EF4-FFF2-40B4-BE49-F238E27FC236}">
-                <a16:creationId xmlns="" xmlns:a16="http://schemas.microsoft.com/office/drawing/2014/main" id="{6057C2E9-1501-4819-B77D-23A0268DB0F1}"/>
+                <a16:creationId xmlns:a16="http://schemas.microsoft.com/office/drawing/2014/main" id="{6057C2E9-1501-4819-B77D-23A0268DB0F1}"/>
               </a:ext>
             </a:extLst>
           </p:cNvPr>
@@ -2437,7 +2340,7 @@
           <p:cNvPr id="34" name="Picture Placeholder 25">
             <a:extLst>
               <a:ext uri="{FF2B5EF4-FFF2-40B4-BE49-F238E27FC236}">
-                <a16:creationId xmlns="" xmlns:a16="http://schemas.microsoft.com/office/drawing/2014/main" id="{C77B8544-1CEE-4ED4-89E8-ED042673804D}"/>
+                <a16:creationId xmlns:a16="http://schemas.microsoft.com/office/drawing/2014/main" id="{C77B8544-1CEE-4ED4-89E8-ED042673804D}"/>
               </a:ext>
             </a:extLst>
           </p:cNvPr>
@@ -2479,7 +2382,7 @@
           <p:cNvPr id="35" name="Picture Placeholder 25">
             <a:extLst>
               <a:ext uri="{FF2B5EF4-FFF2-40B4-BE49-F238E27FC236}">
-                <a16:creationId xmlns="" xmlns:a16="http://schemas.microsoft.com/office/drawing/2014/main" id="{E1131D92-0382-469E-A358-A2EC5FDCCF32}"/>
+                <a16:creationId xmlns:a16="http://schemas.microsoft.com/office/drawing/2014/main" id="{E1131D92-0382-469E-A358-A2EC5FDCCF32}"/>
               </a:ext>
             </a:extLst>
           </p:cNvPr>
@@ -2521,7 +2424,7 @@
           <p:cNvPr id="3" name="Title 2">
             <a:extLst>
               <a:ext uri="{FF2B5EF4-FFF2-40B4-BE49-F238E27FC236}">
-                <a16:creationId xmlns="" xmlns:a16="http://schemas.microsoft.com/office/drawing/2014/main" id="{7C0EBF36-B9CA-4962-B198-27B56B54E58C}"/>
+                <a16:creationId xmlns:a16="http://schemas.microsoft.com/office/drawing/2014/main" id="{7C0EBF36-B9CA-4962-B198-27B56B54E58C}"/>
               </a:ext>
             </a:extLst>
           </p:cNvPr>
@@ -2587,7 +2490,7 @@
           <p:cNvPr id="6" name="Rectangle 5">
             <a:extLst>
               <a:ext uri="{FF2B5EF4-FFF2-40B4-BE49-F238E27FC236}">
-                <a16:creationId xmlns="" xmlns:a16="http://schemas.microsoft.com/office/drawing/2014/main" id="{474D42A7-FF15-4C9E-9657-33DD5BC539DA}"/>
+                <a16:creationId xmlns:a16="http://schemas.microsoft.com/office/drawing/2014/main" id="{474D42A7-FF15-4C9E-9657-33DD5BC539DA}"/>
               </a:ext>
             </a:extLst>
           </p:cNvPr>
@@ -2641,7 +2544,7 @@
           <p:cNvPr id="9" name="Text Placeholder 3">
             <a:extLst>
               <a:ext uri="{FF2B5EF4-FFF2-40B4-BE49-F238E27FC236}">
-                <a16:creationId xmlns="" xmlns:a16="http://schemas.microsoft.com/office/drawing/2014/main" id="{4FA555C0-B108-4047-8AFF-82E05F073446}"/>
+                <a16:creationId xmlns:a16="http://schemas.microsoft.com/office/drawing/2014/main" id="{4FA555C0-B108-4047-8AFF-82E05F073446}"/>
               </a:ext>
             </a:extLst>
           </p:cNvPr>
@@ -2685,7 +2588,7 @@
           <p:cNvPr id="2" name="Title 1">
             <a:extLst>
               <a:ext uri="{FF2B5EF4-FFF2-40B4-BE49-F238E27FC236}">
-                <a16:creationId xmlns="" xmlns:a16="http://schemas.microsoft.com/office/drawing/2014/main" id="{DF797B74-E645-46F4-8F77-49AF7F0D443F}"/>
+                <a16:creationId xmlns:a16="http://schemas.microsoft.com/office/drawing/2014/main" id="{DF797B74-E645-46F4-8F77-49AF7F0D443F}"/>
               </a:ext>
             </a:extLst>
           </p:cNvPr>
@@ -2713,7 +2616,7 @@
           <p:cNvPr id="3" name="Content Placeholder 2">
             <a:extLst>
               <a:ext uri="{FF2B5EF4-FFF2-40B4-BE49-F238E27FC236}">
-                <a16:creationId xmlns="" xmlns:a16="http://schemas.microsoft.com/office/drawing/2014/main" id="{2E5EAA7C-AE70-48A8-B582-013424EB9C44}"/>
+                <a16:creationId xmlns:a16="http://schemas.microsoft.com/office/drawing/2014/main" id="{2E5EAA7C-AE70-48A8-B582-013424EB9C44}"/>
               </a:ext>
             </a:extLst>
           </p:cNvPr>
@@ -2752,7 +2655,7 @@
           <p:cNvPr id="7" name="Footer Placeholder 6">
             <a:extLst>
               <a:ext uri="{FF2B5EF4-FFF2-40B4-BE49-F238E27FC236}">
-                <a16:creationId xmlns="" xmlns:a16="http://schemas.microsoft.com/office/drawing/2014/main" id="{A557D1A2-E2DD-4CD8-B7DB-2864D4A97E02}"/>
+                <a16:creationId xmlns:a16="http://schemas.microsoft.com/office/drawing/2014/main" id="{A557D1A2-E2DD-4CD8-B7DB-2864D4A97E02}"/>
               </a:ext>
             </a:extLst>
           </p:cNvPr>
@@ -2777,7 +2680,7 @@
           <p:cNvPr id="8" name="Slide Number Placeholder 7">
             <a:extLst>
               <a:ext uri="{FF2B5EF4-FFF2-40B4-BE49-F238E27FC236}">
-                <a16:creationId xmlns="" xmlns:a16="http://schemas.microsoft.com/office/drawing/2014/main" id="{86B08B7A-4219-4973-8C9B-BF5BCC64480F}"/>
+                <a16:creationId xmlns:a16="http://schemas.microsoft.com/office/drawing/2014/main" id="{86B08B7A-4219-4973-8C9B-BF5BCC64480F}"/>
               </a:ext>
             </a:extLst>
           </p:cNvPr>
@@ -2807,7 +2710,7 @@
           <p:cNvPr id="11" name="Picture Placeholder 10">
             <a:extLst>
               <a:ext uri="{FF2B5EF4-FFF2-40B4-BE49-F238E27FC236}">
-                <a16:creationId xmlns="" xmlns:a16="http://schemas.microsoft.com/office/drawing/2014/main" id="{A98EA298-DD21-4B69-8125-094245EDF713}"/>
+                <a16:creationId xmlns:a16="http://schemas.microsoft.com/office/drawing/2014/main" id="{A98EA298-DD21-4B69-8125-094245EDF713}"/>
               </a:ext>
             </a:extLst>
           </p:cNvPr>
@@ -2852,7 +2755,7 @@
           <p:cNvPr id="12" name="Picture Placeholder 10">
             <a:extLst>
               <a:ext uri="{FF2B5EF4-FFF2-40B4-BE49-F238E27FC236}">
-                <a16:creationId xmlns="" xmlns:a16="http://schemas.microsoft.com/office/drawing/2014/main" id="{4C93EFCC-1E62-4200-9E96-2476EE2581BF}"/>
+                <a16:creationId xmlns:a16="http://schemas.microsoft.com/office/drawing/2014/main" id="{4C93EFCC-1E62-4200-9E96-2476EE2581BF}"/>
               </a:ext>
             </a:extLst>
           </p:cNvPr>
@@ -2897,7 +2800,7 @@
           <p:cNvPr id="13" name="Picture Placeholder 10">
             <a:extLst>
               <a:ext uri="{FF2B5EF4-FFF2-40B4-BE49-F238E27FC236}">
-                <a16:creationId xmlns="" xmlns:a16="http://schemas.microsoft.com/office/drawing/2014/main" id="{8741D874-BD81-4469-AA1C-32517FD7C37B}"/>
+                <a16:creationId xmlns:a16="http://schemas.microsoft.com/office/drawing/2014/main" id="{8741D874-BD81-4469-AA1C-32517FD7C37B}"/>
               </a:ext>
             </a:extLst>
           </p:cNvPr>
@@ -2942,7 +2845,7 @@
           <p:cNvPr id="14" name="Content Placeholder 2">
             <a:extLst>
               <a:ext uri="{FF2B5EF4-FFF2-40B4-BE49-F238E27FC236}">
-                <a16:creationId xmlns="" xmlns:a16="http://schemas.microsoft.com/office/drawing/2014/main" id="{CFB0B599-DDEF-43E9-A07F-FC328C595BCE}"/>
+                <a16:creationId xmlns:a16="http://schemas.microsoft.com/office/drawing/2014/main" id="{CFB0B599-DDEF-43E9-A07F-FC328C595BCE}"/>
               </a:ext>
             </a:extLst>
           </p:cNvPr>
@@ -2981,7 +2884,7 @@
           <p:cNvPr id="15" name="Content Placeholder 2">
             <a:extLst>
               <a:ext uri="{FF2B5EF4-FFF2-40B4-BE49-F238E27FC236}">
-                <a16:creationId xmlns="" xmlns:a16="http://schemas.microsoft.com/office/drawing/2014/main" id="{63FF0857-6431-48DC-BE82-9A93C55CEFB4}"/>
+                <a16:creationId xmlns:a16="http://schemas.microsoft.com/office/drawing/2014/main" id="{63FF0857-6431-48DC-BE82-9A93C55CEFB4}"/>
               </a:ext>
             </a:extLst>
           </p:cNvPr>
@@ -3058,7 +2961,7 @@
           <p:cNvPr id="6" name="Rectangle 5">
             <a:extLst>
               <a:ext uri="{FF2B5EF4-FFF2-40B4-BE49-F238E27FC236}">
-                <a16:creationId xmlns="" xmlns:a16="http://schemas.microsoft.com/office/drawing/2014/main" id="{474D42A7-FF15-4C9E-9657-33DD5BC539DA}"/>
+                <a16:creationId xmlns:a16="http://schemas.microsoft.com/office/drawing/2014/main" id="{474D42A7-FF15-4C9E-9657-33DD5BC539DA}"/>
               </a:ext>
             </a:extLst>
           </p:cNvPr>
@@ -3116,7 +3019,7 @@
           <p:cNvPr id="9" name="Text Placeholder 3">
             <a:extLst>
               <a:ext uri="{FF2B5EF4-FFF2-40B4-BE49-F238E27FC236}">
-                <a16:creationId xmlns="" xmlns:a16="http://schemas.microsoft.com/office/drawing/2014/main" id="{4FA555C0-B108-4047-8AFF-82E05F073446}"/>
+                <a16:creationId xmlns:a16="http://schemas.microsoft.com/office/drawing/2014/main" id="{4FA555C0-B108-4047-8AFF-82E05F073446}"/>
               </a:ext>
             </a:extLst>
           </p:cNvPr>
@@ -3160,7 +3063,7 @@
           <p:cNvPr id="2" name="Title 1">
             <a:extLst>
               <a:ext uri="{FF2B5EF4-FFF2-40B4-BE49-F238E27FC236}">
-                <a16:creationId xmlns="" xmlns:a16="http://schemas.microsoft.com/office/drawing/2014/main" id="{DF797B74-E645-46F4-8F77-49AF7F0D443F}"/>
+                <a16:creationId xmlns:a16="http://schemas.microsoft.com/office/drawing/2014/main" id="{DF797B74-E645-46F4-8F77-49AF7F0D443F}"/>
               </a:ext>
             </a:extLst>
           </p:cNvPr>
@@ -3188,7 +3091,7 @@
           <p:cNvPr id="3" name="Content Placeholder 2">
             <a:extLst>
               <a:ext uri="{FF2B5EF4-FFF2-40B4-BE49-F238E27FC236}">
-                <a16:creationId xmlns="" xmlns:a16="http://schemas.microsoft.com/office/drawing/2014/main" id="{2E5EAA7C-AE70-48A8-B582-013424EB9C44}"/>
+                <a16:creationId xmlns:a16="http://schemas.microsoft.com/office/drawing/2014/main" id="{2E5EAA7C-AE70-48A8-B582-013424EB9C44}"/>
               </a:ext>
             </a:extLst>
           </p:cNvPr>
@@ -3246,7 +3149,7 @@
           <p:cNvPr id="7" name="Footer Placeholder 6">
             <a:extLst>
               <a:ext uri="{FF2B5EF4-FFF2-40B4-BE49-F238E27FC236}">
-                <a16:creationId xmlns="" xmlns:a16="http://schemas.microsoft.com/office/drawing/2014/main" id="{A557D1A2-E2DD-4CD8-B7DB-2864D4A97E02}"/>
+                <a16:creationId xmlns:a16="http://schemas.microsoft.com/office/drawing/2014/main" id="{A557D1A2-E2DD-4CD8-B7DB-2864D4A97E02}"/>
               </a:ext>
             </a:extLst>
           </p:cNvPr>
@@ -3271,7 +3174,7 @@
           <p:cNvPr id="8" name="Slide Number Placeholder 7">
             <a:extLst>
               <a:ext uri="{FF2B5EF4-FFF2-40B4-BE49-F238E27FC236}">
-                <a16:creationId xmlns="" xmlns:a16="http://schemas.microsoft.com/office/drawing/2014/main" id="{86B08B7A-4219-4973-8C9B-BF5BCC64480F}"/>
+                <a16:creationId xmlns:a16="http://schemas.microsoft.com/office/drawing/2014/main" id="{86B08B7A-4219-4973-8C9B-BF5BCC64480F}"/>
               </a:ext>
             </a:extLst>
           </p:cNvPr>
@@ -3331,7 +3234,7 @@
           <p:cNvPr id="5" name="Picture Placeholder 4">
             <a:extLst>
               <a:ext uri="{FF2B5EF4-FFF2-40B4-BE49-F238E27FC236}">
-                <a16:creationId xmlns="" xmlns:a16="http://schemas.microsoft.com/office/drawing/2014/main" id="{48D39141-3E8E-4545-90DB-291A0E5F139B}"/>
+                <a16:creationId xmlns:a16="http://schemas.microsoft.com/office/drawing/2014/main" id="{48D39141-3E8E-4545-90DB-291A0E5F139B}"/>
               </a:ext>
             </a:extLst>
           </p:cNvPr>
@@ -3391,7 +3294,7 @@
           <p:cNvPr id="2" name="Title 1">
             <a:extLst>
               <a:ext uri="{FF2B5EF4-FFF2-40B4-BE49-F238E27FC236}">
-                <a16:creationId xmlns="" xmlns:a16="http://schemas.microsoft.com/office/drawing/2014/main" id="{AD90A062-54B3-47F2-9D6A-5BC9575208D2}"/>
+                <a16:creationId xmlns:a16="http://schemas.microsoft.com/office/drawing/2014/main" id="{AD90A062-54B3-47F2-9D6A-5BC9575208D2}"/>
               </a:ext>
             </a:extLst>
           </p:cNvPr>
@@ -3447,7 +3350,7 @@
           <p:cNvPr id="6" name="Text Placeholder 5">
             <a:extLst>
               <a:ext uri="{FF2B5EF4-FFF2-40B4-BE49-F238E27FC236}">
-                <a16:creationId xmlns="" xmlns:a16="http://schemas.microsoft.com/office/drawing/2014/main" id="{D49FD1A9-E34B-4888-90DE-493861AD75C6}"/>
+                <a16:creationId xmlns:a16="http://schemas.microsoft.com/office/drawing/2014/main" id="{D49FD1A9-E34B-4888-90DE-493861AD75C6}"/>
               </a:ext>
             </a:extLst>
           </p:cNvPr>
@@ -3523,7 +3426,7 @@
           <p:cNvPr id="9" name="Text Placeholder 5">
             <a:extLst>
               <a:ext uri="{FF2B5EF4-FFF2-40B4-BE49-F238E27FC236}">
-                <a16:creationId xmlns="" xmlns:a16="http://schemas.microsoft.com/office/drawing/2014/main" id="{3452AC72-D893-4C1A-83BD-9930164D8935}"/>
+                <a16:creationId xmlns:a16="http://schemas.microsoft.com/office/drawing/2014/main" id="{3452AC72-D893-4C1A-83BD-9930164D8935}"/>
               </a:ext>
             </a:extLst>
           </p:cNvPr>
@@ -3601,7 +3504,7 @@
           <p:cNvPr id="10" name="Text Placeholder 5">
             <a:extLst>
               <a:ext uri="{FF2B5EF4-FFF2-40B4-BE49-F238E27FC236}">
-                <a16:creationId xmlns="" xmlns:a16="http://schemas.microsoft.com/office/drawing/2014/main" id="{D2EEC149-F1BE-4C36-A789-5BF73B40A212}"/>
+                <a16:creationId xmlns:a16="http://schemas.microsoft.com/office/drawing/2014/main" id="{D2EEC149-F1BE-4C36-A789-5BF73B40A212}"/>
               </a:ext>
             </a:extLst>
           </p:cNvPr>
@@ -3679,7 +3582,7 @@
           <p:cNvPr id="11" name="Text Placeholder 5">
             <a:extLst>
               <a:ext uri="{FF2B5EF4-FFF2-40B4-BE49-F238E27FC236}">
-                <a16:creationId xmlns="" xmlns:a16="http://schemas.microsoft.com/office/drawing/2014/main" id="{ECC256E6-6AE8-4950-838C-BE638FB47968}"/>
+                <a16:creationId xmlns:a16="http://schemas.microsoft.com/office/drawing/2014/main" id="{ECC256E6-6AE8-4950-838C-BE638FB47968}"/>
               </a:ext>
             </a:extLst>
           </p:cNvPr>
@@ -3784,7 +3687,7 @@
           <p:cNvPr id="5" name="Text Placeholder 4">
             <a:extLst>
               <a:ext uri="{FF2B5EF4-FFF2-40B4-BE49-F238E27FC236}">
-                <a16:creationId xmlns="" xmlns:a16="http://schemas.microsoft.com/office/drawing/2014/main" id="{DA75689F-8B6B-4484-8064-90B4D8FB7C72}"/>
+                <a16:creationId xmlns:a16="http://schemas.microsoft.com/office/drawing/2014/main" id="{DA75689F-8B6B-4484-8064-90B4D8FB7C72}"/>
               </a:ext>
             </a:extLst>
           </p:cNvPr>
@@ -3841,7 +3744,7 @@
           <p:cNvPr id="21" name="Picture Placeholder 20">
             <a:extLst>
               <a:ext uri="{FF2B5EF4-FFF2-40B4-BE49-F238E27FC236}">
-                <a16:creationId xmlns="" xmlns:a16="http://schemas.microsoft.com/office/drawing/2014/main" id="{C57B9832-0120-4094-8C27-082E3533C5DC}"/>
+                <a16:creationId xmlns:a16="http://schemas.microsoft.com/office/drawing/2014/main" id="{C57B9832-0120-4094-8C27-082E3533C5DC}"/>
               </a:ext>
             </a:extLst>
           </p:cNvPr>
@@ -3974,7 +3877,7 @@
           <p:cNvPr id="7" name="Footer Placeholder 6">
             <a:extLst>
               <a:ext uri="{FF2B5EF4-FFF2-40B4-BE49-F238E27FC236}">
-                <a16:creationId xmlns="" xmlns:a16="http://schemas.microsoft.com/office/drawing/2014/main" id="{A557D1A2-E2DD-4CD8-B7DB-2864D4A97E02}"/>
+                <a16:creationId xmlns:a16="http://schemas.microsoft.com/office/drawing/2014/main" id="{A557D1A2-E2DD-4CD8-B7DB-2864D4A97E02}"/>
               </a:ext>
             </a:extLst>
           </p:cNvPr>
@@ -4004,7 +3907,7 @@
           <p:cNvPr id="8" name="Slide Number Placeholder 7">
             <a:extLst>
               <a:ext uri="{FF2B5EF4-FFF2-40B4-BE49-F238E27FC236}">
-                <a16:creationId xmlns="" xmlns:a16="http://schemas.microsoft.com/office/drawing/2014/main" id="{86B08B7A-4219-4973-8C9B-BF5BCC64480F}"/>
+                <a16:creationId xmlns:a16="http://schemas.microsoft.com/office/drawing/2014/main" id="{86B08B7A-4219-4973-8C9B-BF5BCC64480F}"/>
               </a:ext>
             </a:extLst>
           </p:cNvPr>
@@ -4046,7 +3949,7 @@
           <p:cNvPr id="12" name="Title 11">
             <a:extLst>
               <a:ext uri="{FF2B5EF4-FFF2-40B4-BE49-F238E27FC236}">
-                <a16:creationId xmlns="" xmlns:a16="http://schemas.microsoft.com/office/drawing/2014/main" id="{EAF90A48-1BFB-4A19-9A1C-2851879F9E8F}"/>
+                <a16:creationId xmlns:a16="http://schemas.microsoft.com/office/drawing/2014/main" id="{EAF90A48-1BFB-4A19-9A1C-2851879F9E8F}"/>
               </a:ext>
             </a:extLst>
           </p:cNvPr>
@@ -4088,7 +3991,7 @@
           <p:cNvPr id="19" name="Freeform: Shape 18">
             <a:extLst>
               <a:ext uri="{FF2B5EF4-FFF2-40B4-BE49-F238E27FC236}">
-                <a16:creationId xmlns="" xmlns:a16="http://schemas.microsoft.com/office/drawing/2014/main" id="{C9E79024-4B2E-43B0-8607-196181AB731F}"/>
+                <a16:creationId xmlns:a16="http://schemas.microsoft.com/office/drawing/2014/main" id="{C9E79024-4B2E-43B0-8607-196181AB731F}"/>
               </a:ext>
             </a:extLst>
           </p:cNvPr>
@@ -4274,7 +4177,7 @@
           <p:cNvPr id="24" name="Picture Placeholder 23">
             <a:extLst>
               <a:ext uri="{FF2B5EF4-FFF2-40B4-BE49-F238E27FC236}">
-                <a16:creationId xmlns="" xmlns:a16="http://schemas.microsoft.com/office/drawing/2014/main" id="{767CE6DD-011B-4E2D-9E8A-EFF414E39EEA}"/>
+                <a16:creationId xmlns:a16="http://schemas.microsoft.com/office/drawing/2014/main" id="{767CE6DD-011B-4E2D-9E8A-EFF414E39EEA}"/>
               </a:ext>
             </a:extLst>
           </p:cNvPr>
@@ -4412,7 +4315,7 @@
           <p:cNvPr id="2" name="Title 1">
             <a:extLst>
               <a:ext uri="{FF2B5EF4-FFF2-40B4-BE49-F238E27FC236}">
-                <a16:creationId xmlns="" xmlns:a16="http://schemas.microsoft.com/office/drawing/2014/main" id="{DF797B74-E645-46F4-8F77-49AF7F0D443F}"/>
+                <a16:creationId xmlns:a16="http://schemas.microsoft.com/office/drawing/2014/main" id="{DF797B74-E645-46F4-8F77-49AF7F0D443F}"/>
               </a:ext>
             </a:extLst>
           </p:cNvPr>
@@ -4454,7 +4357,7 @@
           <p:cNvPr id="7" name="Footer Placeholder 6">
             <a:extLst>
               <a:ext uri="{FF2B5EF4-FFF2-40B4-BE49-F238E27FC236}">
-                <a16:creationId xmlns="" xmlns:a16="http://schemas.microsoft.com/office/drawing/2014/main" id="{A557D1A2-E2DD-4CD8-B7DB-2864D4A97E02}"/>
+                <a16:creationId xmlns:a16="http://schemas.microsoft.com/office/drawing/2014/main" id="{A557D1A2-E2DD-4CD8-B7DB-2864D4A97E02}"/>
               </a:ext>
             </a:extLst>
           </p:cNvPr>
@@ -4487,7 +4390,7 @@
           <p:cNvPr id="8" name="Slide Number Placeholder 7">
             <a:extLst>
               <a:ext uri="{FF2B5EF4-FFF2-40B4-BE49-F238E27FC236}">
-                <a16:creationId xmlns="" xmlns:a16="http://schemas.microsoft.com/office/drawing/2014/main" id="{86B08B7A-4219-4973-8C9B-BF5BCC64480F}"/>
+                <a16:creationId xmlns:a16="http://schemas.microsoft.com/office/drawing/2014/main" id="{86B08B7A-4219-4973-8C9B-BF5BCC64480F}"/>
               </a:ext>
             </a:extLst>
           </p:cNvPr>
@@ -4517,7 +4420,7 @@
           <p:cNvPr id="9" name="Freeform: Shape 8">
             <a:extLst>
               <a:ext uri="{FF2B5EF4-FFF2-40B4-BE49-F238E27FC236}">
-                <a16:creationId xmlns="" xmlns:a16="http://schemas.microsoft.com/office/drawing/2014/main" id="{C6E75A4B-2655-4B0E-8D3B-0068F57D3D9B}"/>
+                <a16:creationId xmlns:a16="http://schemas.microsoft.com/office/drawing/2014/main" id="{C6E75A4B-2655-4B0E-8D3B-0068F57D3D9B}"/>
               </a:ext>
             </a:extLst>
           </p:cNvPr>
@@ -4676,7 +4579,7 @@
           <p:cNvPr id="5" name="Text Placeholder 4">
             <a:extLst>
               <a:ext uri="{FF2B5EF4-FFF2-40B4-BE49-F238E27FC236}">
-                <a16:creationId xmlns="" xmlns:a16="http://schemas.microsoft.com/office/drawing/2014/main" id="{49F266E5-40A6-4643-B9AC-B38F27256371}"/>
+                <a16:creationId xmlns:a16="http://schemas.microsoft.com/office/drawing/2014/main" id="{49F266E5-40A6-4643-B9AC-B38F27256371}"/>
               </a:ext>
             </a:extLst>
           </p:cNvPr>
@@ -4757,7 +4660,7 @@
           <p:cNvPr id="11" name="Text Placeholder 10">
             <a:extLst>
               <a:ext uri="{FF2B5EF4-FFF2-40B4-BE49-F238E27FC236}">
-                <a16:creationId xmlns="" xmlns:a16="http://schemas.microsoft.com/office/drawing/2014/main" id="{1CB790CB-E4F5-4B61-A03E-1CA0C32E3F17}"/>
+                <a16:creationId xmlns:a16="http://schemas.microsoft.com/office/drawing/2014/main" id="{1CB790CB-E4F5-4B61-A03E-1CA0C32E3F17}"/>
               </a:ext>
             </a:extLst>
           </p:cNvPr>
@@ -4832,7 +4735,7 @@
           <p:cNvPr id="12" name="Text Placeholder 4">
             <a:extLst>
               <a:ext uri="{FF2B5EF4-FFF2-40B4-BE49-F238E27FC236}">
-                <a16:creationId xmlns="" xmlns:a16="http://schemas.microsoft.com/office/drawing/2014/main" id="{B570684C-B743-402E-8778-A65199577106}"/>
+                <a16:creationId xmlns:a16="http://schemas.microsoft.com/office/drawing/2014/main" id="{B570684C-B743-402E-8778-A65199577106}"/>
               </a:ext>
             </a:extLst>
           </p:cNvPr>
@@ -4913,7 +4816,7 @@
           <p:cNvPr id="13" name="Text Placeholder 10">
             <a:extLst>
               <a:ext uri="{FF2B5EF4-FFF2-40B4-BE49-F238E27FC236}">
-                <a16:creationId xmlns="" xmlns:a16="http://schemas.microsoft.com/office/drawing/2014/main" id="{FCEC7149-9A00-4CA4-B800-1BFD6EBEB88D}"/>
+                <a16:creationId xmlns:a16="http://schemas.microsoft.com/office/drawing/2014/main" id="{FCEC7149-9A00-4CA4-B800-1BFD6EBEB88D}"/>
               </a:ext>
             </a:extLst>
           </p:cNvPr>
@@ -4988,7 +4891,7 @@
           <p:cNvPr id="14" name="Text Placeholder 4">
             <a:extLst>
               <a:ext uri="{FF2B5EF4-FFF2-40B4-BE49-F238E27FC236}">
-                <a16:creationId xmlns="" xmlns:a16="http://schemas.microsoft.com/office/drawing/2014/main" id="{0374F0E2-36BA-43B5-8799-77AA3367DF47}"/>
+                <a16:creationId xmlns:a16="http://schemas.microsoft.com/office/drawing/2014/main" id="{0374F0E2-36BA-43B5-8799-77AA3367DF47}"/>
               </a:ext>
             </a:extLst>
           </p:cNvPr>
@@ -5069,7 +4972,7 @@
           <p:cNvPr id="15" name="Text Placeholder 10">
             <a:extLst>
               <a:ext uri="{FF2B5EF4-FFF2-40B4-BE49-F238E27FC236}">
-                <a16:creationId xmlns="" xmlns:a16="http://schemas.microsoft.com/office/drawing/2014/main" id="{1BA12174-6A24-4E61-8D58-B3B42C31BE1A}"/>
+                <a16:creationId xmlns:a16="http://schemas.microsoft.com/office/drawing/2014/main" id="{1BA12174-6A24-4E61-8D58-B3B42C31BE1A}"/>
               </a:ext>
             </a:extLst>
           </p:cNvPr>
@@ -5144,7 +5047,7 @@
           <p:cNvPr id="16" name="Text Placeholder 4">
             <a:extLst>
               <a:ext uri="{FF2B5EF4-FFF2-40B4-BE49-F238E27FC236}">
-                <a16:creationId xmlns="" xmlns:a16="http://schemas.microsoft.com/office/drawing/2014/main" id="{D3A67B21-0E8B-4922-94F9-20492309C4DA}"/>
+                <a16:creationId xmlns:a16="http://schemas.microsoft.com/office/drawing/2014/main" id="{D3A67B21-0E8B-4922-94F9-20492309C4DA}"/>
               </a:ext>
             </a:extLst>
           </p:cNvPr>
@@ -5225,7 +5128,7 @@
           <p:cNvPr id="17" name="Text Placeholder 10">
             <a:extLst>
               <a:ext uri="{FF2B5EF4-FFF2-40B4-BE49-F238E27FC236}">
-                <a16:creationId xmlns="" xmlns:a16="http://schemas.microsoft.com/office/drawing/2014/main" id="{D801C20C-82D2-465E-8D45-DF1A57E04525}"/>
+                <a16:creationId xmlns:a16="http://schemas.microsoft.com/office/drawing/2014/main" id="{D801C20C-82D2-465E-8D45-DF1A57E04525}"/>
               </a:ext>
             </a:extLst>
           </p:cNvPr>
@@ -5300,7 +5203,7 @@
           <p:cNvPr id="18" name="Text Placeholder 4">
             <a:extLst>
               <a:ext uri="{FF2B5EF4-FFF2-40B4-BE49-F238E27FC236}">
-                <a16:creationId xmlns="" xmlns:a16="http://schemas.microsoft.com/office/drawing/2014/main" id="{62BAD45E-2039-4F8D-9CFC-42BFA3756AD1}"/>
+                <a16:creationId xmlns:a16="http://schemas.microsoft.com/office/drawing/2014/main" id="{62BAD45E-2039-4F8D-9CFC-42BFA3756AD1}"/>
               </a:ext>
             </a:extLst>
           </p:cNvPr>
@@ -5381,7 +5284,7 @@
           <p:cNvPr id="19" name="Text Placeholder 10">
             <a:extLst>
               <a:ext uri="{FF2B5EF4-FFF2-40B4-BE49-F238E27FC236}">
-                <a16:creationId xmlns="" xmlns:a16="http://schemas.microsoft.com/office/drawing/2014/main" id="{64A78879-6338-4F3B-864E-8FF4E08C0066}"/>
+                <a16:creationId xmlns:a16="http://schemas.microsoft.com/office/drawing/2014/main" id="{64A78879-6338-4F3B-864E-8FF4E08C0066}"/>
               </a:ext>
             </a:extLst>
           </p:cNvPr>
@@ -5456,7 +5359,7 @@
           <p:cNvPr id="22" name="Subtitle 2">
             <a:extLst>
               <a:ext uri="{FF2B5EF4-FFF2-40B4-BE49-F238E27FC236}">
-                <a16:creationId xmlns="" xmlns:a16="http://schemas.microsoft.com/office/drawing/2014/main" id="{80118439-B306-4F20-9200-1C429EADC7EE}"/>
+                <a16:creationId xmlns:a16="http://schemas.microsoft.com/office/drawing/2014/main" id="{80118439-B306-4F20-9200-1C429EADC7EE}"/>
               </a:ext>
             </a:extLst>
           </p:cNvPr>
@@ -5541,7 +5444,7 @@
           <p:cNvPr id="26" name="Picture Placeholder 25">
             <a:extLst>
               <a:ext uri="{FF2B5EF4-FFF2-40B4-BE49-F238E27FC236}">
-                <a16:creationId xmlns="" xmlns:a16="http://schemas.microsoft.com/office/drawing/2014/main" id="{99B7E7F2-DF6B-4441-B0B1-7E87E29BA3A7}"/>
+                <a16:creationId xmlns:a16="http://schemas.microsoft.com/office/drawing/2014/main" id="{99B7E7F2-DF6B-4441-B0B1-7E87E29BA3A7}"/>
               </a:ext>
             </a:extLst>
           </p:cNvPr>
@@ -5583,7 +5486,7 @@
           <p:cNvPr id="27" name="Picture Placeholder 25">
             <a:extLst>
               <a:ext uri="{FF2B5EF4-FFF2-40B4-BE49-F238E27FC236}">
-                <a16:creationId xmlns="" xmlns:a16="http://schemas.microsoft.com/office/drawing/2014/main" id="{ED41522A-FBAF-4E5D-B592-F13855964E8B}"/>
+                <a16:creationId xmlns:a16="http://schemas.microsoft.com/office/drawing/2014/main" id="{ED41522A-FBAF-4E5D-B592-F13855964E8B}"/>
               </a:ext>
             </a:extLst>
           </p:cNvPr>
@@ -5625,7 +5528,7 @@
           <p:cNvPr id="28" name="Picture Placeholder 25">
             <a:extLst>
               <a:ext uri="{FF2B5EF4-FFF2-40B4-BE49-F238E27FC236}">
-                <a16:creationId xmlns="" xmlns:a16="http://schemas.microsoft.com/office/drawing/2014/main" id="{AA51069C-E1DC-44A0-A6A0-2A4AB0DD4D70}"/>
+                <a16:creationId xmlns:a16="http://schemas.microsoft.com/office/drawing/2014/main" id="{AA51069C-E1DC-44A0-A6A0-2A4AB0DD4D70}"/>
               </a:ext>
             </a:extLst>
           </p:cNvPr>
@@ -5667,7 +5570,7 @@
           <p:cNvPr id="29" name="Picture Placeholder 25">
             <a:extLst>
               <a:ext uri="{FF2B5EF4-FFF2-40B4-BE49-F238E27FC236}">
-                <a16:creationId xmlns="" xmlns:a16="http://schemas.microsoft.com/office/drawing/2014/main" id="{42F6437E-5478-451F-9BE3-E8160EA43516}"/>
+                <a16:creationId xmlns:a16="http://schemas.microsoft.com/office/drawing/2014/main" id="{42F6437E-5478-451F-9BE3-E8160EA43516}"/>
               </a:ext>
             </a:extLst>
           </p:cNvPr>
@@ -5709,7 +5612,7 @@
           <p:cNvPr id="30" name="Picture Placeholder 25">
             <a:extLst>
               <a:ext uri="{FF2B5EF4-FFF2-40B4-BE49-F238E27FC236}">
-                <a16:creationId xmlns="" xmlns:a16="http://schemas.microsoft.com/office/drawing/2014/main" id="{25127DFD-53A7-41A8-B591-AEEC12038026}"/>
+                <a16:creationId xmlns:a16="http://schemas.microsoft.com/office/drawing/2014/main" id="{25127DFD-53A7-41A8-B591-AEEC12038026}"/>
               </a:ext>
             </a:extLst>
           </p:cNvPr>
@@ -5781,10 +5684,10 @@
           <p:cNvPr id="9" name="Rectangle 8">
             <a:extLst>
               <a:ext uri="{FF2B5EF4-FFF2-40B4-BE49-F238E27FC236}">
-                <a16:creationId xmlns="" xmlns:a16="http://schemas.microsoft.com/office/drawing/2014/main" id="{6F76D43D-0DDD-4BAD-8213-BDBF75C30A0C}"/>
+                <a16:creationId xmlns:a16="http://schemas.microsoft.com/office/drawing/2014/main" id="{6F76D43D-0DDD-4BAD-8213-BDBF75C30A0C}"/>
               </a:ext>
               <a:ext uri="{C183D7F6-B498-43B3-948B-1728B52AA6E4}">
-                <adec:decorative xmlns="" xmlns:adec="http://schemas.microsoft.com/office/drawing/2017/decorative" val="1"/>
+                <adec:decorative xmlns:adec="http://schemas.microsoft.com/office/drawing/2017/decorative" val="1"/>
               </a:ext>
             </a:extLst>
           </p:cNvPr>
@@ -5838,7 +5741,7 @@
           <p:cNvPr id="8" name="Text Placeholder 3">
             <a:extLst>
               <a:ext uri="{FF2B5EF4-FFF2-40B4-BE49-F238E27FC236}">
-                <a16:creationId xmlns="" xmlns:a16="http://schemas.microsoft.com/office/drawing/2014/main" id="{A6D3ACF3-E1F5-4332-9836-C8E6C46591BB}"/>
+                <a16:creationId xmlns:a16="http://schemas.microsoft.com/office/drawing/2014/main" id="{A6D3ACF3-E1F5-4332-9836-C8E6C46591BB}"/>
               </a:ext>
             </a:extLst>
           </p:cNvPr>
@@ -6077,7 +5980,7 @@
           <p:cNvPr id="2" name="Title 1">
             <a:extLst>
               <a:ext uri="{FF2B5EF4-FFF2-40B4-BE49-F238E27FC236}">
-                <a16:creationId xmlns="" xmlns:a16="http://schemas.microsoft.com/office/drawing/2014/main" id="{0BDF8FE7-66F4-4586-B49B-61E115ED291E}"/>
+                <a16:creationId xmlns:a16="http://schemas.microsoft.com/office/drawing/2014/main" id="{0BDF8FE7-66F4-4586-B49B-61E115ED291E}"/>
               </a:ext>
             </a:extLst>
           </p:cNvPr>
@@ -6113,7 +6016,7 @@
           <p:cNvPr id="6" name="Footer Placeholder 5">
             <a:extLst>
               <a:ext uri="{FF2B5EF4-FFF2-40B4-BE49-F238E27FC236}">
-                <a16:creationId xmlns="" xmlns:a16="http://schemas.microsoft.com/office/drawing/2014/main" id="{AEB5B890-F885-418C-9812-59970CAC6BCD}"/>
+                <a16:creationId xmlns:a16="http://schemas.microsoft.com/office/drawing/2014/main" id="{AEB5B890-F885-418C-9812-59970CAC6BCD}"/>
               </a:ext>
             </a:extLst>
           </p:cNvPr>
@@ -6138,7 +6041,7 @@
           <p:cNvPr id="7" name="Slide Number Placeholder 6">
             <a:extLst>
               <a:ext uri="{FF2B5EF4-FFF2-40B4-BE49-F238E27FC236}">
-                <a16:creationId xmlns="" xmlns:a16="http://schemas.microsoft.com/office/drawing/2014/main" id="{50521507-88DE-417D-8076-D9152E1E1409}"/>
+                <a16:creationId xmlns:a16="http://schemas.microsoft.com/office/drawing/2014/main" id="{50521507-88DE-417D-8076-D9152E1E1409}"/>
               </a:ext>
             </a:extLst>
           </p:cNvPr>
@@ -6168,7 +6071,7 @@
           <p:cNvPr id="4" name="Text Placeholder 3">
             <a:extLst>
               <a:ext uri="{FF2B5EF4-FFF2-40B4-BE49-F238E27FC236}">
-                <a16:creationId xmlns="" xmlns:a16="http://schemas.microsoft.com/office/drawing/2014/main" id="{1DFC7DDD-6F93-45F8-AFD6-95AA051FE809}"/>
+                <a16:creationId xmlns:a16="http://schemas.microsoft.com/office/drawing/2014/main" id="{1DFC7DDD-6F93-45F8-AFD6-95AA051FE809}"/>
               </a:ext>
             </a:extLst>
           </p:cNvPr>
@@ -6212,7 +6115,7 @@
           <p:cNvPr id="21" name="Freeform: Shape 20">
             <a:extLst>
               <a:ext uri="{FF2B5EF4-FFF2-40B4-BE49-F238E27FC236}">
-                <a16:creationId xmlns="" xmlns:a16="http://schemas.microsoft.com/office/drawing/2014/main" id="{D1CD6042-5DF4-4624-BC32-25F68745304A}"/>
+                <a16:creationId xmlns:a16="http://schemas.microsoft.com/office/drawing/2014/main" id="{D1CD6042-5DF4-4624-BC32-25F68745304A}"/>
               </a:ext>
             </a:extLst>
           </p:cNvPr>
@@ -6345,7 +6248,7 @@
           <p:cNvPr id="19" name="Freeform: Shape 18">
             <a:extLst>
               <a:ext uri="{FF2B5EF4-FFF2-40B4-BE49-F238E27FC236}">
-                <a16:creationId xmlns="" xmlns:a16="http://schemas.microsoft.com/office/drawing/2014/main" id="{6294759C-286C-4281-B194-581C766EEF28}"/>
+                <a16:creationId xmlns:a16="http://schemas.microsoft.com/office/drawing/2014/main" id="{6294759C-286C-4281-B194-581C766EEF28}"/>
               </a:ext>
             </a:extLst>
           </p:cNvPr>
@@ -6508,7 +6411,7 @@
           <p:cNvPr id="6" name="Picture Placeholder 23">
             <a:extLst>
               <a:ext uri="{FF2B5EF4-FFF2-40B4-BE49-F238E27FC236}">
-                <a16:creationId xmlns="" xmlns:a16="http://schemas.microsoft.com/office/drawing/2014/main" id="{E6622698-E93D-4214-8C21-38DBE58C2E3F}"/>
+                <a16:creationId xmlns:a16="http://schemas.microsoft.com/office/drawing/2014/main" id="{E6622698-E93D-4214-8C21-38DBE58C2E3F}"/>
               </a:ext>
             </a:extLst>
           </p:cNvPr>
@@ -6646,7 +6549,7 @@
           <p:cNvPr id="9" name="Freeform: Shape 8">
             <a:extLst>
               <a:ext uri="{FF2B5EF4-FFF2-40B4-BE49-F238E27FC236}">
-                <a16:creationId xmlns="" xmlns:a16="http://schemas.microsoft.com/office/drawing/2014/main" id="{1706BC54-FE11-4237-96CC-8DA267DB5D7C}"/>
+                <a16:creationId xmlns:a16="http://schemas.microsoft.com/office/drawing/2014/main" id="{1706BC54-FE11-4237-96CC-8DA267DB5D7C}"/>
               </a:ext>
             </a:extLst>
           </p:cNvPr>
@@ -6805,7 +6708,7 @@
           <p:cNvPr id="2" name="Title 1">
             <a:extLst>
               <a:ext uri="{FF2B5EF4-FFF2-40B4-BE49-F238E27FC236}">
-                <a16:creationId xmlns="" xmlns:a16="http://schemas.microsoft.com/office/drawing/2014/main" id="{DF797B74-E645-46F4-8F77-49AF7F0D443F}"/>
+                <a16:creationId xmlns:a16="http://schemas.microsoft.com/office/drawing/2014/main" id="{DF797B74-E645-46F4-8F77-49AF7F0D443F}"/>
               </a:ext>
             </a:extLst>
           </p:cNvPr>
@@ -6847,7 +6750,7 @@
           <p:cNvPr id="7" name="Footer Placeholder 6">
             <a:extLst>
               <a:ext uri="{FF2B5EF4-FFF2-40B4-BE49-F238E27FC236}">
-                <a16:creationId xmlns="" xmlns:a16="http://schemas.microsoft.com/office/drawing/2014/main" id="{A557D1A2-E2DD-4CD8-B7DB-2864D4A97E02}"/>
+                <a16:creationId xmlns:a16="http://schemas.microsoft.com/office/drawing/2014/main" id="{A557D1A2-E2DD-4CD8-B7DB-2864D4A97E02}"/>
               </a:ext>
             </a:extLst>
           </p:cNvPr>
@@ -6872,7 +6775,7 @@
           <p:cNvPr id="8" name="Slide Number Placeholder 7">
             <a:extLst>
               <a:ext uri="{FF2B5EF4-FFF2-40B4-BE49-F238E27FC236}">
-                <a16:creationId xmlns="" xmlns:a16="http://schemas.microsoft.com/office/drawing/2014/main" id="{86B08B7A-4219-4973-8C9B-BF5BCC64480F}"/>
+                <a16:creationId xmlns:a16="http://schemas.microsoft.com/office/drawing/2014/main" id="{86B08B7A-4219-4973-8C9B-BF5BCC64480F}"/>
               </a:ext>
             </a:extLst>
           </p:cNvPr>
@@ -6902,7 +6805,7 @@
           <p:cNvPr id="5" name="Text Placeholder 4">
             <a:extLst>
               <a:ext uri="{FF2B5EF4-FFF2-40B4-BE49-F238E27FC236}">
-                <a16:creationId xmlns="" xmlns:a16="http://schemas.microsoft.com/office/drawing/2014/main" id="{C430C70C-09F9-40EE-9A89-ED9A5DCFD98D}"/>
+                <a16:creationId xmlns:a16="http://schemas.microsoft.com/office/drawing/2014/main" id="{C430C70C-09F9-40EE-9A89-ED9A5DCFD98D}"/>
               </a:ext>
             </a:extLst>
           </p:cNvPr>
@@ -6977,7 +6880,7 @@
           <p:cNvPr id="13" name="Text Placeholder 12">
             <a:extLst>
               <a:ext uri="{FF2B5EF4-FFF2-40B4-BE49-F238E27FC236}">
-                <a16:creationId xmlns="" xmlns:a16="http://schemas.microsoft.com/office/drawing/2014/main" id="{278D9ACA-AB64-4D04-A5E0-23AC8B81EC2C}"/>
+                <a16:creationId xmlns:a16="http://schemas.microsoft.com/office/drawing/2014/main" id="{278D9ACA-AB64-4D04-A5E0-23AC8B81EC2C}"/>
               </a:ext>
             </a:extLst>
           </p:cNvPr>
@@ -7053,7 +6956,7 @@
           <p:cNvPr id="15" name="Text Placeholder 4">
             <a:extLst>
               <a:ext uri="{FF2B5EF4-FFF2-40B4-BE49-F238E27FC236}">
-                <a16:creationId xmlns="" xmlns:a16="http://schemas.microsoft.com/office/drawing/2014/main" id="{F3B4EB62-0A18-46F9-98F0-E8FC5EBAF37E}"/>
+                <a16:creationId xmlns:a16="http://schemas.microsoft.com/office/drawing/2014/main" id="{F3B4EB62-0A18-46F9-98F0-E8FC5EBAF37E}"/>
               </a:ext>
             </a:extLst>
           </p:cNvPr>
@@ -7128,7 +7031,7 @@
           <p:cNvPr id="16" name="Text Placeholder 12">
             <a:extLst>
               <a:ext uri="{FF2B5EF4-FFF2-40B4-BE49-F238E27FC236}">
-                <a16:creationId xmlns="" xmlns:a16="http://schemas.microsoft.com/office/drawing/2014/main" id="{A3B2D4DF-9952-49C7-B850-559AD0DF27D5}"/>
+                <a16:creationId xmlns:a16="http://schemas.microsoft.com/office/drawing/2014/main" id="{A3B2D4DF-9952-49C7-B850-559AD0DF27D5}"/>
               </a:ext>
             </a:extLst>
           </p:cNvPr>
@@ -7204,7 +7107,7 @@
           <p:cNvPr id="17" name="Text Placeholder 4">
             <a:extLst>
               <a:ext uri="{FF2B5EF4-FFF2-40B4-BE49-F238E27FC236}">
-                <a16:creationId xmlns="" xmlns:a16="http://schemas.microsoft.com/office/drawing/2014/main" id="{BCE373B8-7ADE-4DC4-9900-59147BFA16E7}"/>
+                <a16:creationId xmlns:a16="http://schemas.microsoft.com/office/drawing/2014/main" id="{BCE373B8-7ADE-4DC4-9900-59147BFA16E7}"/>
               </a:ext>
             </a:extLst>
           </p:cNvPr>
@@ -7279,7 +7182,7 @@
           <p:cNvPr id="18" name="Text Placeholder 12">
             <a:extLst>
               <a:ext uri="{FF2B5EF4-FFF2-40B4-BE49-F238E27FC236}">
-                <a16:creationId xmlns="" xmlns:a16="http://schemas.microsoft.com/office/drawing/2014/main" id="{28F027FF-E9AF-4E49-AC44-48D21AD761AA}"/>
+                <a16:creationId xmlns:a16="http://schemas.microsoft.com/office/drawing/2014/main" id="{28F027FF-E9AF-4E49-AC44-48D21AD761AA}"/>
               </a:ext>
             </a:extLst>
           </p:cNvPr>
@@ -7355,7 +7258,7 @@
           <p:cNvPr id="19" name="Text Placeholder 4">
             <a:extLst>
               <a:ext uri="{FF2B5EF4-FFF2-40B4-BE49-F238E27FC236}">
-                <a16:creationId xmlns="" xmlns:a16="http://schemas.microsoft.com/office/drawing/2014/main" id="{3E6D854C-C76F-49BA-9E74-F438CA8EA9E2}"/>
+                <a16:creationId xmlns:a16="http://schemas.microsoft.com/office/drawing/2014/main" id="{3E6D854C-C76F-49BA-9E74-F438CA8EA9E2}"/>
               </a:ext>
             </a:extLst>
           </p:cNvPr>
@@ -7430,7 +7333,7 @@
           <p:cNvPr id="20" name="Text Placeholder 12">
             <a:extLst>
               <a:ext uri="{FF2B5EF4-FFF2-40B4-BE49-F238E27FC236}">
-                <a16:creationId xmlns="" xmlns:a16="http://schemas.microsoft.com/office/drawing/2014/main" id="{AD447D7D-C1F4-4AD4-AE22-EB8E7F1C419E}"/>
+                <a16:creationId xmlns:a16="http://schemas.microsoft.com/office/drawing/2014/main" id="{AD447D7D-C1F4-4AD4-AE22-EB8E7F1C419E}"/>
               </a:ext>
             </a:extLst>
           </p:cNvPr>
@@ -7506,7 +7409,7 @@
           <p:cNvPr id="21" name="Text Placeholder 4">
             <a:extLst>
               <a:ext uri="{FF2B5EF4-FFF2-40B4-BE49-F238E27FC236}">
-                <a16:creationId xmlns="" xmlns:a16="http://schemas.microsoft.com/office/drawing/2014/main" id="{849DF703-38D0-4214-9432-83570E10EFED}"/>
+                <a16:creationId xmlns:a16="http://schemas.microsoft.com/office/drawing/2014/main" id="{849DF703-38D0-4214-9432-83570E10EFED}"/>
               </a:ext>
             </a:extLst>
           </p:cNvPr>
@@ -7581,7 +7484,7 @@
           <p:cNvPr id="22" name="Text Placeholder 12">
             <a:extLst>
               <a:ext uri="{FF2B5EF4-FFF2-40B4-BE49-F238E27FC236}">
-                <a16:creationId xmlns="" xmlns:a16="http://schemas.microsoft.com/office/drawing/2014/main" id="{F9EB6572-1A9F-4672-8E42-A4E15451CA20}"/>
+                <a16:creationId xmlns:a16="http://schemas.microsoft.com/office/drawing/2014/main" id="{F9EB6572-1A9F-4672-8E42-A4E15451CA20}"/>
               </a:ext>
             </a:extLst>
           </p:cNvPr>
@@ -7657,7 +7560,7 @@
           <p:cNvPr id="23" name="Text Placeholder 4">
             <a:extLst>
               <a:ext uri="{FF2B5EF4-FFF2-40B4-BE49-F238E27FC236}">
-                <a16:creationId xmlns="" xmlns:a16="http://schemas.microsoft.com/office/drawing/2014/main" id="{0740EB70-455C-47FF-9A9A-0D78D202ED03}"/>
+                <a16:creationId xmlns:a16="http://schemas.microsoft.com/office/drawing/2014/main" id="{0740EB70-455C-47FF-9A9A-0D78D202ED03}"/>
               </a:ext>
             </a:extLst>
           </p:cNvPr>
@@ -7732,7 +7635,7 @@
           <p:cNvPr id="24" name="Text Placeholder 12">
             <a:extLst>
               <a:ext uri="{FF2B5EF4-FFF2-40B4-BE49-F238E27FC236}">
-                <a16:creationId xmlns="" xmlns:a16="http://schemas.microsoft.com/office/drawing/2014/main" id="{CD9A5773-4F50-4631-9B7A-0A2D83E5DC28}"/>
+                <a16:creationId xmlns:a16="http://schemas.microsoft.com/office/drawing/2014/main" id="{CD9A5773-4F50-4631-9B7A-0A2D83E5DC28}"/>
               </a:ext>
             </a:extLst>
           </p:cNvPr>
@@ -7838,7 +7741,7 @@
           <p:cNvPr id="25" name="Freeform: Shape 24">
             <a:extLst>
               <a:ext uri="{FF2B5EF4-FFF2-40B4-BE49-F238E27FC236}">
-                <a16:creationId xmlns="" xmlns:a16="http://schemas.microsoft.com/office/drawing/2014/main" id="{45350A6A-6F84-47F4-AE00-8295D96D08C8}"/>
+                <a16:creationId xmlns:a16="http://schemas.microsoft.com/office/drawing/2014/main" id="{45350A6A-6F84-47F4-AE00-8295D96D08C8}"/>
               </a:ext>
             </a:extLst>
           </p:cNvPr>
@@ -7971,7 +7874,7 @@
           <p:cNvPr id="20" name="Text Placeholder 3">
             <a:extLst>
               <a:ext uri="{FF2B5EF4-FFF2-40B4-BE49-F238E27FC236}">
-                <a16:creationId xmlns="" xmlns:a16="http://schemas.microsoft.com/office/drawing/2014/main" id="{6A395197-9758-40F0-B747-F8B134C175EB}"/>
+                <a16:creationId xmlns:a16="http://schemas.microsoft.com/office/drawing/2014/main" id="{6A395197-9758-40F0-B747-F8B134C175EB}"/>
               </a:ext>
             </a:extLst>
           </p:cNvPr>
@@ -8210,7 +8113,7 @@
           <p:cNvPr id="2" name="Title 1">
             <a:extLst>
               <a:ext uri="{FF2B5EF4-FFF2-40B4-BE49-F238E27FC236}">
-                <a16:creationId xmlns="" xmlns:a16="http://schemas.microsoft.com/office/drawing/2014/main" id="{DF797B74-E645-46F4-8F77-49AF7F0D443F}"/>
+                <a16:creationId xmlns:a16="http://schemas.microsoft.com/office/drawing/2014/main" id="{DF797B74-E645-46F4-8F77-49AF7F0D443F}"/>
               </a:ext>
             </a:extLst>
           </p:cNvPr>
@@ -8251,7 +8154,7 @@
           <p:cNvPr id="7" name="Footer Placeholder 6">
             <a:extLst>
               <a:ext uri="{FF2B5EF4-FFF2-40B4-BE49-F238E27FC236}">
-                <a16:creationId xmlns="" xmlns:a16="http://schemas.microsoft.com/office/drawing/2014/main" id="{A557D1A2-E2DD-4CD8-B7DB-2864D4A97E02}"/>
+                <a16:creationId xmlns:a16="http://schemas.microsoft.com/office/drawing/2014/main" id="{A557D1A2-E2DD-4CD8-B7DB-2864D4A97E02}"/>
               </a:ext>
             </a:extLst>
           </p:cNvPr>
@@ -8276,7 +8179,7 @@
           <p:cNvPr id="8" name="Slide Number Placeholder 7">
             <a:extLst>
               <a:ext uri="{FF2B5EF4-FFF2-40B4-BE49-F238E27FC236}">
-                <a16:creationId xmlns="" xmlns:a16="http://schemas.microsoft.com/office/drawing/2014/main" id="{86B08B7A-4219-4973-8C9B-BF5BCC64480F}"/>
+                <a16:creationId xmlns:a16="http://schemas.microsoft.com/office/drawing/2014/main" id="{86B08B7A-4219-4973-8C9B-BF5BCC64480F}"/>
               </a:ext>
             </a:extLst>
           </p:cNvPr>
@@ -8306,7 +8209,7 @@
           <p:cNvPr id="5" name="Text Placeholder 4">
             <a:extLst>
               <a:ext uri="{FF2B5EF4-FFF2-40B4-BE49-F238E27FC236}">
-                <a16:creationId xmlns="" xmlns:a16="http://schemas.microsoft.com/office/drawing/2014/main" id="{C430C70C-09F9-40EE-9A89-ED9A5DCFD98D}"/>
+                <a16:creationId xmlns:a16="http://schemas.microsoft.com/office/drawing/2014/main" id="{C430C70C-09F9-40EE-9A89-ED9A5DCFD98D}"/>
               </a:ext>
             </a:extLst>
           </p:cNvPr>
@@ -8385,7 +8288,7 @@
           <p:cNvPr id="13" name="Text Placeholder 12">
             <a:extLst>
               <a:ext uri="{FF2B5EF4-FFF2-40B4-BE49-F238E27FC236}">
-                <a16:creationId xmlns="" xmlns:a16="http://schemas.microsoft.com/office/drawing/2014/main" id="{278D9ACA-AB64-4D04-A5E0-23AC8B81EC2C}"/>
+                <a16:creationId xmlns:a16="http://schemas.microsoft.com/office/drawing/2014/main" id="{278D9ACA-AB64-4D04-A5E0-23AC8B81EC2C}"/>
               </a:ext>
             </a:extLst>
           </p:cNvPr>
@@ -8464,7 +8367,7 @@
           <p:cNvPr id="15" name="Text Placeholder 4">
             <a:extLst>
               <a:ext uri="{FF2B5EF4-FFF2-40B4-BE49-F238E27FC236}">
-                <a16:creationId xmlns="" xmlns:a16="http://schemas.microsoft.com/office/drawing/2014/main" id="{F3B4EB62-0A18-46F9-98F0-E8FC5EBAF37E}"/>
+                <a16:creationId xmlns:a16="http://schemas.microsoft.com/office/drawing/2014/main" id="{F3B4EB62-0A18-46F9-98F0-E8FC5EBAF37E}"/>
               </a:ext>
             </a:extLst>
           </p:cNvPr>
@@ -8543,7 +8446,7 @@
           <p:cNvPr id="16" name="Text Placeholder 12">
             <a:extLst>
               <a:ext uri="{FF2B5EF4-FFF2-40B4-BE49-F238E27FC236}">
-                <a16:creationId xmlns="" xmlns:a16="http://schemas.microsoft.com/office/drawing/2014/main" id="{A3B2D4DF-9952-49C7-B850-559AD0DF27D5}"/>
+                <a16:creationId xmlns:a16="http://schemas.microsoft.com/office/drawing/2014/main" id="{A3B2D4DF-9952-49C7-B850-559AD0DF27D5}"/>
               </a:ext>
             </a:extLst>
           </p:cNvPr>
@@ -8622,7 +8525,7 @@
           <p:cNvPr id="17" name="Text Placeholder 4">
             <a:extLst>
               <a:ext uri="{FF2B5EF4-FFF2-40B4-BE49-F238E27FC236}">
-                <a16:creationId xmlns="" xmlns:a16="http://schemas.microsoft.com/office/drawing/2014/main" id="{BCE373B8-7ADE-4DC4-9900-59147BFA16E7}"/>
+                <a16:creationId xmlns:a16="http://schemas.microsoft.com/office/drawing/2014/main" id="{BCE373B8-7ADE-4DC4-9900-59147BFA16E7}"/>
               </a:ext>
             </a:extLst>
           </p:cNvPr>
@@ -8701,7 +8604,7 @@
           <p:cNvPr id="18" name="Text Placeholder 12">
             <a:extLst>
               <a:ext uri="{FF2B5EF4-FFF2-40B4-BE49-F238E27FC236}">
-                <a16:creationId xmlns="" xmlns:a16="http://schemas.microsoft.com/office/drawing/2014/main" id="{28F027FF-E9AF-4E49-AC44-48D21AD761AA}"/>
+                <a16:creationId xmlns:a16="http://schemas.microsoft.com/office/drawing/2014/main" id="{28F027FF-E9AF-4E49-AC44-48D21AD761AA}"/>
               </a:ext>
             </a:extLst>
           </p:cNvPr>
@@ -8780,7 +8683,7 @@
           <p:cNvPr id="29" name="Picture Placeholder 25">
             <a:extLst>
               <a:ext uri="{FF2B5EF4-FFF2-40B4-BE49-F238E27FC236}">
-                <a16:creationId xmlns="" xmlns:a16="http://schemas.microsoft.com/office/drawing/2014/main" id="{8989EC4C-4E3F-457F-8CF6-8A88DE68A930}"/>
+                <a16:creationId xmlns:a16="http://schemas.microsoft.com/office/drawing/2014/main" id="{8989EC4C-4E3F-457F-8CF6-8A88DE68A930}"/>
               </a:ext>
             </a:extLst>
           </p:cNvPr>
@@ -8822,7 +8725,7 @@
           <p:cNvPr id="30" name="Picture Placeholder 25">
             <a:extLst>
               <a:ext uri="{FF2B5EF4-FFF2-40B4-BE49-F238E27FC236}">
-                <a16:creationId xmlns="" xmlns:a16="http://schemas.microsoft.com/office/drawing/2014/main" id="{67FB2730-3D12-4D72-AE64-AC3955C5CD99}"/>
+                <a16:creationId xmlns:a16="http://schemas.microsoft.com/office/drawing/2014/main" id="{67FB2730-3D12-4D72-AE64-AC3955C5CD99}"/>
               </a:ext>
             </a:extLst>
           </p:cNvPr>
@@ -8864,7 +8767,7 @@
           <p:cNvPr id="31" name="Picture Placeholder 25">
             <a:extLst>
               <a:ext uri="{FF2B5EF4-FFF2-40B4-BE49-F238E27FC236}">
-                <a16:creationId xmlns="" xmlns:a16="http://schemas.microsoft.com/office/drawing/2014/main" id="{4F2BB90C-4866-4DB3-B05C-0BB7DBFF8EA3}"/>
+                <a16:creationId xmlns:a16="http://schemas.microsoft.com/office/drawing/2014/main" id="{4F2BB90C-4866-4DB3-B05C-0BB7DBFF8EA3}"/>
               </a:ext>
             </a:extLst>
           </p:cNvPr>
@@ -8906,7 +8809,7 @@
           <p:cNvPr id="21" name="Text Placeholder 3">
             <a:extLst>
               <a:ext uri="{FF2B5EF4-FFF2-40B4-BE49-F238E27FC236}">
-                <a16:creationId xmlns="" xmlns:a16="http://schemas.microsoft.com/office/drawing/2014/main" id="{7A3E4BF3-C44A-4FB6-B64A-05FB5AEC7577}"/>
+                <a16:creationId xmlns:a16="http://schemas.microsoft.com/office/drawing/2014/main" id="{7A3E4BF3-C44A-4FB6-B64A-05FB5AEC7577}"/>
               </a:ext>
             </a:extLst>
           </p:cNvPr>
@@ -8950,7 +8853,7 @@
           <p:cNvPr id="26" name="Freeform: Shape 25">
             <a:extLst>
               <a:ext uri="{FF2B5EF4-FFF2-40B4-BE49-F238E27FC236}">
-                <a16:creationId xmlns="" xmlns:a16="http://schemas.microsoft.com/office/drawing/2014/main" id="{AEA98CFA-B2A7-4BCC-B1DC-01CFAD2DD65E}"/>
+                <a16:creationId xmlns:a16="http://schemas.microsoft.com/office/drawing/2014/main" id="{AEA98CFA-B2A7-4BCC-B1DC-01CFAD2DD65E}"/>
               </a:ext>
             </a:extLst>
           </p:cNvPr>
@@ -9113,7 +9016,7 @@
           <p:cNvPr id="25" name="Freeform: Shape 24">
             <a:extLst>
               <a:ext uri="{FF2B5EF4-FFF2-40B4-BE49-F238E27FC236}">
-                <a16:creationId xmlns="" xmlns:a16="http://schemas.microsoft.com/office/drawing/2014/main" id="{E752CBEE-7696-40FC-AB0E-8790B179D18C}"/>
+                <a16:creationId xmlns:a16="http://schemas.microsoft.com/office/drawing/2014/main" id="{E752CBEE-7696-40FC-AB0E-8790B179D18C}"/>
               </a:ext>
             </a:extLst>
           </p:cNvPr>
@@ -9246,7 +9149,7 @@
           <p:cNvPr id="20" name="Text Placeholder 3">
             <a:extLst>
               <a:ext uri="{FF2B5EF4-FFF2-40B4-BE49-F238E27FC236}">
-                <a16:creationId xmlns="" xmlns:a16="http://schemas.microsoft.com/office/drawing/2014/main" id="{6A395197-9758-40F0-B747-F8B134C175EB}"/>
+                <a16:creationId xmlns:a16="http://schemas.microsoft.com/office/drawing/2014/main" id="{6A395197-9758-40F0-B747-F8B134C175EB}"/>
               </a:ext>
             </a:extLst>
           </p:cNvPr>
@@ -9485,7 +9388,7 @@
           <p:cNvPr id="2" name="Title 1">
             <a:extLst>
               <a:ext uri="{FF2B5EF4-FFF2-40B4-BE49-F238E27FC236}">
-                <a16:creationId xmlns="" xmlns:a16="http://schemas.microsoft.com/office/drawing/2014/main" id="{DF797B74-E645-46F4-8F77-49AF7F0D443F}"/>
+                <a16:creationId xmlns:a16="http://schemas.microsoft.com/office/drawing/2014/main" id="{DF797B74-E645-46F4-8F77-49AF7F0D443F}"/>
               </a:ext>
             </a:extLst>
           </p:cNvPr>
@@ -9526,7 +9429,7 @@
           <p:cNvPr id="21" name="Text Placeholder 3">
             <a:extLst>
               <a:ext uri="{FF2B5EF4-FFF2-40B4-BE49-F238E27FC236}">
-                <a16:creationId xmlns="" xmlns:a16="http://schemas.microsoft.com/office/drawing/2014/main" id="{7A3E4BF3-C44A-4FB6-B64A-05FB5AEC7577}"/>
+                <a16:creationId xmlns:a16="http://schemas.microsoft.com/office/drawing/2014/main" id="{7A3E4BF3-C44A-4FB6-B64A-05FB5AEC7577}"/>
               </a:ext>
             </a:extLst>
           </p:cNvPr>
@@ -9570,7 +9473,7 @@
           <p:cNvPr id="7" name="Footer Placeholder 6">
             <a:extLst>
               <a:ext uri="{FF2B5EF4-FFF2-40B4-BE49-F238E27FC236}">
-                <a16:creationId xmlns="" xmlns:a16="http://schemas.microsoft.com/office/drawing/2014/main" id="{A557D1A2-E2DD-4CD8-B7DB-2864D4A97E02}"/>
+                <a16:creationId xmlns:a16="http://schemas.microsoft.com/office/drawing/2014/main" id="{A557D1A2-E2DD-4CD8-B7DB-2864D4A97E02}"/>
               </a:ext>
             </a:extLst>
           </p:cNvPr>
@@ -9595,7 +9498,7 @@
           <p:cNvPr id="8" name="Slide Number Placeholder 7">
             <a:extLst>
               <a:ext uri="{FF2B5EF4-FFF2-40B4-BE49-F238E27FC236}">
-                <a16:creationId xmlns="" xmlns:a16="http://schemas.microsoft.com/office/drawing/2014/main" id="{86B08B7A-4219-4973-8C9B-BF5BCC64480F}"/>
+                <a16:creationId xmlns:a16="http://schemas.microsoft.com/office/drawing/2014/main" id="{86B08B7A-4219-4973-8C9B-BF5BCC64480F}"/>
               </a:ext>
             </a:extLst>
           </p:cNvPr>
@@ -9625,7 +9528,7 @@
           <p:cNvPr id="26" name="Freeform: Shape 25">
             <a:extLst>
               <a:ext uri="{FF2B5EF4-FFF2-40B4-BE49-F238E27FC236}">
-                <a16:creationId xmlns="" xmlns:a16="http://schemas.microsoft.com/office/drawing/2014/main" id="{89445125-53D2-43B3-8ABC-C88E463BE7DD}"/>
+                <a16:creationId xmlns:a16="http://schemas.microsoft.com/office/drawing/2014/main" id="{89445125-53D2-43B3-8ABC-C88E463BE7DD}"/>
               </a:ext>
             </a:extLst>
           </p:cNvPr>
@@ -9788,7 +9691,7 @@
           <p:cNvPr id="24" name="Picture Placeholder 23">
             <a:extLst>
               <a:ext uri="{FF2B5EF4-FFF2-40B4-BE49-F238E27FC236}">
-                <a16:creationId xmlns="" xmlns:a16="http://schemas.microsoft.com/office/drawing/2014/main" id="{767CE6DD-011B-4E2D-9E8A-EFF414E39EEA}"/>
+                <a16:creationId xmlns:a16="http://schemas.microsoft.com/office/drawing/2014/main" id="{767CE6DD-011B-4E2D-9E8A-EFF414E39EEA}"/>
               </a:ext>
             </a:extLst>
           </p:cNvPr>
@@ -9926,7 +9829,7 @@
           <p:cNvPr id="2" name="Title 1">
             <a:extLst>
               <a:ext uri="{FF2B5EF4-FFF2-40B4-BE49-F238E27FC236}">
-                <a16:creationId xmlns="" xmlns:a16="http://schemas.microsoft.com/office/drawing/2014/main" id="{DF797B74-E645-46F4-8F77-49AF7F0D443F}"/>
+                <a16:creationId xmlns:a16="http://schemas.microsoft.com/office/drawing/2014/main" id="{DF797B74-E645-46F4-8F77-49AF7F0D443F}"/>
               </a:ext>
             </a:extLst>
           </p:cNvPr>
@@ -9968,7 +9871,7 @@
           <p:cNvPr id="7" name="Footer Placeholder 6">
             <a:extLst>
               <a:ext uri="{FF2B5EF4-FFF2-40B4-BE49-F238E27FC236}">
-                <a16:creationId xmlns="" xmlns:a16="http://schemas.microsoft.com/office/drawing/2014/main" id="{A557D1A2-E2DD-4CD8-B7DB-2864D4A97E02}"/>
+                <a16:creationId xmlns:a16="http://schemas.microsoft.com/office/drawing/2014/main" id="{A557D1A2-E2DD-4CD8-B7DB-2864D4A97E02}"/>
               </a:ext>
             </a:extLst>
           </p:cNvPr>
@@ -10001,7 +9904,7 @@
           <p:cNvPr id="8" name="Slide Number Placeholder 7">
             <a:extLst>
               <a:ext uri="{FF2B5EF4-FFF2-40B4-BE49-F238E27FC236}">
-                <a16:creationId xmlns="" xmlns:a16="http://schemas.microsoft.com/office/drawing/2014/main" id="{86B08B7A-4219-4973-8C9B-BF5BCC64480F}"/>
+                <a16:creationId xmlns:a16="http://schemas.microsoft.com/office/drawing/2014/main" id="{86B08B7A-4219-4973-8C9B-BF5BCC64480F}"/>
               </a:ext>
             </a:extLst>
           </p:cNvPr>
@@ -10031,7 +9934,7 @@
           <p:cNvPr id="9" name="Freeform: Shape 8">
             <a:extLst>
               <a:ext uri="{FF2B5EF4-FFF2-40B4-BE49-F238E27FC236}">
-                <a16:creationId xmlns="" xmlns:a16="http://schemas.microsoft.com/office/drawing/2014/main" id="{C6E75A4B-2655-4B0E-8D3B-0068F57D3D9B}"/>
+                <a16:creationId xmlns:a16="http://schemas.microsoft.com/office/drawing/2014/main" id="{C6E75A4B-2655-4B0E-8D3B-0068F57D3D9B}"/>
               </a:ext>
             </a:extLst>
           </p:cNvPr>
@@ -10190,7 +10093,7 @@
           <p:cNvPr id="23" name="Text Placeholder 3">
             <a:extLst>
               <a:ext uri="{FF2B5EF4-FFF2-40B4-BE49-F238E27FC236}">
-                <a16:creationId xmlns="" xmlns:a16="http://schemas.microsoft.com/office/drawing/2014/main" id="{0A18EF7D-14D0-4362-B8BD-722D3D54D429}"/>
+                <a16:creationId xmlns:a16="http://schemas.microsoft.com/office/drawing/2014/main" id="{0A18EF7D-14D0-4362-B8BD-722D3D54D429}"/>
               </a:ext>
             </a:extLst>
           </p:cNvPr>
@@ -10272,7 +10175,7 @@
           <p:cNvPr id="11" name="Rectangle 10">
             <a:extLst>
               <a:ext uri="{FF2B5EF4-FFF2-40B4-BE49-F238E27FC236}">
-                <a16:creationId xmlns="" xmlns:a16="http://schemas.microsoft.com/office/drawing/2014/main" id="{567FF01B-795B-4F5D-87AF-6CAA8DD5D48A}"/>
+                <a16:creationId xmlns:a16="http://schemas.microsoft.com/office/drawing/2014/main" id="{567FF01B-795B-4F5D-87AF-6CAA8DD5D48A}"/>
               </a:ext>
             </a:extLst>
           </p:cNvPr>
@@ -10330,7 +10233,7 @@
           <p:cNvPr id="21" name="Text Placeholder 3">
             <a:extLst>
               <a:ext uri="{FF2B5EF4-FFF2-40B4-BE49-F238E27FC236}">
-                <a16:creationId xmlns="" xmlns:a16="http://schemas.microsoft.com/office/drawing/2014/main" id="{7A3E4BF3-C44A-4FB6-B64A-05FB5AEC7577}"/>
+                <a16:creationId xmlns:a16="http://schemas.microsoft.com/office/drawing/2014/main" id="{7A3E4BF3-C44A-4FB6-B64A-05FB5AEC7577}"/>
               </a:ext>
             </a:extLst>
           </p:cNvPr>
@@ -10374,7 +10277,7 @@
           <p:cNvPr id="7" name="Footer Placeholder 6">
             <a:extLst>
               <a:ext uri="{FF2B5EF4-FFF2-40B4-BE49-F238E27FC236}">
-                <a16:creationId xmlns="" xmlns:a16="http://schemas.microsoft.com/office/drawing/2014/main" id="{A557D1A2-E2DD-4CD8-B7DB-2864D4A97E02}"/>
+                <a16:creationId xmlns:a16="http://schemas.microsoft.com/office/drawing/2014/main" id="{A557D1A2-E2DD-4CD8-B7DB-2864D4A97E02}"/>
               </a:ext>
             </a:extLst>
           </p:cNvPr>
@@ -10399,7 +10302,7 @@
           <p:cNvPr id="8" name="Slide Number Placeholder 7">
             <a:extLst>
               <a:ext uri="{FF2B5EF4-FFF2-40B4-BE49-F238E27FC236}">
-                <a16:creationId xmlns="" xmlns:a16="http://schemas.microsoft.com/office/drawing/2014/main" id="{86B08B7A-4219-4973-8C9B-BF5BCC64480F}"/>
+                <a16:creationId xmlns:a16="http://schemas.microsoft.com/office/drawing/2014/main" id="{86B08B7A-4219-4973-8C9B-BF5BCC64480F}"/>
               </a:ext>
             </a:extLst>
           </p:cNvPr>
@@ -10429,7 +10332,7 @@
           <p:cNvPr id="3" name="Title 2">
             <a:extLst>
               <a:ext uri="{FF2B5EF4-FFF2-40B4-BE49-F238E27FC236}">
-                <a16:creationId xmlns="" xmlns:a16="http://schemas.microsoft.com/office/drawing/2014/main" id="{72F32FC1-1FF6-4874-9835-EB1A90F7E9F5}"/>
+                <a16:creationId xmlns:a16="http://schemas.microsoft.com/office/drawing/2014/main" id="{72F32FC1-1FF6-4874-9835-EB1A90F7E9F5}"/>
               </a:ext>
             </a:extLst>
           </p:cNvPr>
@@ -10457,7 +10360,7 @@
           <p:cNvPr id="10" name="Freeform: Shape 9">
             <a:extLst>
               <a:ext uri="{FF2B5EF4-FFF2-40B4-BE49-F238E27FC236}">
-                <a16:creationId xmlns="" xmlns:a16="http://schemas.microsoft.com/office/drawing/2014/main" id="{83039E70-36A3-46C1-B30E-CA4CC0B36C5D}"/>
+                <a16:creationId xmlns:a16="http://schemas.microsoft.com/office/drawing/2014/main" id="{83039E70-36A3-46C1-B30E-CA4CC0B36C5D}"/>
               </a:ext>
             </a:extLst>
           </p:cNvPr>
@@ -10659,7 +10562,7 @@
           <p:cNvPr id="2" name="Title Placeholder 1">
             <a:extLst>
               <a:ext uri="{FF2B5EF4-FFF2-40B4-BE49-F238E27FC236}">
-                <a16:creationId xmlns="" xmlns:a16="http://schemas.microsoft.com/office/drawing/2014/main" id="{59A5246D-ECE9-473C-953D-D56C3F7B32F8}"/>
+                <a16:creationId xmlns:a16="http://schemas.microsoft.com/office/drawing/2014/main" id="{59A5246D-ECE9-473C-953D-D56C3F7B32F8}"/>
               </a:ext>
             </a:extLst>
           </p:cNvPr>
@@ -10698,7 +10601,7 @@
           <p:cNvPr id="3" name="Text Placeholder 2">
             <a:extLst>
               <a:ext uri="{FF2B5EF4-FFF2-40B4-BE49-F238E27FC236}">
-                <a16:creationId xmlns="" xmlns:a16="http://schemas.microsoft.com/office/drawing/2014/main" id="{65D946F0-677D-45B4-83B9-FD3BD3FFCA3C}"/>
+                <a16:creationId xmlns:a16="http://schemas.microsoft.com/office/drawing/2014/main" id="{65D946F0-677D-45B4-83B9-FD3BD3FFCA3C}"/>
               </a:ext>
             </a:extLst>
           </p:cNvPr>
@@ -10765,7 +10668,7 @@
           <p:cNvPr id="5" name="Footer Placeholder 4">
             <a:extLst>
               <a:ext uri="{FF2B5EF4-FFF2-40B4-BE49-F238E27FC236}">
-                <a16:creationId xmlns="" xmlns:a16="http://schemas.microsoft.com/office/drawing/2014/main" id="{1445BE21-FA72-48F5-9A53-134902BF63DC}"/>
+                <a16:creationId xmlns:a16="http://schemas.microsoft.com/office/drawing/2014/main" id="{1445BE21-FA72-48F5-9A53-134902BF63DC}"/>
               </a:ext>
             </a:extLst>
           </p:cNvPr>
@@ -10808,7 +10711,7 @@
           <p:cNvPr id="6" name="Slide Number Placeholder 5">
             <a:extLst>
               <a:ext uri="{FF2B5EF4-FFF2-40B4-BE49-F238E27FC236}">
-                <a16:creationId xmlns="" xmlns:a16="http://schemas.microsoft.com/office/drawing/2014/main" id="{70F79B29-5421-49A7-A511-D916B66A8890}"/>
+                <a16:creationId xmlns:a16="http://schemas.microsoft.com/office/drawing/2014/main" id="{70F79B29-5421-49A7-A511-D916B66A8890}"/>
               </a:ext>
             </a:extLst>
           </p:cNvPr>
@@ -11215,7 +11118,7 @@
           <p:cNvPr id="14" name="Picture Placeholder 13">
             <a:extLst>
               <a:ext uri="{FF2B5EF4-FFF2-40B4-BE49-F238E27FC236}">
-                <a16:creationId xmlns="" xmlns:a16="http://schemas.microsoft.com/office/drawing/2014/main" id="{8F02F647-7DBC-4618-AFF3-8CED69C5CDEF}"/>
+                <a16:creationId xmlns:a16="http://schemas.microsoft.com/office/drawing/2014/main" id="{8F02F647-7DBC-4618-AFF3-8CED69C5CDEF}"/>
               </a:ext>
             </a:extLst>
           </p:cNvPr>
@@ -11250,7 +11153,7 @@
           <p:cNvPr id="3" name="Title 2">
             <a:extLst>
               <a:ext uri="{FF2B5EF4-FFF2-40B4-BE49-F238E27FC236}">
-                <a16:creationId xmlns="" xmlns:a16="http://schemas.microsoft.com/office/drawing/2014/main" id="{B8D8E648-93B0-47FF-A306-492EFF7FC499}"/>
+                <a16:creationId xmlns:a16="http://schemas.microsoft.com/office/drawing/2014/main" id="{B8D8E648-93B0-47FF-A306-492EFF7FC499}"/>
               </a:ext>
             </a:extLst>
           </p:cNvPr>
@@ -11261,7 +11164,12 @@
             <p:ph type="ctrTitle"/>
           </p:nvPr>
         </p:nvSpPr>
-        <p:spPr/>
+        <p:spPr>
+          <a:xfrm>
+            <a:off x="2520000" y="0"/>
+            <a:ext cx="9672000" cy="6857999"/>
+          </a:xfrm>
+        </p:spPr>
         <p:txBody>
           <a:bodyPr/>
           <a:lstStyle/>
@@ -11272,21 +11180,16 @@
               </a:lnSpc>
             </a:pPr>
             <a:r>
-              <a:rPr lang="en-US" dirty="0" err="1" smtClean="0"/>
+              <a:rPr lang="en-US" dirty="0" err="1"/>
               <a:t>Anheuser-BusCh</a:t>
-            </a:r>
-            <a:r>
-              <a:rPr lang="en-US" dirty="0"/>
-              <a:t/>
             </a:r>
             <a:br>
               <a:rPr lang="en-US" dirty="0"/>
             </a:br>
             <a:r>
-              <a:rPr lang="en-US" dirty="0" smtClean="0"/>
+              <a:rPr lang="en-US" dirty="0"/>
               <a:t>Market analysis</a:t>
             </a:r>
-            <a:endParaRPr lang="en-US" dirty="0"/>
           </a:p>
         </p:txBody>
       </p:sp>
@@ -11295,7 +11198,7 @@
           <p:cNvPr id="4" name="Subtitle 3">
             <a:extLst>
               <a:ext uri="{FF2B5EF4-FFF2-40B4-BE49-F238E27FC236}">
-                <a16:creationId xmlns="" xmlns:a16="http://schemas.microsoft.com/office/drawing/2014/main" id="{64857D70-F12B-4E1B-99F8-92DAD4349846}"/>
+                <a16:creationId xmlns:a16="http://schemas.microsoft.com/office/drawing/2014/main" id="{64857D70-F12B-4E1B-99F8-92DAD4349846}"/>
               </a:ext>
             </a:extLst>
           </p:cNvPr>
@@ -11308,8 +11211,8 @@
         </p:nvSpPr>
         <p:spPr>
           <a:xfrm>
-            <a:off x="3599999" y="4276447"/>
-            <a:ext cx="3492000" cy="620016"/>
+            <a:off x="3903024" y="4196909"/>
+            <a:ext cx="4692230" cy="946905"/>
           </a:xfrm>
           <a:gradFill>
             <a:gsLst>
@@ -11328,18 +11231,13 @@
           <a:lstStyle/>
           <a:p>
             <a:r>
-              <a:rPr lang="en-US" dirty="0" smtClean="0">
+              <a:rPr lang="en-US" dirty="0">
                 <a:solidFill>
                   <a:schemeClr val="bg1"/>
                 </a:solidFill>
               </a:rPr>
-              <a:t>Blake and Schwan</a:t>
-            </a:r>
-            <a:endParaRPr lang="en-US" dirty="0">
-              <a:solidFill>
-                <a:schemeClr val="bg1"/>
-              </a:solidFill>
-            </a:endParaRPr>
+              <a:t>Blake Holmes and Mel Schwan</a:t>
+            </a:r>
           </a:p>
         </p:txBody>
       </p:sp>
@@ -11348,7 +11246,7 @@
           <p:cNvPr id="5" name="object 7" descr="Beige rectangle">
             <a:extLst>
               <a:ext uri="{FF2B5EF4-FFF2-40B4-BE49-F238E27FC236}">
-                <a16:creationId xmlns="" xmlns:a16="http://schemas.microsoft.com/office/drawing/2014/main" id="{C85C272F-FCB2-478D-9E03-EC734D1AB6C0}"/>
+                <a16:creationId xmlns:a16="http://schemas.microsoft.com/office/drawing/2014/main" id="{C85C272F-FCB2-478D-9E03-EC734D1AB6C0}"/>
               </a:ext>
             </a:extLst>
           </p:cNvPr>
@@ -11396,10 +11294,10 @@
           <p:cNvPr id="15" name="Rectangle 14">
             <a:extLst>
               <a:ext uri="{FF2B5EF4-FFF2-40B4-BE49-F238E27FC236}">
-                <a16:creationId xmlns="" xmlns:a16="http://schemas.microsoft.com/office/drawing/2014/main" id="{DA136CB0-4ED9-43FA-81D5-6D3225795A7D}"/>
+                <a16:creationId xmlns:a16="http://schemas.microsoft.com/office/drawing/2014/main" id="{DA136CB0-4ED9-43FA-81D5-6D3225795A7D}"/>
               </a:ext>
               <a:ext uri="{C183D7F6-B498-43B3-948B-1728B52AA6E4}">
-                <adec:decorative xmlns="" xmlns:adec="http://schemas.microsoft.com/office/drawing/2017/decorative" val="1"/>
+                <adec:decorative xmlns:adec="http://schemas.microsoft.com/office/drawing/2017/decorative" val="1"/>
               </a:ext>
             </a:extLst>
           </p:cNvPr>
@@ -11483,7 +11381,7 @@
           <p:cNvPr id="28" name="Picture Placeholder 27" descr="Woman walking through a door">
             <a:extLst>
               <a:ext uri="{FF2B5EF4-FFF2-40B4-BE49-F238E27FC236}">
-                <a16:creationId xmlns="" xmlns:a16="http://schemas.microsoft.com/office/drawing/2014/main" id="{86D7D4AC-BE7B-45B9-AF4A-E2AF1B6C796D}"/>
+                <a16:creationId xmlns:a16="http://schemas.microsoft.com/office/drawing/2014/main" id="{86D7D4AC-BE7B-45B9-AF4A-E2AF1B6C796D}"/>
               </a:ext>
             </a:extLst>
           </p:cNvPr>
@@ -11517,10 +11415,10 @@
           <p:cNvPr id="15" name="Rectangle 14">
             <a:extLst>
               <a:ext uri="{FF2B5EF4-FFF2-40B4-BE49-F238E27FC236}">
-                <a16:creationId xmlns="" xmlns:a16="http://schemas.microsoft.com/office/drawing/2014/main" id="{DD509E5E-F68C-4F2B-8EC7-4325958603E7}"/>
+                <a16:creationId xmlns:a16="http://schemas.microsoft.com/office/drawing/2014/main" id="{DD509E5E-F68C-4F2B-8EC7-4325958603E7}"/>
               </a:ext>
               <a:ext uri="{C183D7F6-B498-43B3-948B-1728B52AA6E4}">
-                <adec:decorative xmlns="" xmlns:adec="http://schemas.microsoft.com/office/drawing/2017/decorative" val="1"/>
+                <adec:decorative xmlns:adec="http://schemas.microsoft.com/office/drawing/2017/decorative" val="1"/>
               </a:ext>
             </a:extLst>
           </p:cNvPr>
@@ -11574,7 +11472,7 @@
           <p:cNvPr id="4" name="Text Placeholder 3">
             <a:extLst>
               <a:ext uri="{FF2B5EF4-FFF2-40B4-BE49-F238E27FC236}">
-                <a16:creationId xmlns="" xmlns:a16="http://schemas.microsoft.com/office/drawing/2014/main" id="{9AF7E39F-041F-4A45-A1CF-F8C269887D5A}"/>
+                <a16:creationId xmlns:a16="http://schemas.microsoft.com/office/drawing/2014/main" id="{9AF7E39F-041F-4A45-A1CF-F8C269887D5A}"/>
               </a:ext>
             </a:extLst>
           </p:cNvPr>
@@ -11608,18 +11506,10 @@
           <a:p>
             <a:r>
               <a:rPr lang="en-US" sz="1800" dirty="0"/>
-              <a:t>Our mission </a:t>
-            </a:r>
-            <a:r>
-              <a:rPr lang="en-US" sz="1800" dirty="0" smtClean="0"/>
-              <a:t>is to analyze Anheuser-Busch’s competition</a:t>
-            </a:r>
-          </a:p>
-          <a:p>
-            <a:r>
-              <a:rPr lang="en-US" sz="1800" dirty="0" smtClean="0"/>
-              <a:t>OPTIMAL opportunities in the craft beer market</a:t>
-            </a:r>
+              <a:t>Our mission is to analyze Anheuser-Busch’s brewery and beers looking for opportunities in the craft beer market</a:t>
+            </a:r>
+          </a:p>
+          <a:p>
             <a:endParaRPr lang="en-US" sz="1800" dirty="0"/>
           </a:p>
         </p:txBody>
@@ -11629,7 +11519,7 @@
           <p:cNvPr id="3" name="Title 2">
             <a:extLst>
               <a:ext uri="{FF2B5EF4-FFF2-40B4-BE49-F238E27FC236}">
-                <a16:creationId xmlns="" xmlns:a16="http://schemas.microsoft.com/office/drawing/2014/main" id="{E9BE4A06-2673-41EF-AF84-96B0EDEC0F01}"/>
+                <a16:creationId xmlns:a16="http://schemas.microsoft.com/office/drawing/2014/main" id="{E9BE4A06-2673-41EF-AF84-96B0EDEC0F01}"/>
               </a:ext>
             </a:extLst>
           </p:cNvPr>
@@ -11651,10 +11541,9 @@
           <a:lstStyle/>
           <a:p>
             <a:r>
-              <a:rPr lang="en-US" sz="3600" dirty="0" smtClean="0"/>
-              <a:t>Brewer and beer style forecast</a:t>
-            </a:r>
-            <a:endParaRPr lang="en-US" sz="3600" dirty="0"/>
+              <a:rPr lang="en-US" sz="3600" dirty="0"/>
+              <a:t>Brewer and beer Data Analysis </a:t>
+            </a:r>
           </a:p>
         </p:txBody>
       </p:sp>
@@ -11663,7 +11552,7 @@
           <p:cNvPr id="9" name="object 7" descr="Beige rectangle">
             <a:extLst>
               <a:ext uri="{FF2B5EF4-FFF2-40B4-BE49-F238E27FC236}">
-                <a16:creationId xmlns="" xmlns:a16="http://schemas.microsoft.com/office/drawing/2014/main" id="{400AB11A-4D5E-4CDE-BB60-C8578F59C3E0}"/>
+                <a16:creationId xmlns:a16="http://schemas.microsoft.com/office/drawing/2014/main" id="{400AB11A-4D5E-4CDE-BB60-C8578F59C3E0}"/>
               </a:ext>
             </a:extLst>
           </p:cNvPr>
@@ -11711,10 +11600,10 @@
           <p:cNvPr id="48" name="Rectangle 47">
             <a:extLst>
               <a:ext uri="{FF2B5EF4-FFF2-40B4-BE49-F238E27FC236}">
-                <a16:creationId xmlns="" xmlns:a16="http://schemas.microsoft.com/office/drawing/2014/main" id="{C3FC51DE-D10A-4DE8-A7E3-22FA2E4FC194}"/>
+                <a16:creationId xmlns:a16="http://schemas.microsoft.com/office/drawing/2014/main" id="{C3FC51DE-D10A-4DE8-A7E3-22FA2E4FC194}"/>
               </a:ext>
               <a:ext uri="{C183D7F6-B498-43B3-948B-1728B52AA6E4}">
-                <adec:decorative xmlns="" xmlns:adec="http://schemas.microsoft.com/office/drawing/2017/decorative" val="1"/>
+                <adec:decorative xmlns:adec="http://schemas.microsoft.com/office/drawing/2017/decorative" val="1"/>
               </a:ext>
             </a:extLst>
           </p:cNvPr>
@@ -11768,7 +11657,7 @@
           <p:cNvPr id="52" name="Slide Number Placeholder 51">
             <a:extLst>
               <a:ext uri="{FF2B5EF4-FFF2-40B4-BE49-F238E27FC236}">
-                <a16:creationId xmlns="" xmlns:a16="http://schemas.microsoft.com/office/drawing/2014/main" id="{947A81F6-261F-44F4-B660-7BD323AE2991}"/>
+                <a16:creationId xmlns:a16="http://schemas.microsoft.com/office/drawing/2014/main" id="{947A81F6-261F-44F4-B660-7BD323AE2991}"/>
               </a:ext>
             </a:extLst>
           </p:cNvPr>
@@ -11839,10 +11728,9 @@
           <a:lstStyle/>
           <a:p>
             <a:r>
-              <a:rPr lang="en-US" dirty="0" smtClean="0"/>
+              <a:rPr lang="en-US" dirty="0"/>
               <a:t>Agenda</a:t>
             </a:r>
-            <a:endParaRPr lang="en-US" dirty="0"/>
           </a:p>
         </p:txBody>
       </p:sp>
@@ -11879,7 +11767,7 @@
         <p:spPr>
           <a:xfrm>
             <a:off x="684000" y="2470768"/>
-            <a:ext cx="8410754" cy="4247317"/>
+            <a:ext cx="8410754" cy="2118529"/>
           </a:xfrm>
           <a:prstGeom prst="rect">
             <a:avLst/>
@@ -11900,8 +11788,8 @@
               <a:buChar char="•"/>
             </a:pPr>
             <a:r>
-              <a:rPr lang="en-US" b="1" dirty="0" smtClean="0"/>
-              <a:t>What and how did we produce this market analysis?</a:t>
+              <a:rPr lang="en-US" b="1" dirty="0"/>
+              <a:t>What kinds of beer are being produced?</a:t>
             </a:r>
           </a:p>
           <a:p>
@@ -11913,8 +11801,8 @@
               <a:buChar char="•"/>
             </a:pPr>
             <a:r>
-              <a:rPr lang="en-US" b="1" dirty="0" smtClean="0"/>
-              <a:t>What is your competition?</a:t>
+              <a:rPr lang="en-US" b="1" dirty="0"/>
+              <a:t>Where are the beers being produced?</a:t>
             </a:r>
           </a:p>
           <a:p>
@@ -11926,8 +11814,8 @@
               <a:buChar char="•"/>
             </a:pPr>
             <a:r>
-              <a:rPr lang="en-US" b="1" dirty="0" smtClean="0"/>
-              <a:t>What kind of beer are they producing?</a:t>
+              <a:rPr lang="en-US" b="1" dirty="0"/>
+              <a:t>What is the relationship between the ABV and IBU values?</a:t>
             </a:r>
           </a:p>
           <a:p>
@@ -11939,8 +11827,8 @@
               <a:buChar char="•"/>
             </a:pPr>
             <a:r>
-              <a:rPr lang="en-US" b="1" dirty="0" smtClean="0"/>
-              <a:t>What issue did we find in your data?</a:t>
+              <a:rPr lang="en-US" b="1" dirty="0"/>
+              <a:t>What market opportunities should be explored? </a:t>
             </a:r>
           </a:p>
           <a:p>
@@ -11952,76 +11840,9 @@
               <a:buChar char="•"/>
             </a:pPr>
             <a:r>
-              <a:rPr lang="en-US" b="1" dirty="0" smtClean="0"/>
-              <a:t>What style and where are your competitors producing beers?</a:t>
-            </a:r>
-          </a:p>
-          <a:p>
-            <a:pPr marL="285750" indent="-285750">
-              <a:lnSpc>
-                <a:spcPct val="150000"/>
-              </a:lnSpc>
-              <a:buFont typeface="Arial" panose="020B0604020202020204" pitchFamily="34" charset="0"/>
-              <a:buChar char="•"/>
-            </a:pPr>
-            <a:r>
-              <a:rPr lang="en-US" b="1" dirty="0" smtClean="0"/>
-              <a:t>What states does the ABV and IBU matter?</a:t>
-            </a:r>
-          </a:p>
-          <a:p>
-            <a:pPr marL="285750" indent="-285750">
-              <a:lnSpc>
-                <a:spcPct val="150000"/>
-              </a:lnSpc>
-              <a:buFont typeface="Arial" panose="020B0604020202020204" pitchFamily="34" charset="0"/>
-              <a:buChar char="•"/>
-            </a:pPr>
-            <a:r>
-              <a:rPr lang="en-US" b="1" dirty="0" smtClean="0"/>
-              <a:t>What ABV metrics are available?</a:t>
-            </a:r>
-          </a:p>
-          <a:p>
-            <a:pPr marL="285750" indent="-285750">
-              <a:lnSpc>
-                <a:spcPct val="150000"/>
-              </a:lnSpc>
-              <a:buFont typeface="Arial" panose="020B0604020202020204" pitchFamily="34" charset="0"/>
-              <a:buChar char="•"/>
-            </a:pPr>
-            <a:r>
-              <a:rPr lang="en-US" b="1" dirty="0" smtClean="0"/>
-              <a:t>What is the relationship between the ABV and IBU values?</a:t>
-            </a:r>
-            <a:endParaRPr lang="en-US" b="1" dirty="0"/>
-          </a:p>
-          <a:p>
-            <a:pPr marL="285750" indent="-285750">
-              <a:lnSpc>
-                <a:spcPct val="150000"/>
-              </a:lnSpc>
-              <a:buFont typeface="Arial" panose="020B0604020202020204" pitchFamily="34" charset="0"/>
-              <a:buChar char="•"/>
-            </a:pPr>
-            <a:r>
-              <a:rPr lang="en-US" b="1" dirty="0" smtClean="0"/>
-              <a:t>What conclusion have we come to?</a:t>
-            </a:r>
-          </a:p>
-          <a:p>
-            <a:pPr marL="285750" indent="-285750">
-              <a:lnSpc>
-                <a:spcPct val="150000"/>
-              </a:lnSpc>
-              <a:buFont typeface="Arial" panose="020B0604020202020204" pitchFamily="34" charset="0"/>
-              <a:buChar char="•"/>
-            </a:pPr>
-            <a:r>
-              <a:rPr lang="en-US" b="1" dirty="0" smtClean="0"/>
+              <a:rPr lang="en-US" b="1" dirty="0"/>
               <a:t>What can be done in future market analysis with the right data? </a:t>
             </a:r>
-            <a:endParaRPr lang="en-US" b="1" dirty="0"/>
           </a:p>
         </p:txBody>
       </p:sp>
@@ -12029,295 +11850,6 @@
     <p:extLst>
       <p:ext uri="{BB962C8B-B14F-4D97-AF65-F5344CB8AC3E}">
         <p14:creationId xmlns:p14="http://schemas.microsoft.com/office/powerpoint/2010/main" val="2687999859"/>
-      </p:ext>
-    </p:extLst>
-  </p:cSld>
-  <p:clrMapOvr>
-    <a:masterClrMapping/>
-  </p:clrMapOvr>
-</p:sld>
-</file>
-
-<file path=ppt/slides/slide4.xml><?xml version="1.0" encoding="utf-8"?>
-<p:sld xmlns:a="http://schemas.openxmlformats.org/drawingml/2006/main" xmlns:r="http://schemas.openxmlformats.org/officeDocument/2006/relationships" xmlns:p="http://schemas.openxmlformats.org/presentationml/2006/main">
-  <p:cSld>
-    <p:spTree>
-      <p:nvGrpSpPr>
-        <p:cNvPr id="1" name=""/>
-        <p:cNvGrpSpPr/>
-        <p:nvPr/>
-      </p:nvGrpSpPr>
-      <p:grpSpPr>
-        <a:xfrm>
-          <a:off x="0" y="0"/>
-          <a:ext cx="0" cy="0"/>
-          <a:chOff x="0" y="0"/>
-          <a:chExt cx="0" cy="0"/>
-        </a:xfrm>
-      </p:grpSpPr>
-      <p:pic>
-        <p:nvPicPr>
-          <p:cNvPr id="7" name="Picture Placeholder 6" descr="Group of people in a science lab working">
-            <a:extLst>
-              <a:ext uri="{FF2B5EF4-FFF2-40B4-BE49-F238E27FC236}">
-                <a16:creationId xmlns="" xmlns:a16="http://schemas.microsoft.com/office/drawing/2014/main" id="{634673D1-FDF8-445C-9EC3-CEE2865DFD8A}"/>
-              </a:ext>
-            </a:extLst>
-          </p:cNvPr>
-          <p:cNvPicPr>
-            <a:picLocks noGrp="1" noChangeAspect="1"/>
-          </p:cNvPicPr>
-          <p:nvPr>
-            <p:ph type="pic" sz="quarter" idx="12"/>
-          </p:nvPr>
-        </p:nvPicPr>
-        <p:blipFill>
-          <a:blip r:embed="rId3" cstate="screen">
-            <a:extLst>
-              <a:ext uri="{28A0092B-C50C-407E-A947-70E740481C1C}">
-                <a14:useLocalDpi xmlns:a14="http://schemas.microsoft.com/office/drawing/2010/main"/>
-              </a:ext>
-            </a:extLst>
-          </a:blip>
-          <a:srcRect/>
-          <a:stretch>
-            <a:fillRect/>
-          </a:stretch>
-        </p:blipFill>
-        <p:spPr>
-          <a:xfrm>
-            <a:off x="180000" y="179109"/>
-            <a:ext cx="11832000" cy="6513922"/>
-          </a:xfrm>
-        </p:spPr>
-      </p:pic>
-      <p:sp>
-        <p:nvSpPr>
-          <p:cNvPr id="8" name="Rectangle 7">
-            <a:extLst>
-              <a:ext uri="{FF2B5EF4-FFF2-40B4-BE49-F238E27FC236}">
-                <a16:creationId xmlns="" xmlns:a16="http://schemas.microsoft.com/office/drawing/2014/main" id="{5D25444F-B85F-42E8-9E0A-A625CA1FDA16}"/>
-              </a:ext>
-              <a:ext uri="{C183D7F6-B498-43B3-948B-1728B52AA6E4}">
-                <adec:decorative xmlns="" xmlns:adec="http://schemas.microsoft.com/office/drawing/2017/decorative" val="1"/>
-              </a:ext>
-            </a:extLst>
-          </p:cNvPr>
-          <p:cNvSpPr/>
-          <p:nvPr/>
-        </p:nvSpPr>
-        <p:spPr>
-          <a:xfrm>
-            <a:off x="180000" y="179109"/>
-            <a:ext cx="11832000" cy="6513922"/>
-          </a:xfrm>
-          <a:prstGeom prst="rect">
-            <a:avLst/>
-          </a:prstGeom>
-          <a:solidFill>
-            <a:schemeClr val="tx2">
-              <a:alpha val="90000"/>
-            </a:schemeClr>
-          </a:solidFill>
-          <a:ln>
-            <a:noFill/>
-          </a:ln>
-        </p:spPr>
-        <p:style>
-          <a:lnRef idx="2">
-            <a:schemeClr val="accent1">
-              <a:shade val="50000"/>
-            </a:schemeClr>
-          </a:lnRef>
-          <a:fillRef idx="1">
-            <a:schemeClr val="accent1"/>
-          </a:fillRef>
-          <a:effectRef idx="0">
-            <a:schemeClr val="accent1"/>
-          </a:effectRef>
-          <a:fontRef idx="minor">
-            <a:schemeClr val="lt1"/>
-          </a:fontRef>
-        </p:style>
-        <p:txBody>
-          <a:bodyPr rtlCol="0" anchor="ctr"/>
-          <a:lstStyle/>
-          <a:p>
-            <a:pPr algn="ctr"/>
-            <a:endParaRPr lang="en-US" dirty="0"/>
-          </a:p>
-        </p:txBody>
-      </p:sp>
-      <p:sp>
-        <p:nvSpPr>
-          <p:cNvPr id="3" name="Title 2">
-            <a:extLst>
-              <a:ext uri="{FF2B5EF4-FFF2-40B4-BE49-F238E27FC236}">
-                <a16:creationId xmlns="" xmlns:a16="http://schemas.microsoft.com/office/drawing/2014/main" id="{8AD0FB06-2085-443B-B5B7-9CF837FCEA61}"/>
-              </a:ext>
-            </a:extLst>
-          </p:cNvPr>
-          <p:cNvSpPr>
-            <a:spLocks noGrp="1"/>
-          </p:cNvSpPr>
-          <p:nvPr>
-            <p:ph type="title"/>
-          </p:nvPr>
-        </p:nvSpPr>
-        <p:spPr/>
-        <p:txBody>
-          <a:bodyPr/>
-          <a:lstStyle/>
-          <a:p>
-            <a:r>
-              <a:rPr lang="en-US" dirty="0" smtClean="0"/>
-              <a:t>Market statistics tools</a:t>
-            </a:r>
-            <a:endParaRPr lang="en-US" dirty="0"/>
-          </a:p>
-        </p:txBody>
-      </p:sp>
-      <p:sp>
-        <p:nvSpPr>
-          <p:cNvPr id="4" name="Slide Number Placeholder 3">
-            <a:extLst>
-              <a:ext uri="{FF2B5EF4-FFF2-40B4-BE49-F238E27FC236}">
-                <a16:creationId xmlns="" xmlns:a16="http://schemas.microsoft.com/office/drawing/2014/main" id="{3B609C69-D3CD-4837-8831-CFA5A72454EF}"/>
-              </a:ext>
-            </a:extLst>
-          </p:cNvPr>
-          <p:cNvSpPr>
-            <a:spLocks noGrp="1"/>
-          </p:cNvSpPr>
-          <p:nvPr>
-            <p:ph type="sldNum" sz="quarter" idx="11"/>
-          </p:nvPr>
-        </p:nvSpPr>
-        <p:spPr/>
-        <p:txBody>
-          <a:bodyPr/>
-          <a:lstStyle/>
-          <a:p>
-            <a:fld id="{EECC7194-A4D0-457B-9D3E-53681723AFF7}" type="slidenum">
-              <a:rPr lang="en-US" smtClean="0"/>
-              <a:pPr/>
-              <a:t>4</a:t>
-            </a:fld>
-            <a:endParaRPr lang="en-US" dirty="0"/>
-          </a:p>
-        </p:txBody>
-      </p:sp>
-      <p:sp>
-        <p:nvSpPr>
-          <p:cNvPr id="5" name="Text Placeholder 4">
-            <a:extLst>
-              <a:ext uri="{FF2B5EF4-FFF2-40B4-BE49-F238E27FC236}">
-                <a16:creationId xmlns="" xmlns:a16="http://schemas.microsoft.com/office/drawing/2014/main" id="{0E2C3F0E-4EA4-4D41-8E53-5D29742851DB}"/>
-              </a:ext>
-            </a:extLst>
-          </p:cNvPr>
-          <p:cNvSpPr>
-            <a:spLocks noGrp="1"/>
-          </p:cNvSpPr>
-          <p:nvPr>
-            <p:ph type="body" sz="quarter" idx="13"/>
-          </p:nvPr>
-        </p:nvSpPr>
-        <p:spPr/>
-        <p:txBody>
-          <a:bodyPr/>
-          <a:lstStyle/>
-          <a:p>
-            <a:r>
-              <a:rPr lang="en-US" dirty="0" smtClean="0"/>
-              <a:t>R Language used by the majority of data scientist</a:t>
-            </a:r>
-            <a:endParaRPr lang="en-US" dirty="0"/>
-          </a:p>
-        </p:txBody>
-      </p:sp>
-      <p:sp>
-        <p:nvSpPr>
-          <p:cNvPr id="9" name="object 7" descr="Beige rectangle">
-            <a:extLst>
-              <a:ext uri="{FF2B5EF4-FFF2-40B4-BE49-F238E27FC236}">
-                <a16:creationId xmlns="" xmlns:a16="http://schemas.microsoft.com/office/drawing/2014/main" id="{C18D4C80-3351-4CE2-81E2-859CB0ED6E33}"/>
-              </a:ext>
-            </a:extLst>
-          </p:cNvPr>
-          <p:cNvSpPr/>
-          <p:nvPr/>
-        </p:nvSpPr>
-        <p:spPr bwMode="white">
-          <a:xfrm flipV="1">
-            <a:off x="714343" y="1275098"/>
-            <a:ext cx="6024479" cy="45719"/>
-          </a:xfrm>
-          <a:custGeom>
-            <a:avLst/>
-            <a:gdLst/>
-            <a:ahLst/>
-            <a:cxnLst/>
-            <a:rect l="l" t="t" r="r" b="b"/>
-            <a:pathLst>
-              <a:path w="3935729">
-                <a:moveTo>
-                  <a:pt x="0" y="0"/>
-                </a:moveTo>
-                <a:lnTo>
-                  <a:pt x="3935349" y="0"/>
-                </a:lnTo>
-              </a:path>
-            </a:pathLst>
-          </a:custGeom>
-          <a:ln w="54863">
-            <a:solidFill>
-              <a:schemeClr val="accent1"/>
-            </a:solidFill>
-          </a:ln>
-        </p:spPr>
-        <p:txBody>
-          <a:bodyPr wrap="square" lIns="0" tIns="0" rIns="0" bIns="0" rtlCol="0"/>
-          <a:lstStyle/>
-          <a:p>
-            <a:endParaRPr lang="en-US" dirty="0"/>
-          </a:p>
-        </p:txBody>
-      </p:sp>
-      <p:pic>
-        <p:nvPicPr>
-          <p:cNvPr id="6" name="Picture 5"/>
-          <p:cNvPicPr>
-            <a:picLocks noChangeAspect="1"/>
-          </p:cNvPicPr>
-          <p:nvPr/>
-        </p:nvPicPr>
-        <p:blipFill>
-          <a:blip r:embed="rId4">
-            <a:extLst>
-              <a:ext uri="{28A0092B-C50C-407E-A947-70E740481C1C}">
-                <a14:useLocalDpi xmlns:a14="http://schemas.microsoft.com/office/drawing/2010/main" val="0"/>
-              </a:ext>
-            </a:extLst>
-          </a:blip>
-          <a:stretch>
-            <a:fillRect/>
-          </a:stretch>
-        </p:blipFill>
-        <p:spPr>
-          <a:xfrm>
-            <a:off x="464175" y="2246192"/>
-            <a:ext cx="11207133" cy="3291966"/>
-          </a:xfrm>
-          <a:prstGeom prst="rect">
-            <a:avLst/>
-          </a:prstGeom>
-        </p:spPr>
-      </p:pic>
-    </p:spTree>
-    <p:extLst>
-      <p:ext uri="{BB962C8B-B14F-4D97-AF65-F5344CB8AC3E}">
-        <p14:creationId xmlns:p14="http://schemas.microsoft.com/office/powerpoint/2010/main" val="3297823726"/>
       </p:ext>
     </p:extLst>
   </p:cSld>
@@ -12865,6 +12397,15 @@
 </file>
 
 <file path=customXml/item1.xml><?xml version="1.0" encoding="utf-8"?>
+<?mso-contentType ?>
+<FormTemplates xmlns="http://schemas.microsoft.com/sharepoint/v3/contenttype/forms">
+  <Display>DocumentLibraryForm</Display>
+  <Edit>DocumentLibraryForm</Edit>
+  <New>DocumentLibraryForm</New>
+</FormTemplates>
+</file>
+
+<file path=customXml/item2.xml><?xml version="1.0" encoding="utf-8"?>
 <p:properties xmlns:p="http://schemas.microsoft.com/office/2006/metadata/properties" xmlns:xsi="http://www.w3.org/2001/XMLSchema-instance" xmlns:pc="http://schemas.microsoft.com/office/infopath/2007/PartnerControls">
   <documentManagement>
     <MediaServiceKeyPoints xmlns="71af3243-3dd4-4a8d-8c0d-dd76da1f02a5" xsi:nil="true"/>
@@ -12872,7 +12413,7 @@
 </p:properties>
 </file>
 
-<file path=customXml/item2.xml><?xml version="1.0" encoding="utf-8"?>
+<file path=customXml/item3.xml><?xml version="1.0" encoding="utf-8"?>
 <ct:contentTypeSchema xmlns:ct="http://schemas.microsoft.com/office/2006/metadata/contentType" xmlns:ma="http://schemas.microsoft.com/office/2006/metadata/properties/metaAttributes" ct:_="" ma:_="" ma:contentTypeName="Document" ma:contentTypeID="0x01010079F111ED35F8CC479449609E8A0923A6" ma:contentTypeVersion="11" ma:contentTypeDescription="Create a new document." ma:contentTypeScope="" ma:versionID="9677210f24a1be23c92c90fd886aa0aa">
   <xsd:schema xmlns:xsd="http://www.w3.org/2001/XMLSchema" xmlns:xs="http://www.w3.org/2001/XMLSchema" xmlns:p="http://schemas.microsoft.com/office/2006/metadata/properties" xmlns:ns2="71af3243-3dd4-4a8d-8c0d-dd76da1f02a5" xmlns:ns3="16c05727-aa75-4e4a-9b5f-8a80a1165891" targetNamespace="http://schemas.microsoft.com/office/2006/metadata/properties" ma:root="true" ma:fieldsID="60e05723c5c1908df1a1a4ebf11d344e" ns2:_="" ns3:_="">
     <xsd:import namespace="71af3243-3dd4-4a8d-8c0d-dd76da1f02a5"/>
@@ -13083,16 +12624,15 @@
 </ct:contentTypeSchema>
 </file>
 
-<file path=customXml/item3.xml><?xml version="1.0" encoding="utf-8"?>
-<?mso-contentType ?>
-<FormTemplates xmlns="http://schemas.microsoft.com/sharepoint/v3/contenttype/forms">
-  <Display>DocumentLibraryForm</Display>
-  <Edit>DocumentLibraryForm</Edit>
-  <New>DocumentLibraryForm</New>
-</FormTemplates>
+<file path=customXml/itemProps1.xml><?xml version="1.0" encoding="utf-8"?>
+<ds:datastoreItem xmlns:ds="http://schemas.openxmlformats.org/officeDocument/2006/customXml" ds:itemID="{A3A7569E-E204-496A-95C5-F6E51FB4AB11}">
+  <ds:schemaRefs>
+    <ds:schemaRef ds:uri="http://schemas.microsoft.com/sharepoint/v3/contenttype/forms"/>
+  </ds:schemaRefs>
+</ds:datastoreItem>
 </file>
 
-<file path=customXml/itemProps1.xml><?xml version="1.0" encoding="utf-8"?>
+<file path=customXml/itemProps2.xml><?xml version="1.0" encoding="utf-8"?>
 <ds:datastoreItem xmlns:ds="http://schemas.openxmlformats.org/officeDocument/2006/customXml" ds:itemID="{BCB5A128-369C-4902-8D4C-DC78A7EDE1C2}">
   <ds:schemaRefs>
     <ds:schemaRef ds:uri="71af3243-3dd4-4a8d-8c0d-dd76da1f02a5"/>
@@ -13109,7 +12649,7 @@
 </ds:datastoreItem>
 </file>
 
-<file path=customXml/itemProps2.xml><?xml version="1.0" encoding="utf-8"?>
+<file path=customXml/itemProps3.xml><?xml version="1.0" encoding="utf-8"?>
 <ds:datastoreItem xmlns:ds="http://schemas.openxmlformats.org/officeDocument/2006/customXml" ds:itemID="{7E503717-EE9E-4D32-83A6-59F23E9967EF}">
   <ds:schemaRefs>
     <ds:schemaRef ds:uri="http://schemas.microsoft.com/office/2006/metadata/contentType"/>
@@ -13126,12 +12666,4 @@
     <ds:schemaRef ds:uri="http://schemas.microsoft.com/internal/obd"/>
   </ds:schemaRefs>
 </ds:datastoreItem>
-</file>
-
-<file path=customXml/itemProps3.xml><?xml version="1.0" encoding="utf-8"?>
-<ds:datastoreItem xmlns:ds="http://schemas.openxmlformats.org/officeDocument/2006/customXml" ds:itemID="{A3A7569E-E204-496A-95C5-F6E51FB4AB11}">
-  <ds:schemaRefs>
-    <ds:schemaRef ds:uri="http://schemas.microsoft.com/sharepoint/v3/contenttype/forms"/>
-  </ds:schemaRefs>
-</ds:datastoreItem>
 </file>
</xml_diff>

<commit_message>
Updated for presentation to Bivin.
</commit_message>
<xml_diff>
--- a/Visuals/Presentation.pptx
+++ b/Visuals/Presentation.pptx
@@ -200,7 +200,7 @@
           <a:p>
             <a:fld id="{B565716D-39C9-48C4-A3EB-B88E4515427D}" type="datetimeFigureOut">
               <a:rPr lang="en-US" smtClean="0"/>
-              <a:t>6/26/2019</a:t>
+              <a:t>6/27/2019</a:t>
             </a:fld>
             <a:endParaRPr lang="en-US" dirty="0"/>
           </a:p>
@@ -585,7 +585,7 @@
           <p:cNvPr id="5" name="Picture Placeholder 4">
             <a:extLst>
               <a:ext uri="{FF2B5EF4-FFF2-40B4-BE49-F238E27FC236}">
-                <a16:creationId xmlns="" xmlns:a16="http://schemas.microsoft.com/office/drawing/2014/main" id="{48D39141-3E8E-4545-90DB-291A0E5F139B}"/>
+                <a16:creationId xmlns:a16="http://schemas.microsoft.com/office/drawing/2014/main" xmlns="" id="{48D39141-3E8E-4545-90DB-291A0E5F139B}"/>
               </a:ext>
             </a:extLst>
           </p:cNvPr>
@@ -645,7 +645,7 @@
           <p:cNvPr id="2" name="Title 1">
             <a:extLst>
               <a:ext uri="{FF2B5EF4-FFF2-40B4-BE49-F238E27FC236}">
-                <a16:creationId xmlns="" xmlns:a16="http://schemas.microsoft.com/office/drawing/2014/main" id="{AD90A062-54B3-47F2-9D6A-5BC9575208D2}"/>
+                <a16:creationId xmlns:a16="http://schemas.microsoft.com/office/drawing/2014/main" xmlns="" id="{AD90A062-54B3-47F2-9D6A-5BC9575208D2}"/>
               </a:ext>
             </a:extLst>
           </p:cNvPr>
@@ -692,7 +692,7 @@
           <p:cNvPr id="3" name="Subtitle 2">
             <a:extLst>
               <a:ext uri="{FF2B5EF4-FFF2-40B4-BE49-F238E27FC236}">
-                <a16:creationId xmlns="" xmlns:a16="http://schemas.microsoft.com/office/drawing/2014/main" id="{35C97F3D-57FA-4E82-9EEC-E93088055A15}"/>
+                <a16:creationId xmlns:a16="http://schemas.microsoft.com/office/drawing/2014/main" xmlns="" id="{35C97F3D-57FA-4E82-9EEC-E93088055A15}"/>
               </a:ext>
             </a:extLst>
           </p:cNvPr>
@@ -778,7 +778,7 @@
           <p:cNvPr id="7" name="Footer Placeholder 6">
             <a:extLst>
               <a:ext uri="{FF2B5EF4-FFF2-40B4-BE49-F238E27FC236}">
-                <a16:creationId xmlns="" xmlns:a16="http://schemas.microsoft.com/office/drawing/2014/main" id="{E31775C8-C7F0-4EC5-A9C0-53AE3A0C5F7B}"/>
+                <a16:creationId xmlns:a16="http://schemas.microsoft.com/office/drawing/2014/main" xmlns="" id="{E31775C8-C7F0-4EC5-A9C0-53AE3A0C5F7B}"/>
               </a:ext>
             </a:extLst>
           </p:cNvPr>
@@ -808,7 +808,7 @@
           <p:cNvPr id="8" name="Slide Number Placeholder 7">
             <a:extLst>
               <a:ext uri="{FF2B5EF4-FFF2-40B4-BE49-F238E27FC236}">
-                <a16:creationId xmlns="" xmlns:a16="http://schemas.microsoft.com/office/drawing/2014/main" id="{9E8B0AE2-DA19-49E2-AC81-5272385D304C}"/>
+                <a16:creationId xmlns:a16="http://schemas.microsoft.com/office/drawing/2014/main" xmlns="" id="{9E8B0AE2-DA19-49E2-AC81-5272385D304C}"/>
               </a:ext>
             </a:extLst>
           </p:cNvPr>
@@ -868,7 +868,7 @@
           <p:cNvPr id="20" name="Text Placeholder 3">
             <a:extLst>
               <a:ext uri="{FF2B5EF4-FFF2-40B4-BE49-F238E27FC236}">
-                <a16:creationId xmlns="" xmlns:a16="http://schemas.microsoft.com/office/drawing/2014/main" id="{6A395197-9758-40F0-B747-F8B134C175EB}"/>
+                <a16:creationId xmlns:a16="http://schemas.microsoft.com/office/drawing/2014/main" xmlns="" id="{6A395197-9758-40F0-B747-F8B134C175EB}"/>
               </a:ext>
             </a:extLst>
           </p:cNvPr>
@@ -1107,7 +1107,7 @@
           <p:cNvPr id="19" name="Freeform: Shape 18">
             <a:extLst>
               <a:ext uri="{FF2B5EF4-FFF2-40B4-BE49-F238E27FC236}">
-                <a16:creationId xmlns="" xmlns:a16="http://schemas.microsoft.com/office/drawing/2014/main" id="{78907576-77BD-4FD0-A9FE-48D249CB435B}"/>
+                <a16:creationId xmlns:a16="http://schemas.microsoft.com/office/drawing/2014/main" xmlns="" id="{78907576-77BD-4FD0-A9FE-48D249CB435B}"/>
               </a:ext>
             </a:extLst>
           </p:cNvPr>
@@ -1266,7 +1266,7 @@
           <p:cNvPr id="7" name="Footer Placeholder 6">
             <a:extLst>
               <a:ext uri="{FF2B5EF4-FFF2-40B4-BE49-F238E27FC236}">
-                <a16:creationId xmlns="" xmlns:a16="http://schemas.microsoft.com/office/drawing/2014/main" id="{A557D1A2-E2DD-4CD8-B7DB-2864D4A97E02}"/>
+                <a16:creationId xmlns:a16="http://schemas.microsoft.com/office/drawing/2014/main" xmlns="" id="{A557D1A2-E2DD-4CD8-B7DB-2864D4A97E02}"/>
               </a:ext>
             </a:extLst>
           </p:cNvPr>
@@ -1291,7 +1291,7 @@
           <p:cNvPr id="8" name="Slide Number Placeholder 7">
             <a:extLst>
               <a:ext uri="{FF2B5EF4-FFF2-40B4-BE49-F238E27FC236}">
-                <a16:creationId xmlns="" xmlns:a16="http://schemas.microsoft.com/office/drawing/2014/main" id="{86B08B7A-4219-4973-8C9B-BF5BCC64480F}"/>
+                <a16:creationId xmlns:a16="http://schemas.microsoft.com/office/drawing/2014/main" xmlns="" id="{86B08B7A-4219-4973-8C9B-BF5BCC64480F}"/>
               </a:ext>
             </a:extLst>
           </p:cNvPr>
@@ -1321,7 +1321,7 @@
           <p:cNvPr id="5" name="Text Placeholder 4">
             <a:extLst>
               <a:ext uri="{FF2B5EF4-FFF2-40B4-BE49-F238E27FC236}">
-                <a16:creationId xmlns="" xmlns:a16="http://schemas.microsoft.com/office/drawing/2014/main" id="{C430C70C-09F9-40EE-9A89-ED9A5DCFD98D}"/>
+                <a16:creationId xmlns:a16="http://schemas.microsoft.com/office/drawing/2014/main" xmlns="" id="{C430C70C-09F9-40EE-9A89-ED9A5DCFD98D}"/>
               </a:ext>
             </a:extLst>
           </p:cNvPr>
@@ -1400,7 +1400,7 @@
           <p:cNvPr id="13" name="Text Placeholder 12">
             <a:extLst>
               <a:ext uri="{FF2B5EF4-FFF2-40B4-BE49-F238E27FC236}">
-                <a16:creationId xmlns="" xmlns:a16="http://schemas.microsoft.com/office/drawing/2014/main" id="{278D9ACA-AB64-4D04-A5E0-23AC8B81EC2C}"/>
+                <a16:creationId xmlns:a16="http://schemas.microsoft.com/office/drawing/2014/main" xmlns="" id="{278D9ACA-AB64-4D04-A5E0-23AC8B81EC2C}"/>
               </a:ext>
             </a:extLst>
           </p:cNvPr>
@@ -1479,7 +1479,7 @@
           <p:cNvPr id="15" name="Text Placeholder 4">
             <a:extLst>
               <a:ext uri="{FF2B5EF4-FFF2-40B4-BE49-F238E27FC236}">
-                <a16:creationId xmlns="" xmlns:a16="http://schemas.microsoft.com/office/drawing/2014/main" id="{F3B4EB62-0A18-46F9-98F0-E8FC5EBAF37E}"/>
+                <a16:creationId xmlns:a16="http://schemas.microsoft.com/office/drawing/2014/main" xmlns="" id="{F3B4EB62-0A18-46F9-98F0-E8FC5EBAF37E}"/>
               </a:ext>
             </a:extLst>
           </p:cNvPr>
@@ -1558,7 +1558,7 @@
           <p:cNvPr id="16" name="Text Placeholder 12">
             <a:extLst>
               <a:ext uri="{FF2B5EF4-FFF2-40B4-BE49-F238E27FC236}">
-                <a16:creationId xmlns="" xmlns:a16="http://schemas.microsoft.com/office/drawing/2014/main" id="{A3B2D4DF-9952-49C7-B850-559AD0DF27D5}"/>
+                <a16:creationId xmlns:a16="http://schemas.microsoft.com/office/drawing/2014/main" xmlns="" id="{A3B2D4DF-9952-49C7-B850-559AD0DF27D5}"/>
               </a:ext>
             </a:extLst>
           </p:cNvPr>
@@ -1637,7 +1637,7 @@
           <p:cNvPr id="17" name="Text Placeholder 4">
             <a:extLst>
               <a:ext uri="{FF2B5EF4-FFF2-40B4-BE49-F238E27FC236}">
-                <a16:creationId xmlns="" xmlns:a16="http://schemas.microsoft.com/office/drawing/2014/main" id="{BCE373B8-7ADE-4DC4-9900-59147BFA16E7}"/>
+                <a16:creationId xmlns:a16="http://schemas.microsoft.com/office/drawing/2014/main" xmlns="" id="{BCE373B8-7ADE-4DC4-9900-59147BFA16E7}"/>
               </a:ext>
             </a:extLst>
           </p:cNvPr>
@@ -1716,7 +1716,7 @@
           <p:cNvPr id="18" name="Text Placeholder 12">
             <a:extLst>
               <a:ext uri="{FF2B5EF4-FFF2-40B4-BE49-F238E27FC236}">
-                <a16:creationId xmlns="" xmlns:a16="http://schemas.microsoft.com/office/drawing/2014/main" id="{28F027FF-E9AF-4E49-AC44-48D21AD761AA}"/>
+                <a16:creationId xmlns:a16="http://schemas.microsoft.com/office/drawing/2014/main" xmlns="" id="{28F027FF-E9AF-4E49-AC44-48D21AD761AA}"/>
               </a:ext>
             </a:extLst>
           </p:cNvPr>
@@ -1795,7 +1795,7 @@
           <p:cNvPr id="29" name="Picture Placeholder 25">
             <a:extLst>
               <a:ext uri="{FF2B5EF4-FFF2-40B4-BE49-F238E27FC236}">
-                <a16:creationId xmlns="" xmlns:a16="http://schemas.microsoft.com/office/drawing/2014/main" id="{8989EC4C-4E3F-457F-8CF6-8A88DE68A930}"/>
+                <a16:creationId xmlns:a16="http://schemas.microsoft.com/office/drawing/2014/main" xmlns="" id="{8989EC4C-4E3F-457F-8CF6-8A88DE68A930}"/>
               </a:ext>
             </a:extLst>
           </p:cNvPr>
@@ -1837,7 +1837,7 @@
           <p:cNvPr id="30" name="Picture Placeholder 25">
             <a:extLst>
               <a:ext uri="{FF2B5EF4-FFF2-40B4-BE49-F238E27FC236}">
-                <a16:creationId xmlns="" xmlns:a16="http://schemas.microsoft.com/office/drawing/2014/main" id="{67FB2730-3D12-4D72-AE64-AC3955C5CD99}"/>
+                <a16:creationId xmlns:a16="http://schemas.microsoft.com/office/drawing/2014/main" xmlns="" id="{67FB2730-3D12-4D72-AE64-AC3955C5CD99}"/>
               </a:ext>
             </a:extLst>
           </p:cNvPr>
@@ -1879,7 +1879,7 @@
           <p:cNvPr id="31" name="Picture Placeholder 25">
             <a:extLst>
               <a:ext uri="{FF2B5EF4-FFF2-40B4-BE49-F238E27FC236}">
-                <a16:creationId xmlns="" xmlns:a16="http://schemas.microsoft.com/office/drawing/2014/main" id="{4F2BB90C-4866-4DB3-B05C-0BB7DBFF8EA3}"/>
+                <a16:creationId xmlns:a16="http://schemas.microsoft.com/office/drawing/2014/main" xmlns="" id="{4F2BB90C-4866-4DB3-B05C-0BB7DBFF8EA3}"/>
               </a:ext>
             </a:extLst>
           </p:cNvPr>
@@ -1921,7 +1921,7 @@
           <p:cNvPr id="22" name="Text Placeholder 4">
             <a:extLst>
               <a:ext uri="{FF2B5EF4-FFF2-40B4-BE49-F238E27FC236}">
-                <a16:creationId xmlns="" xmlns:a16="http://schemas.microsoft.com/office/drawing/2014/main" id="{FE407FE5-15DF-40F7-B14C-0A04CC30CD66}"/>
+                <a16:creationId xmlns:a16="http://schemas.microsoft.com/office/drawing/2014/main" xmlns="" id="{FE407FE5-15DF-40F7-B14C-0A04CC30CD66}"/>
               </a:ext>
             </a:extLst>
           </p:cNvPr>
@@ -2000,7 +2000,7 @@
           <p:cNvPr id="23" name="Text Placeholder 12">
             <a:extLst>
               <a:ext uri="{FF2B5EF4-FFF2-40B4-BE49-F238E27FC236}">
-                <a16:creationId xmlns="" xmlns:a16="http://schemas.microsoft.com/office/drawing/2014/main" id="{7DD73F77-2E6A-450D-B4AF-8643D8AE1ECE}"/>
+                <a16:creationId xmlns:a16="http://schemas.microsoft.com/office/drawing/2014/main" xmlns="" id="{7DD73F77-2E6A-450D-B4AF-8643D8AE1ECE}"/>
               </a:ext>
             </a:extLst>
           </p:cNvPr>
@@ -2079,7 +2079,7 @@
           <p:cNvPr id="24" name="Text Placeholder 4">
             <a:extLst>
               <a:ext uri="{FF2B5EF4-FFF2-40B4-BE49-F238E27FC236}">
-                <a16:creationId xmlns="" xmlns:a16="http://schemas.microsoft.com/office/drawing/2014/main" id="{7F1CAED2-2A78-4780-A303-060C24C56526}"/>
+                <a16:creationId xmlns:a16="http://schemas.microsoft.com/office/drawing/2014/main" xmlns="" id="{7F1CAED2-2A78-4780-A303-060C24C56526}"/>
               </a:ext>
             </a:extLst>
           </p:cNvPr>
@@ -2158,7 +2158,7 @@
           <p:cNvPr id="27" name="Text Placeholder 12">
             <a:extLst>
               <a:ext uri="{FF2B5EF4-FFF2-40B4-BE49-F238E27FC236}">
-                <a16:creationId xmlns="" xmlns:a16="http://schemas.microsoft.com/office/drawing/2014/main" id="{4E77CA0B-49F8-4EE9-84A7-AB28FD1CC1ED}"/>
+                <a16:creationId xmlns:a16="http://schemas.microsoft.com/office/drawing/2014/main" xmlns="" id="{4E77CA0B-49F8-4EE9-84A7-AB28FD1CC1ED}"/>
               </a:ext>
             </a:extLst>
           </p:cNvPr>
@@ -2237,7 +2237,7 @@
           <p:cNvPr id="28" name="Text Placeholder 4">
             <a:extLst>
               <a:ext uri="{FF2B5EF4-FFF2-40B4-BE49-F238E27FC236}">
-                <a16:creationId xmlns="" xmlns:a16="http://schemas.microsoft.com/office/drawing/2014/main" id="{5D4F2294-CE3A-4705-BCB3-C5DAFA373C25}"/>
+                <a16:creationId xmlns:a16="http://schemas.microsoft.com/office/drawing/2014/main" xmlns="" id="{5D4F2294-CE3A-4705-BCB3-C5DAFA373C25}"/>
               </a:ext>
             </a:extLst>
           </p:cNvPr>
@@ -2316,7 +2316,7 @@
           <p:cNvPr id="32" name="Text Placeholder 12">
             <a:extLst>
               <a:ext uri="{FF2B5EF4-FFF2-40B4-BE49-F238E27FC236}">
-                <a16:creationId xmlns="" xmlns:a16="http://schemas.microsoft.com/office/drawing/2014/main" id="{7B49F9AF-7698-444D-8D12-FA0B6A713E03}"/>
+                <a16:creationId xmlns:a16="http://schemas.microsoft.com/office/drawing/2014/main" xmlns="" id="{7B49F9AF-7698-444D-8D12-FA0B6A713E03}"/>
               </a:ext>
             </a:extLst>
           </p:cNvPr>
@@ -2395,7 +2395,7 @@
           <p:cNvPr id="33" name="Picture Placeholder 25">
             <a:extLst>
               <a:ext uri="{FF2B5EF4-FFF2-40B4-BE49-F238E27FC236}">
-                <a16:creationId xmlns="" xmlns:a16="http://schemas.microsoft.com/office/drawing/2014/main" id="{6057C2E9-1501-4819-B77D-23A0268DB0F1}"/>
+                <a16:creationId xmlns:a16="http://schemas.microsoft.com/office/drawing/2014/main" xmlns="" id="{6057C2E9-1501-4819-B77D-23A0268DB0F1}"/>
               </a:ext>
             </a:extLst>
           </p:cNvPr>
@@ -2437,7 +2437,7 @@
           <p:cNvPr id="34" name="Picture Placeholder 25">
             <a:extLst>
               <a:ext uri="{FF2B5EF4-FFF2-40B4-BE49-F238E27FC236}">
-                <a16:creationId xmlns="" xmlns:a16="http://schemas.microsoft.com/office/drawing/2014/main" id="{C77B8544-1CEE-4ED4-89E8-ED042673804D}"/>
+                <a16:creationId xmlns:a16="http://schemas.microsoft.com/office/drawing/2014/main" xmlns="" id="{C77B8544-1CEE-4ED4-89E8-ED042673804D}"/>
               </a:ext>
             </a:extLst>
           </p:cNvPr>
@@ -2479,7 +2479,7 @@
           <p:cNvPr id="35" name="Picture Placeholder 25">
             <a:extLst>
               <a:ext uri="{FF2B5EF4-FFF2-40B4-BE49-F238E27FC236}">
-                <a16:creationId xmlns="" xmlns:a16="http://schemas.microsoft.com/office/drawing/2014/main" id="{E1131D92-0382-469E-A358-A2EC5FDCCF32}"/>
+                <a16:creationId xmlns:a16="http://schemas.microsoft.com/office/drawing/2014/main" xmlns="" id="{E1131D92-0382-469E-A358-A2EC5FDCCF32}"/>
               </a:ext>
             </a:extLst>
           </p:cNvPr>
@@ -2521,7 +2521,7 @@
           <p:cNvPr id="3" name="Title 2">
             <a:extLst>
               <a:ext uri="{FF2B5EF4-FFF2-40B4-BE49-F238E27FC236}">
-                <a16:creationId xmlns="" xmlns:a16="http://schemas.microsoft.com/office/drawing/2014/main" id="{7C0EBF36-B9CA-4962-B198-27B56B54E58C}"/>
+                <a16:creationId xmlns:a16="http://schemas.microsoft.com/office/drawing/2014/main" xmlns="" id="{7C0EBF36-B9CA-4962-B198-27B56B54E58C}"/>
               </a:ext>
             </a:extLst>
           </p:cNvPr>
@@ -2587,7 +2587,7 @@
           <p:cNvPr id="6" name="Rectangle 5">
             <a:extLst>
               <a:ext uri="{FF2B5EF4-FFF2-40B4-BE49-F238E27FC236}">
-                <a16:creationId xmlns="" xmlns:a16="http://schemas.microsoft.com/office/drawing/2014/main" id="{474D42A7-FF15-4C9E-9657-33DD5BC539DA}"/>
+                <a16:creationId xmlns:a16="http://schemas.microsoft.com/office/drawing/2014/main" xmlns="" id="{474D42A7-FF15-4C9E-9657-33DD5BC539DA}"/>
               </a:ext>
             </a:extLst>
           </p:cNvPr>
@@ -2641,7 +2641,7 @@
           <p:cNvPr id="9" name="Text Placeholder 3">
             <a:extLst>
               <a:ext uri="{FF2B5EF4-FFF2-40B4-BE49-F238E27FC236}">
-                <a16:creationId xmlns="" xmlns:a16="http://schemas.microsoft.com/office/drawing/2014/main" id="{4FA555C0-B108-4047-8AFF-82E05F073446}"/>
+                <a16:creationId xmlns:a16="http://schemas.microsoft.com/office/drawing/2014/main" xmlns="" id="{4FA555C0-B108-4047-8AFF-82E05F073446}"/>
               </a:ext>
             </a:extLst>
           </p:cNvPr>
@@ -2685,7 +2685,7 @@
           <p:cNvPr id="2" name="Title 1">
             <a:extLst>
               <a:ext uri="{FF2B5EF4-FFF2-40B4-BE49-F238E27FC236}">
-                <a16:creationId xmlns="" xmlns:a16="http://schemas.microsoft.com/office/drawing/2014/main" id="{DF797B74-E645-46F4-8F77-49AF7F0D443F}"/>
+                <a16:creationId xmlns:a16="http://schemas.microsoft.com/office/drawing/2014/main" xmlns="" id="{DF797B74-E645-46F4-8F77-49AF7F0D443F}"/>
               </a:ext>
             </a:extLst>
           </p:cNvPr>
@@ -2713,7 +2713,7 @@
           <p:cNvPr id="3" name="Content Placeholder 2">
             <a:extLst>
               <a:ext uri="{FF2B5EF4-FFF2-40B4-BE49-F238E27FC236}">
-                <a16:creationId xmlns="" xmlns:a16="http://schemas.microsoft.com/office/drawing/2014/main" id="{2E5EAA7C-AE70-48A8-B582-013424EB9C44}"/>
+                <a16:creationId xmlns:a16="http://schemas.microsoft.com/office/drawing/2014/main" xmlns="" id="{2E5EAA7C-AE70-48A8-B582-013424EB9C44}"/>
               </a:ext>
             </a:extLst>
           </p:cNvPr>
@@ -2752,7 +2752,7 @@
           <p:cNvPr id="7" name="Footer Placeholder 6">
             <a:extLst>
               <a:ext uri="{FF2B5EF4-FFF2-40B4-BE49-F238E27FC236}">
-                <a16:creationId xmlns="" xmlns:a16="http://schemas.microsoft.com/office/drawing/2014/main" id="{A557D1A2-E2DD-4CD8-B7DB-2864D4A97E02}"/>
+                <a16:creationId xmlns:a16="http://schemas.microsoft.com/office/drawing/2014/main" xmlns="" id="{A557D1A2-E2DD-4CD8-B7DB-2864D4A97E02}"/>
               </a:ext>
             </a:extLst>
           </p:cNvPr>
@@ -2777,7 +2777,7 @@
           <p:cNvPr id="8" name="Slide Number Placeholder 7">
             <a:extLst>
               <a:ext uri="{FF2B5EF4-FFF2-40B4-BE49-F238E27FC236}">
-                <a16:creationId xmlns="" xmlns:a16="http://schemas.microsoft.com/office/drawing/2014/main" id="{86B08B7A-4219-4973-8C9B-BF5BCC64480F}"/>
+                <a16:creationId xmlns:a16="http://schemas.microsoft.com/office/drawing/2014/main" xmlns="" id="{86B08B7A-4219-4973-8C9B-BF5BCC64480F}"/>
               </a:ext>
             </a:extLst>
           </p:cNvPr>
@@ -2807,7 +2807,7 @@
           <p:cNvPr id="11" name="Picture Placeholder 10">
             <a:extLst>
               <a:ext uri="{FF2B5EF4-FFF2-40B4-BE49-F238E27FC236}">
-                <a16:creationId xmlns="" xmlns:a16="http://schemas.microsoft.com/office/drawing/2014/main" id="{A98EA298-DD21-4B69-8125-094245EDF713}"/>
+                <a16:creationId xmlns:a16="http://schemas.microsoft.com/office/drawing/2014/main" xmlns="" id="{A98EA298-DD21-4B69-8125-094245EDF713}"/>
               </a:ext>
             </a:extLst>
           </p:cNvPr>
@@ -2852,7 +2852,7 @@
           <p:cNvPr id="12" name="Picture Placeholder 10">
             <a:extLst>
               <a:ext uri="{FF2B5EF4-FFF2-40B4-BE49-F238E27FC236}">
-                <a16:creationId xmlns="" xmlns:a16="http://schemas.microsoft.com/office/drawing/2014/main" id="{4C93EFCC-1E62-4200-9E96-2476EE2581BF}"/>
+                <a16:creationId xmlns:a16="http://schemas.microsoft.com/office/drawing/2014/main" xmlns="" id="{4C93EFCC-1E62-4200-9E96-2476EE2581BF}"/>
               </a:ext>
             </a:extLst>
           </p:cNvPr>
@@ -2897,7 +2897,7 @@
           <p:cNvPr id="13" name="Picture Placeholder 10">
             <a:extLst>
               <a:ext uri="{FF2B5EF4-FFF2-40B4-BE49-F238E27FC236}">
-                <a16:creationId xmlns="" xmlns:a16="http://schemas.microsoft.com/office/drawing/2014/main" id="{8741D874-BD81-4469-AA1C-32517FD7C37B}"/>
+                <a16:creationId xmlns:a16="http://schemas.microsoft.com/office/drawing/2014/main" xmlns="" id="{8741D874-BD81-4469-AA1C-32517FD7C37B}"/>
               </a:ext>
             </a:extLst>
           </p:cNvPr>
@@ -2942,7 +2942,7 @@
           <p:cNvPr id="14" name="Content Placeholder 2">
             <a:extLst>
               <a:ext uri="{FF2B5EF4-FFF2-40B4-BE49-F238E27FC236}">
-                <a16:creationId xmlns="" xmlns:a16="http://schemas.microsoft.com/office/drawing/2014/main" id="{CFB0B599-DDEF-43E9-A07F-FC328C595BCE}"/>
+                <a16:creationId xmlns:a16="http://schemas.microsoft.com/office/drawing/2014/main" xmlns="" id="{CFB0B599-DDEF-43E9-A07F-FC328C595BCE}"/>
               </a:ext>
             </a:extLst>
           </p:cNvPr>
@@ -2981,7 +2981,7 @@
           <p:cNvPr id="15" name="Content Placeholder 2">
             <a:extLst>
               <a:ext uri="{FF2B5EF4-FFF2-40B4-BE49-F238E27FC236}">
-                <a16:creationId xmlns="" xmlns:a16="http://schemas.microsoft.com/office/drawing/2014/main" id="{63FF0857-6431-48DC-BE82-9A93C55CEFB4}"/>
+                <a16:creationId xmlns:a16="http://schemas.microsoft.com/office/drawing/2014/main" xmlns="" id="{63FF0857-6431-48DC-BE82-9A93C55CEFB4}"/>
               </a:ext>
             </a:extLst>
           </p:cNvPr>
@@ -3058,7 +3058,7 @@
           <p:cNvPr id="6" name="Rectangle 5">
             <a:extLst>
               <a:ext uri="{FF2B5EF4-FFF2-40B4-BE49-F238E27FC236}">
-                <a16:creationId xmlns="" xmlns:a16="http://schemas.microsoft.com/office/drawing/2014/main" id="{474D42A7-FF15-4C9E-9657-33DD5BC539DA}"/>
+                <a16:creationId xmlns:a16="http://schemas.microsoft.com/office/drawing/2014/main" xmlns="" id="{474D42A7-FF15-4C9E-9657-33DD5BC539DA}"/>
               </a:ext>
             </a:extLst>
           </p:cNvPr>
@@ -3116,7 +3116,7 @@
           <p:cNvPr id="9" name="Text Placeholder 3">
             <a:extLst>
               <a:ext uri="{FF2B5EF4-FFF2-40B4-BE49-F238E27FC236}">
-                <a16:creationId xmlns="" xmlns:a16="http://schemas.microsoft.com/office/drawing/2014/main" id="{4FA555C0-B108-4047-8AFF-82E05F073446}"/>
+                <a16:creationId xmlns:a16="http://schemas.microsoft.com/office/drawing/2014/main" xmlns="" id="{4FA555C0-B108-4047-8AFF-82E05F073446}"/>
               </a:ext>
             </a:extLst>
           </p:cNvPr>
@@ -3160,7 +3160,7 @@
           <p:cNvPr id="2" name="Title 1">
             <a:extLst>
               <a:ext uri="{FF2B5EF4-FFF2-40B4-BE49-F238E27FC236}">
-                <a16:creationId xmlns="" xmlns:a16="http://schemas.microsoft.com/office/drawing/2014/main" id="{DF797B74-E645-46F4-8F77-49AF7F0D443F}"/>
+                <a16:creationId xmlns:a16="http://schemas.microsoft.com/office/drawing/2014/main" xmlns="" id="{DF797B74-E645-46F4-8F77-49AF7F0D443F}"/>
               </a:ext>
             </a:extLst>
           </p:cNvPr>
@@ -3188,7 +3188,7 @@
           <p:cNvPr id="3" name="Content Placeholder 2">
             <a:extLst>
               <a:ext uri="{FF2B5EF4-FFF2-40B4-BE49-F238E27FC236}">
-                <a16:creationId xmlns="" xmlns:a16="http://schemas.microsoft.com/office/drawing/2014/main" id="{2E5EAA7C-AE70-48A8-B582-013424EB9C44}"/>
+                <a16:creationId xmlns:a16="http://schemas.microsoft.com/office/drawing/2014/main" xmlns="" id="{2E5EAA7C-AE70-48A8-B582-013424EB9C44}"/>
               </a:ext>
             </a:extLst>
           </p:cNvPr>
@@ -3246,7 +3246,7 @@
           <p:cNvPr id="7" name="Footer Placeholder 6">
             <a:extLst>
               <a:ext uri="{FF2B5EF4-FFF2-40B4-BE49-F238E27FC236}">
-                <a16:creationId xmlns="" xmlns:a16="http://schemas.microsoft.com/office/drawing/2014/main" id="{A557D1A2-E2DD-4CD8-B7DB-2864D4A97E02}"/>
+                <a16:creationId xmlns:a16="http://schemas.microsoft.com/office/drawing/2014/main" xmlns="" id="{A557D1A2-E2DD-4CD8-B7DB-2864D4A97E02}"/>
               </a:ext>
             </a:extLst>
           </p:cNvPr>
@@ -3271,7 +3271,7 @@
           <p:cNvPr id="8" name="Slide Number Placeholder 7">
             <a:extLst>
               <a:ext uri="{FF2B5EF4-FFF2-40B4-BE49-F238E27FC236}">
-                <a16:creationId xmlns="" xmlns:a16="http://schemas.microsoft.com/office/drawing/2014/main" id="{86B08B7A-4219-4973-8C9B-BF5BCC64480F}"/>
+                <a16:creationId xmlns:a16="http://schemas.microsoft.com/office/drawing/2014/main" xmlns="" id="{86B08B7A-4219-4973-8C9B-BF5BCC64480F}"/>
               </a:ext>
             </a:extLst>
           </p:cNvPr>
@@ -3331,7 +3331,7 @@
           <p:cNvPr id="5" name="Picture Placeholder 4">
             <a:extLst>
               <a:ext uri="{FF2B5EF4-FFF2-40B4-BE49-F238E27FC236}">
-                <a16:creationId xmlns="" xmlns:a16="http://schemas.microsoft.com/office/drawing/2014/main" id="{48D39141-3E8E-4545-90DB-291A0E5F139B}"/>
+                <a16:creationId xmlns:a16="http://schemas.microsoft.com/office/drawing/2014/main" xmlns="" id="{48D39141-3E8E-4545-90DB-291A0E5F139B}"/>
               </a:ext>
             </a:extLst>
           </p:cNvPr>
@@ -3391,7 +3391,7 @@
           <p:cNvPr id="2" name="Title 1">
             <a:extLst>
               <a:ext uri="{FF2B5EF4-FFF2-40B4-BE49-F238E27FC236}">
-                <a16:creationId xmlns="" xmlns:a16="http://schemas.microsoft.com/office/drawing/2014/main" id="{AD90A062-54B3-47F2-9D6A-5BC9575208D2}"/>
+                <a16:creationId xmlns:a16="http://schemas.microsoft.com/office/drawing/2014/main" xmlns="" id="{AD90A062-54B3-47F2-9D6A-5BC9575208D2}"/>
               </a:ext>
             </a:extLst>
           </p:cNvPr>
@@ -3447,7 +3447,7 @@
           <p:cNvPr id="6" name="Text Placeholder 5">
             <a:extLst>
               <a:ext uri="{FF2B5EF4-FFF2-40B4-BE49-F238E27FC236}">
-                <a16:creationId xmlns="" xmlns:a16="http://schemas.microsoft.com/office/drawing/2014/main" id="{D49FD1A9-E34B-4888-90DE-493861AD75C6}"/>
+                <a16:creationId xmlns:a16="http://schemas.microsoft.com/office/drawing/2014/main" xmlns="" id="{D49FD1A9-E34B-4888-90DE-493861AD75C6}"/>
               </a:ext>
             </a:extLst>
           </p:cNvPr>
@@ -3523,7 +3523,7 @@
           <p:cNvPr id="9" name="Text Placeholder 5">
             <a:extLst>
               <a:ext uri="{FF2B5EF4-FFF2-40B4-BE49-F238E27FC236}">
-                <a16:creationId xmlns="" xmlns:a16="http://schemas.microsoft.com/office/drawing/2014/main" id="{3452AC72-D893-4C1A-83BD-9930164D8935}"/>
+                <a16:creationId xmlns:a16="http://schemas.microsoft.com/office/drawing/2014/main" xmlns="" id="{3452AC72-D893-4C1A-83BD-9930164D8935}"/>
               </a:ext>
             </a:extLst>
           </p:cNvPr>
@@ -3601,7 +3601,7 @@
           <p:cNvPr id="10" name="Text Placeholder 5">
             <a:extLst>
               <a:ext uri="{FF2B5EF4-FFF2-40B4-BE49-F238E27FC236}">
-                <a16:creationId xmlns="" xmlns:a16="http://schemas.microsoft.com/office/drawing/2014/main" id="{D2EEC149-F1BE-4C36-A789-5BF73B40A212}"/>
+                <a16:creationId xmlns:a16="http://schemas.microsoft.com/office/drawing/2014/main" xmlns="" id="{D2EEC149-F1BE-4C36-A789-5BF73B40A212}"/>
               </a:ext>
             </a:extLst>
           </p:cNvPr>
@@ -3679,7 +3679,7 @@
           <p:cNvPr id="11" name="Text Placeholder 5">
             <a:extLst>
               <a:ext uri="{FF2B5EF4-FFF2-40B4-BE49-F238E27FC236}">
-                <a16:creationId xmlns="" xmlns:a16="http://schemas.microsoft.com/office/drawing/2014/main" id="{ECC256E6-6AE8-4950-838C-BE638FB47968}"/>
+                <a16:creationId xmlns:a16="http://schemas.microsoft.com/office/drawing/2014/main" xmlns="" id="{ECC256E6-6AE8-4950-838C-BE638FB47968}"/>
               </a:ext>
             </a:extLst>
           </p:cNvPr>
@@ -3784,7 +3784,7 @@
           <p:cNvPr id="5" name="Text Placeholder 4">
             <a:extLst>
               <a:ext uri="{FF2B5EF4-FFF2-40B4-BE49-F238E27FC236}">
-                <a16:creationId xmlns="" xmlns:a16="http://schemas.microsoft.com/office/drawing/2014/main" id="{DA75689F-8B6B-4484-8064-90B4D8FB7C72}"/>
+                <a16:creationId xmlns:a16="http://schemas.microsoft.com/office/drawing/2014/main" xmlns="" id="{DA75689F-8B6B-4484-8064-90B4D8FB7C72}"/>
               </a:ext>
             </a:extLst>
           </p:cNvPr>
@@ -3841,7 +3841,7 @@
           <p:cNvPr id="21" name="Picture Placeholder 20">
             <a:extLst>
               <a:ext uri="{FF2B5EF4-FFF2-40B4-BE49-F238E27FC236}">
-                <a16:creationId xmlns="" xmlns:a16="http://schemas.microsoft.com/office/drawing/2014/main" id="{C57B9832-0120-4094-8C27-082E3533C5DC}"/>
+                <a16:creationId xmlns:a16="http://schemas.microsoft.com/office/drawing/2014/main" xmlns="" id="{C57B9832-0120-4094-8C27-082E3533C5DC}"/>
               </a:ext>
             </a:extLst>
           </p:cNvPr>
@@ -3974,7 +3974,7 @@
           <p:cNvPr id="7" name="Footer Placeholder 6">
             <a:extLst>
               <a:ext uri="{FF2B5EF4-FFF2-40B4-BE49-F238E27FC236}">
-                <a16:creationId xmlns="" xmlns:a16="http://schemas.microsoft.com/office/drawing/2014/main" id="{A557D1A2-E2DD-4CD8-B7DB-2864D4A97E02}"/>
+                <a16:creationId xmlns:a16="http://schemas.microsoft.com/office/drawing/2014/main" xmlns="" id="{A557D1A2-E2DD-4CD8-B7DB-2864D4A97E02}"/>
               </a:ext>
             </a:extLst>
           </p:cNvPr>
@@ -4004,7 +4004,7 @@
           <p:cNvPr id="8" name="Slide Number Placeholder 7">
             <a:extLst>
               <a:ext uri="{FF2B5EF4-FFF2-40B4-BE49-F238E27FC236}">
-                <a16:creationId xmlns="" xmlns:a16="http://schemas.microsoft.com/office/drawing/2014/main" id="{86B08B7A-4219-4973-8C9B-BF5BCC64480F}"/>
+                <a16:creationId xmlns:a16="http://schemas.microsoft.com/office/drawing/2014/main" xmlns="" id="{86B08B7A-4219-4973-8C9B-BF5BCC64480F}"/>
               </a:ext>
             </a:extLst>
           </p:cNvPr>
@@ -4046,7 +4046,7 @@
           <p:cNvPr id="12" name="Title 11">
             <a:extLst>
               <a:ext uri="{FF2B5EF4-FFF2-40B4-BE49-F238E27FC236}">
-                <a16:creationId xmlns="" xmlns:a16="http://schemas.microsoft.com/office/drawing/2014/main" id="{EAF90A48-1BFB-4A19-9A1C-2851879F9E8F}"/>
+                <a16:creationId xmlns:a16="http://schemas.microsoft.com/office/drawing/2014/main" xmlns="" id="{EAF90A48-1BFB-4A19-9A1C-2851879F9E8F}"/>
               </a:ext>
             </a:extLst>
           </p:cNvPr>
@@ -4088,7 +4088,7 @@
           <p:cNvPr id="19" name="Freeform: Shape 18">
             <a:extLst>
               <a:ext uri="{FF2B5EF4-FFF2-40B4-BE49-F238E27FC236}">
-                <a16:creationId xmlns="" xmlns:a16="http://schemas.microsoft.com/office/drawing/2014/main" id="{C9E79024-4B2E-43B0-8607-196181AB731F}"/>
+                <a16:creationId xmlns:a16="http://schemas.microsoft.com/office/drawing/2014/main" xmlns="" id="{C9E79024-4B2E-43B0-8607-196181AB731F}"/>
               </a:ext>
             </a:extLst>
           </p:cNvPr>
@@ -4274,7 +4274,7 @@
           <p:cNvPr id="24" name="Picture Placeholder 23">
             <a:extLst>
               <a:ext uri="{FF2B5EF4-FFF2-40B4-BE49-F238E27FC236}">
-                <a16:creationId xmlns="" xmlns:a16="http://schemas.microsoft.com/office/drawing/2014/main" id="{767CE6DD-011B-4E2D-9E8A-EFF414E39EEA}"/>
+                <a16:creationId xmlns:a16="http://schemas.microsoft.com/office/drawing/2014/main" xmlns="" id="{767CE6DD-011B-4E2D-9E8A-EFF414E39EEA}"/>
               </a:ext>
             </a:extLst>
           </p:cNvPr>
@@ -4412,7 +4412,7 @@
           <p:cNvPr id="2" name="Title 1">
             <a:extLst>
               <a:ext uri="{FF2B5EF4-FFF2-40B4-BE49-F238E27FC236}">
-                <a16:creationId xmlns="" xmlns:a16="http://schemas.microsoft.com/office/drawing/2014/main" id="{DF797B74-E645-46F4-8F77-49AF7F0D443F}"/>
+                <a16:creationId xmlns:a16="http://schemas.microsoft.com/office/drawing/2014/main" xmlns="" id="{DF797B74-E645-46F4-8F77-49AF7F0D443F}"/>
               </a:ext>
             </a:extLst>
           </p:cNvPr>
@@ -4454,7 +4454,7 @@
           <p:cNvPr id="7" name="Footer Placeholder 6">
             <a:extLst>
               <a:ext uri="{FF2B5EF4-FFF2-40B4-BE49-F238E27FC236}">
-                <a16:creationId xmlns="" xmlns:a16="http://schemas.microsoft.com/office/drawing/2014/main" id="{A557D1A2-E2DD-4CD8-B7DB-2864D4A97E02}"/>
+                <a16:creationId xmlns:a16="http://schemas.microsoft.com/office/drawing/2014/main" xmlns="" id="{A557D1A2-E2DD-4CD8-B7DB-2864D4A97E02}"/>
               </a:ext>
             </a:extLst>
           </p:cNvPr>
@@ -4487,7 +4487,7 @@
           <p:cNvPr id="8" name="Slide Number Placeholder 7">
             <a:extLst>
               <a:ext uri="{FF2B5EF4-FFF2-40B4-BE49-F238E27FC236}">
-                <a16:creationId xmlns="" xmlns:a16="http://schemas.microsoft.com/office/drawing/2014/main" id="{86B08B7A-4219-4973-8C9B-BF5BCC64480F}"/>
+                <a16:creationId xmlns:a16="http://schemas.microsoft.com/office/drawing/2014/main" xmlns="" id="{86B08B7A-4219-4973-8C9B-BF5BCC64480F}"/>
               </a:ext>
             </a:extLst>
           </p:cNvPr>
@@ -4517,7 +4517,7 @@
           <p:cNvPr id="9" name="Freeform: Shape 8">
             <a:extLst>
               <a:ext uri="{FF2B5EF4-FFF2-40B4-BE49-F238E27FC236}">
-                <a16:creationId xmlns="" xmlns:a16="http://schemas.microsoft.com/office/drawing/2014/main" id="{C6E75A4B-2655-4B0E-8D3B-0068F57D3D9B}"/>
+                <a16:creationId xmlns:a16="http://schemas.microsoft.com/office/drawing/2014/main" xmlns="" id="{C6E75A4B-2655-4B0E-8D3B-0068F57D3D9B}"/>
               </a:ext>
             </a:extLst>
           </p:cNvPr>
@@ -4676,7 +4676,7 @@
           <p:cNvPr id="5" name="Text Placeholder 4">
             <a:extLst>
               <a:ext uri="{FF2B5EF4-FFF2-40B4-BE49-F238E27FC236}">
-                <a16:creationId xmlns="" xmlns:a16="http://schemas.microsoft.com/office/drawing/2014/main" id="{49F266E5-40A6-4643-B9AC-B38F27256371}"/>
+                <a16:creationId xmlns:a16="http://schemas.microsoft.com/office/drawing/2014/main" xmlns="" id="{49F266E5-40A6-4643-B9AC-B38F27256371}"/>
               </a:ext>
             </a:extLst>
           </p:cNvPr>
@@ -4757,7 +4757,7 @@
           <p:cNvPr id="11" name="Text Placeholder 10">
             <a:extLst>
               <a:ext uri="{FF2B5EF4-FFF2-40B4-BE49-F238E27FC236}">
-                <a16:creationId xmlns="" xmlns:a16="http://schemas.microsoft.com/office/drawing/2014/main" id="{1CB790CB-E4F5-4B61-A03E-1CA0C32E3F17}"/>
+                <a16:creationId xmlns:a16="http://schemas.microsoft.com/office/drawing/2014/main" xmlns="" id="{1CB790CB-E4F5-4B61-A03E-1CA0C32E3F17}"/>
               </a:ext>
             </a:extLst>
           </p:cNvPr>
@@ -4832,7 +4832,7 @@
           <p:cNvPr id="12" name="Text Placeholder 4">
             <a:extLst>
               <a:ext uri="{FF2B5EF4-FFF2-40B4-BE49-F238E27FC236}">
-                <a16:creationId xmlns="" xmlns:a16="http://schemas.microsoft.com/office/drawing/2014/main" id="{B570684C-B743-402E-8778-A65199577106}"/>
+                <a16:creationId xmlns:a16="http://schemas.microsoft.com/office/drawing/2014/main" xmlns="" id="{B570684C-B743-402E-8778-A65199577106}"/>
               </a:ext>
             </a:extLst>
           </p:cNvPr>
@@ -4913,7 +4913,7 @@
           <p:cNvPr id="13" name="Text Placeholder 10">
             <a:extLst>
               <a:ext uri="{FF2B5EF4-FFF2-40B4-BE49-F238E27FC236}">
-                <a16:creationId xmlns="" xmlns:a16="http://schemas.microsoft.com/office/drawing/2014/main" id="{FCEC7149-9A00-4CA4-B800-1BFD6EBEB88D}"/>
+                <a16:creationId xmlns:a16="http://schemas.microsoft.com/office/drawing/2014/main" xmlns="" id="{FCEC7149-9A00-4CA4-B800-1BFD6EBEB88D}"/>
               </a:ext>
             </a:extLst>
           </p:cNvPr>
@@ -4988,7 +4988,7 @@
           <p:cNvPr id="14" name="Text Placeholder 4">
             <a:extLst>
               <a:ext uri="{FF2B5EF4-FFF2-40B4-BE49-F238E27FC236}">
-                <a16:creationId xmlns="" xmlns:a16="http://schemas.microsoft.com/office/drawing/2014/main" id="{0374F0E2-36BA-43B5-8799-77AA3367DF47}"/>
+                <a16:creationId xmlns:a16="http://schemas.microsoft.com/office/drawing/2014/main" xmlns="" id="{0374F0E2-36BA-43B5-8799-77AA3367DF47}"/>
               </a:ext>
             </a:extLst>
           </p:cNvPr>
@@ -5069,7 +5069,7 @@
           <p:cNvPr id="15" name="Text Placeholder 10">
             <a:extLst>
               <a:ext uri="{FF2B5EF4-FFF2-40B4-BE49-F238E27FC236}">
-                <a16:creationId xmlns="" xmlns:a16="http://schemas.microsoft.com/office/drawing/2014/main" id="{1BA12174-6A24-4E61-8D58-B3B42C31BE1A}"/>
+                <a16:creationId xmlns:a16="http://schemas.microsoft.com/office/drawing/2014/main" xmlns="" id="{1BA12174-6A24-4E61-8D58-B3B42C31BE1A}"/>
               </a:ext>
             </a:extLst>
           </p:cNvPr>
@@ -5144,7 +5144,7 @@
           <p:cNvPr id="16" name="Text Placeholder 4">
             <a:extLst>
               <a:ext uri="{FF2B5EF4-FFF2-40B4-BE49-F238E27FC236}">
-                <a16:creationId xmlns="" xmlns:a16="http://schemas.microsoft.com/office/drawing/2014/main" id="{D3A67B21-0E8B-4922-94F9-20492309C4DA}"/>
+                <a16:creationId xmlns:a16="http://schemas.microsoft.com/office/drawing/2014/main" xmlns="" id="{D3A67B21-0E8B-4922-94F9-20492309C4DA}"/>
               </a:ext>
             </a:extLst>
           </p:cNvPr>
@@ -5225,7 +5225,7 @@
           <p:cNvPr id="17" name="Text Placeholder 10">
             <a:extLst>
               <a:ext uri="{FF2B5EF4-FFF2-40B4-BE49-F238E27FC236}">
-                <a16:creationId xmlns="" xmlns:a16="http://schemas.microsoft.com/office/drawing/2014/main" id="{D801C20C-82D2-465E-8D45-DF1A57E04525}"/>
+                <a16:creationId xmlns:a16="http://schemas.microsoft.com/office/drawing/2014/main" xmlns="" id="{D801C20C-82D2-465E-8D45-DF1A57E04525}"/>
               </a:ext>
             </a:extLst>
           </p:cNvPr>
@@ -5300,7 +5300,7 @@
           <p:cNvPr id="18" name="Text Placeholder 4">
             <a:extLst>
               <a:ext uri="{FF2B5EF4-FFF2-40B4-BE49-F238E27FC236}">
-                <a16:creationId xmlns="" xmlns:a16="http://schemas.microsoft.com/office/drawing/2014/main" id="{62BAD45E-2039-4F8D-9CFC-42BFA3756AD1}"/>
+                <a16:creationId xmlns:a16="http://schemas.microsoft.com/office/drawing/2014/main" xmlns="" id="{62BAD45E-2039-4F8D-9CFC-42BFA3756AD1}"/>
               </a:ext>
             </a:extLst>
           </p:cNvPr>
@@ -5381,7 +5381,7 @@
           <p:cNvPr id="19" name="Text Placeholder 10">
             <a:extLst>
               <a:ext uri="{FF2B5EF4-FFF2-40B4-BE49-F238E27FC236}">
-                <a16:creationId xmlns="" xmlns:a16="http://schemas.microsoft.com/office/drawing/2014/main" id="{64A78879-6338-4F3B-864E-8FF4E08C0066}"/>
+                <a16:creationId xmlns:a16="http://schemas.microsoft.com/office/drawing/2014/main" xmlns="" id="{64A78879-6338-4F3B-864E-8FF4E08C0066}"/>
               </a:ext>
             </a:extLst>
           </p:cNvPr>
@@ -5456,7 +5456,7 @@
           <p:cNvPr id="22" name="Subtitle 2">
             <a:extLst>
               <a:ext uri="{FF2B5EF4-FFF2-40B4-BE49-F238E27FC236}">
-                <a16:creationId xmlns="" xmlns:a16="http://schemas.microsoft.com/office/drawing/2014/main" id="{80118439-B306-4F20-9200-1C429EADC7EE}"/>
+                <a16:creationId xmlns:a16="http://schemas.microsoft.com/office/drawing/2014/main" xmlns="" id="{80118439-B306-4F20-9200-1C429EADC7EE}"/>
               </a:ext>
             </a:extLst>
           </p:cNvPr>
@@ -5541,7 +5541,7 @@
           <p:cNvPr id="26" name="Picture Placeholder 25">
             <a:extLst>
               <a:ext uri="{FF2B5EF4-FFF2-40B4-BE49-F238E27FC236}">
-                <a16:creationId xmlns="" xmlns:a16="http://schemas.microsoft.com/office/drawing/2014/main" id="{99B7E7F2-DF6B-4441-B0B1-7E87E29BA3A7}"/>
+                <a16:creationId xmlns:a16="http://schemas.microsoft.com/office/drawing/2014/main" xmlns="" id="{99B7E7F2-DF6B-4441-B0B1-7E87E29BA3A7}"/>
               </a:ext>
             </a:extLst>
           </p:cNvPr>
@@ -5583,7 +5583,7 @@
           <p:cNvPr id="27" name="Picture Placeholder 25">
             <a:extLst>
               <a:ext uri="{FF2B5EF4-FFF2-40B4-BE49-F238E27FC236}">
-                <a16:creationId xmlns="" xmlns:a16="http://schemas.microsoft.com/office/drawing/2014/main" id="{ED41522A-FBAF-4E5D-B592-F13855964E8B}"/>
+                <a16:creationId xmlns:a16="http://schemas.microsoft.com/office/drawing/2014/main" xmlns="" id="{ED41522A-FBAF-4E5D-B592-F13855964E8B}"/>
               </a:ext>
             </a:extLst>
           </p:cNvPr>
@@ -5625,7 +5625,7 @@
           <p:cNvPr id="28" name="Picture Placeholder 25">
             <a:extLst>
               <a:ext uri="{FF2B5EF4-FFF2-40B4-BE49-F238E27FC236}">
-                <a16:creationId xmlns="" xmlns:a16="http://schemas.microsoft.com/office/drawing/2014/main" id="{AA51069C-E1DC-44A0-A6A0-2A4AB0DD4D70}"/>
+                <a16:creationId xmlns:a16="http://schemas.microsoft.com/office/drawing/2014/main" xmlns="" id="{AA51069C-E1DC-44A0-A6A0-2A4AB0DD4D70}"/>
               </a:ext>
             </a:extLst>
           </p:cNvPr>
@@ -5667,7 +5667,7 @@
           <p:cNvPr id="29" name="Picture Placeholder 25">
             <a:extLst>
               <a:ext uri="{FF2B5EF4-FFF2-40B4-BE49-F238E27FC236}">
-                <a16:creationId xmlns="" xmlns:a16="http://schemas.microsoft.com/office/drawing/2014/main" id="{42F6437E-5478-451F-9BE3-E8160EA43516}"/>
+                <a16:creationId xmlns:a16="http://schemas.microsoft.com/office/drawing/2014/main" xmlns="" id="{42F6437E-5478-451F-9BE3-E8160EA43516}"/>
               </a:ext>
             </a:extLst>
           </p:cNvPr>
@@ -5709,7 +5709,7 @@
           <p:cNvPr id="30" name="Picture Placeholder 25">
             <a:extLst>
               <a:ext uri="{FF2B5EF4-FFF2-40B4-BE49-F238E27FC236}">
-                <a16:creationId xmlns="" xmlns:a16="http://schemas.microsoft.com/office/drawing/2014/main" id="{25127DFD-53A7-41A8-B591-AEEC12038026}"/>
+                <a16:creationId xmlns:a16="http://schemas.microsoft.com/office/drawing/2014/main" xmlns="" id="{25127DFD-53A7-41A8-B591-AEEC12038026}"/>
               </a:ext>
             </a:extLst>
           </p:cNvPr>
@@ -5781,10 +5781,10 @@
           <p:cNvPr id="9" name="Rectangle 8">
             <a:extLst>
               <a:ext uri="{FF2B5EF4-FFF2-40B4-BE49-F238E27FC236}">
-                <a16:creationId xmlns="" xmlns:a16="http://schemas.microsoft.com/office/drawing/2014/main" id="{6F76D43D-0DDD-4BAD-8213-BDBF75C30A0C}"/>
+                <a16:creationId xmlns:a16="http://schemas.microsoft.com/office/drawing/2014/main" xmlns="" id="{6F76D43D-0DDD-4BAD-8213-BDBF75C30A0C}"/>
               </a:ext>
               <a:ext uri="{C183D7F6-B498-43B3-948B-1728B52AA6E4}">
-                <adec:decorative xmlns="" xmlns:adec="http://schemas.microsoft.com/office/drawing/2017/decorative" val="1"/>
+                <adec:decorative xmlns:adec="http://schemas.microsoft.com/office/drawing/2017/decorative" xmlns="" val="1"/>
               </a:ext>
             </a:extLst>
           </p:cNvPr>
@@ -5838,7 +5838,7 @@
           <p:cNvPr id="8" name="Text Placeholder 3">
             <a:extLst>
               <a:ext uri="{FF2B5EF4-FFF2-40B4-BE49-F238E27FC236}">
-                <a16:creationId xmlns="" xmlns:a16="http://schemas.microsoft.com/office/drawing/2014/main" id="{A6D3ACF3-E1F5-4332-9836-C8E6C46591BB}"/>
+                <a16:creationId xmlns:a16="http://schemas.microsoft.com/office/drawing/2014/main" xmlns="" id="{A6D3ACF3-E1F5-4332-9836-C8E6C46591BB}"/>
               </a:ext>
             </a:extLst>
           </p:cNvPr>
@@ -6077,7 +6077,7 @@
           <p:cNvPr id="2" name="Title 1">
             <a:extLst>
               <a:ext uri="{FF2B5EF4-FFF2-40B4-BE49-F238E27FC236}">
-                <a16:creationId xmlns="" xmlns:a16="http://schemas.microsoft.com/office/drawing/2014/main" id="{0BDF8FE7-66F4-4586-B49B-61E115ED291E}"/>
+                <a16:creationId xmlns:a16="http://schemas.microsoft.com/office/drawing/2014/main" xmlns="" id="{0BDF8FE7-66F4-4586-B49B-61E115ED291E}"/>
               </a:ext>
             </a:extLst>
           </p:cNvPr>
@@ -6113,7 +6113,7 @@
           <p:cNvPr id="6" name="Footer Placeholder 5">
             <a:extLst>
               <a:ext uri="{FF2B5EF4-FFF2-40B4-BE49-F238E27FC236}">
-                <a16:creationId xmlns="" xmlns:a16="http://schemas.microsoft.com/office/drawing/2014/main" id="{AEB5B890-F885-418C-9812-59970CAC6BCD}"/>
+                <a16:creationId xmlns:a16="http://schemas.microsoft.com/office/drawing/2014/main" xmlns="" id="{AEB5B890-F885-418C-9812-59970CAC6BCD}"/>
               </a:ext>
             </a:extLst>
           </p:cNvPr>
@@ -6138,7 +6138,7 @@
           <p:cNvPr id="7" name="Slide Number Placeholder 6">
             <a:extLst>
               <a:ext uri="{FF2B5EF4-FFF2-40B4-BE49-F238E27FC236}">
-                <a16:creationId xmlns="" xmlns:a16="http://schemas.microsoft.com/office/drawing/2014/main" id="{50521507-88DE-417D-8076-D9152E1E1409}"/>
+                <a16:creationId xmlns:a16="http://schemas.microsoft.com/office/drawing/2014/main" xmlns="" id="{50521507-88DE-417D-8076-D9152E1E1409}"/>
               </a:ext>
             </a:extLst>
           </p:cNvPr>
@@ -6168,7 +6168,7 @@
           <p:cNvPr id="4" name="Text Placeholder 3">
             <a:extLst>
               <a:ext uri="{FF2B5EF4-FFF2-40B4-BE49-F238E27FC236}">
-                <a16:creationId xmlns="" xmlns:a16="http://schemas.microsoft.com/office/drawing/2014/main" id="{1DFC7DDD-6F93-45F8-AFD6-95AA051FE809}"/>
+                <a16:creationId xmlns:a16="http://schemas.microsoft.com/office/drawing/2014/main" xmlns="" id="{1DFC7DDD-6F93-45F8-AFD6-95AA051FE809}"/>
               </a:ext>
             </a:extLst>
           </p:cNvPr>
@@ -6212,7 +6212,7 @@
           <p:cNvPr id="21" name="Freeform: Shape 20">
             <a:extLst>
               <a:ext uri="{FF2B5EF4-FFF2-40B4-BE49-F238E27FC236}">
-                <a16:creationId xmlns="" xmlns:a16="http://schemas.microsoft.com/office/drawing/2014/main" id="{D1CD6042-5DF4-4624-BC32-25F68745304A}"/>
+                <a16:creationId xmlns:a16="http://schemas.microsoft.com/office/drawing/2014/main" xmlns="" id="{D1CD6042-5DF4-4624-BC32-25F68745304A}"/>
               </a:ext>
             </a:extLst>
           </p:cNvPr>
@@ -6345,7 +6345,7 @@
           <p:cNvPr id="19" name="Freeform: Shape 18">
             <a:extLst>
               <a:ext uri="{FF2B5EF4-FFF2-40B4-BE49-F238E27FC236}">
-                <a16:creationId xmlns="" xmlns:a16="http://schemas.microsoft.com/office/drawing/2014/main" id="{6294759C-286C-4281-B194-581C766EEF28}"/>
+                <a16:creationId xmlns:a16="http://schemas.microsoft.com/office/drawing/2014/main" xmlns="" id="{6294759C-286C-4281-B194-581C766EEF28}"/>
               </a:ext>
             </a:extLst>
           </p:cNvPr>
@@ -6508,7 +6508,7 @@
           <p:cNvPr id="6" name="Picture Placeholder 23">
             <a:extLst>
               <a:ext uri="{FF2B5EF4-FFF2-40B4-BE49-F238E27FC236}">
-                <a16:creationId xmlns="" xmlns:a16="http://schemas.microsoft.com/office/drawing/2014/main" id="{E6622698-E93D-4214-8C21-38DBE58C2E3F}"/>
+                <a16:creationId xmlns:a16="http://schemas.microsoft.com/office/drawing/2014/main" xmlns="" id="{E6622698-E93D-4214-8C21-38DBE58C2E3F}"/>
               </a:ext>
             </a:extLst>
           </p:cNvPr>
@@ -6646,7 +6646,7 @@
           <p:cNvPr id="9" name="Freeform: Shape 8">
             <a:extLst>
               <a:ext uri="{FF2B5EF4-FFF2-40B4-BE49-F238E27FC236}">
-                <a16:creationId xmlns="" xmlns:a16="http://schemas.microsoft.com/office/drawing/2014/main" id="{1706BC54-FE11-4237-96CC-8DA267DB5D7C}"/>
+                <a16:creationId xmlns:a16="http://schemas.microsoft.com/office/drawing/2014/main" xmlns="" id="{1706BC54-FE11-4237-96CC-8DA267DB5D7C}"/>
               </a:ext>
             </a:extLst>
           </p:cNvPr>
@@ -6805,7 +6805,7 @@
           <p:cNvPr id="2" name="Title 1">
             <a:extLst>
               <a:ext uri="{FF2B5EF4-FFF2-40B4-BE49-F238E27FC236}">
-                <a16:creationId xmlns="" xmlns:a16="http://schemas.microsoft.com/office/drawing/2014/main" id="{DF797B74-E645-46F4-8F77-49AF7F0D443F}"/>
+                <a16:creationId xmlns:a16="http://schemas.microsoft.com/office/drawing/2014/main" xmlns="" id="{DF797B74-E645-46F4-8F77-49AF7F0D443F}"/>
               </a:ext>
             </a:extLst>
           </p:cNvPr>
@@ -6847,7 +6847,7 @@
           <p:cNvPr id="7" name="Footer Placeholder 6">
             <a:extLst>
               <a:ext uri="{FF2B5EF4-FFF2-40B4-BE49-F238E27FC236}">
-                <a16:creationId xmlns="" xmlns:a16="http://schemas.microsoft.com/office/drawing/2014/main" id="{A557D1A2-E2DD-4CD8-B7DB-2864D4A97E02}"/>
+                <a16:creationId xmlns:a16="http://schemas.microsoft.com/office/drawing/2014/main" xmlns="" id="{A557D1A2-E2DD-4CD8-B7DB-2864D4A97E02}"/>
               </a:ext>
             </a:extLst>
           </p:cNvPr>
@@ -6872,7 +6872,7 @@
           <p:cNvPr id="8" name="Slide Number Placeholder 7">
             <a:extLst>
               <a:ext uri="{FF2B5EF4-FFF2-40B4-BE49-F238E27FC236}">
-                <a16:creationId xmlns="" xmlns:a16="http://schemas.microsoft.com/office/drawing/2014/main" id="{86B08B7A-4219-4973-8C9B-BF5BCC64480F}"/>
+                <a16:creationId xmlns:a16="http://schemas.microsoft.com/office/drawing/2014/main" xmlns="" id="{86B08B7A-4219-4973-8C9B-BF5BCC64480F}"/>
               </a:ext>
             </a:extLst>
           </p:cNvPr>
@@ -6902,7 +6902,7 @@
           <p:cNvPr id="5" name="Text Placeholder 4">
             <a:extLst>
               <a:ext uri="{FF2B5EF4-FFF2-40B4-BE49-F238E27FC236}">
-                <a16:creationId xmlns="" xmlns:a16="http://schemas.microsoft.com/office/drawing/2014/main" id="{C430C70C-09F9-40EE-9A89-ED9A5DCFD98D}"/>
+                <a16:creationId xmlns:a16="http://schemas.microsoft.com/office/drawing/2014/main" xmlns="" id="{C430C70C-09F9-40EE-9A89-ED9A5DCFD98D}"/>
               </a:ext>
             </a:extLst>
           </p:cNvPr>
@@ -6977,7 +6977,7 @@
           <p:cNvPr id="13" name="Text Placeholder 12">
             <a:extLst>
               <a:ext uri="{FF2B5EF4-FFF2-40B4-BE49-F238E27FC236}">
-                <a16:creationId xmlns="" xmlns:a16="http://schemas.microsoft.com/office/drawing/2014/main" id="{278D9ACA-AB64-4D04-A5E0-23AC8B81EC2C}"/>
+                <a16:creationId xmlns:a16="http://schemas.microsoft.com/office/drawing/2014/main" xmlns="" id="{278D9ACA-AB64-4D04-A5E0-23AC8B81EC2C}"/>
               </a:ext>
             </a:extLst>
           </p:cNvPr>
@@ -7053,7 +7053,7 @@
           <p:cNvPr id="15" name="Text Placeholder 4">
             <a:extLst>
               <a:ext uri="{FF2B5EF4-FFF2-40B4-BE49-F238E27FC236}">
-                <a16:creationId xmlns="" xmlns:a16="http://schemas.microsoft.com/office/drawing/2014/main" id="{F3B4EB62-0A18-46F9-98F0-E8FC5EBAF37E}"/>
+                <a16:creationId xmlns:a16="http://schemas.microsoft.com/office/drawing/2014/main" xmlns="" id="{F3B4EB62-0A18-46F9-98F0-E8FC5EBAF37E}"/>
               </a:ext>
             </a:extLst>
           </p:cNvPr>
@@ -7128,7 +7128,7 @@
           <p:cNvPr id="16" name="Text Placeholder 12">
             <a:extLst>
               <a:ext uri="{FF2B5EF4-FFF2-40B4-BE49-F238E27FC236}">
-                <a16:creationId xmlns="" xmlns:a16="http://schemas.microsoft.com/office/drawing/2014/main" id="{A3B2D4DF-9952-49C7-B850-559AD0DF27D5}"/>
+                <a16:creationId xmlns:a16="http://schemas.microsoft.com/office/drawing/2014/main" xmlns="" id="{A3B2D4DF-9952-49C7-B850-559AD0DF27D5}"/>
               </a:ext>
             </a:extLst>
           </p:cNvPr>
@@ -7204,7 +7204,7 @@
           <p:cNvPr id="17" name="Text Placeholder 4">
             <a:extLst>
               <a:ext uri="{FF2B5EF4-FFF2-40B4-BE49-F238E27FC236}">
-                <a16:creationId xmlns="" xmlns:a16="http://schemas.microsoft.com/office/drawing/2014/main" id="{BCE373B8-7ADE-4DC4-9900-59147BFA16E7}"/>
+                <a16:creationId xmlns:a16="http://schemas.microsoft.com/office/drawing/2014/main" xmlns="" id="{BCE373B8-7ADE-4DC4-9900-59147BFA16E7}"/>
               </a:ext>
             </a:extLst>
           </p:cNvPr>
@@ -7279,7 +7279,7 @@
           <p:cNvPr id="18" name="Text Placeholder 12">
             <a:extLst>
               <a:ext uri="{FF2B5EF4-FFF2-40B4-BE49-F238E27FC236}">
-                <a16:creationId xmlns="" xmlns:a16="http://schemas.microsoft.com/office/drawing/2014/main" id="{28F027FF-E9AF-4E49-AC44-48D21AD761AA}"/>
+                <a16:creationId xmlns:a16="http://schemas.microsoft.com/office/drawing/2014/main" xmlns="" id="{28F027FF-E9AF-4E49-AC44-48D21AD761AA}"/>
               </a:ext>
             </a:extLst>
           </p:cNvPr>
@@ -7355,7 +7355,7 @@
           <p:cNvPr id="19" name="Text Placeholder 4">
             <a:extLst>
               <a:ext uri="{FF2B5EF4-FFF2-40B4-BE49-F238E27FC236}">
-                <a16:creationId xmlns="" xmlns:a16="http://schemas.microsoft.com/office/drawing/2014/main" id="{3E6D854C-C76F-49BA-9E74-F438CA8EA9E2}"/>
+                <a16:creationId xmlns:a16="http://schemas.microsoft.com/office/drawing/2014/main" xmlns="" id="{3E6D854C-C76F-49BA-9E74-F438CA8EA9E2}"/>
               </a:ext>
             </a:extLst>
           </p:cNvPr>
@@ -7430,7 +7430,7 @@
           <p:cNvPr id="20" name="Text Placeholder 12">
             <a:extLst>
               <a:ext uri="{FF2B5EF4-FFF2-40B4-BE49-F238E27FC236}">
-                <a16:creationId xmlns="" xmlns:a16="http://schemas.microsoft.com/office/drawing/2014/main" id="{AD447D7D-C1F4-4AD4-AE22-EB8E7F1C419E}"/>
+                <a16:creationId xmlns:a16="http://schemas.microsoft.com/office/drawing/2014/main" xmlns="" id="{AD447D7D-C1F4-4AD4-AE22-EB8E7F1C419E}"/>
               </a:ext>
             </a:extLst>
           </p:cNvPr>
@@ -7506,7 +7506,7 @@
           <p:cNvPr id="21" name="Text Placeholder 4">
             <a:extLst>
               <a:ext uri="{FF2B5EF4-FFF2-40B4-BE49-F238E27FC236}">
-                <a16:creationId xmlns="" xmlns:a16="http://schemas.microsoft.com/office/drawing/2014/main" id="{849DF703-38D0-4214-9432-83570E10EFED}"/>
+                <a16:creationId xmlns:a16="http://schemas.microsoft.com/office/drawing/2014/main" xmlns="" id="{849DF703-38D0-4214-9432-83570E10EFED}"/>
               </a:ext>
             </a:extLst>
           </p:cNvPr>
@@ -7581,7 +7581,7 @@
           <p:cNvPr id="22" name="Text Placeholder 12">
             <a:extLst>
               <a:ext uri="{FF2B5EF4-FFF2-40B4-BE49-F238E27FC236}">
-                <a16:creationId xmlns="" xmlns:a16="http://schemas.microsoft.com/office/drawing/2014/main" id="{F9EB6572-1A9F-4672-8E42-A4E15451CA20}"/>
+                <a16:creationId xmlns:a16="http://schemas.microsoft.com/office/drawing/2014/main" xmlns="" id="{F9EB6572-1A9F-4672-8E42-A4E15451CA20}"/>
               </a:ext>
             </a:extLst>
           </p:cNvPr>
@@ -7657,7 +7657,7 @@
           <p:cNvPr id="23" name="Text Placeholder 4">
             <a:extLst>
               <a:ext uri="{FF2B5EF4-FFF2-40B4-BE49-F238E27FC236}">
-                <a16:creationId xmlns="" xmlns:a16="http://schemas.microsoft.com/office/drawing/2014/main" id="{0740EB70-455C-47FF-9A9A-0D78D202ED03}"/>
+                <a16:creationId xmlns:a16="http://schemas.microsoft.com/office/drawing/2014/main" xmlns="" id="{0740EB70-455C-47FF-9A9A-0D78D202ED03}"/>
               </a:ext>
             </a:extLst>
           </p:cNvPr>
@@ -7732,7 +7732,7 @@
           <p:cNvPr id="24" name="Text Placeholder 12">
             <a:extLst>
               <a:ext uri="{FF2B5EF4-FFF2-40B4-BE49-F238E27FC236}">
-                <a16:creationId xmlns="" xmlns:a16="http://schemas.microsoft.com/office/drawing/2014/main" id="{CD9A5773-4F50-4631-9B7A-0A2D83E5DC28}"/>
+                <a16:creationId xmlns:a16="http://schemas.microsoft.com/office/drawing/2014/main" xmlns="" id="{CD9A5773-4F50-4631-9B7A-0A2D83E5DC28}"/>
               </a:ext>
             </a:extLst>
           </p:cNvPr>
@@ -7838,7 +7838,7 @@
           <p:cNvPr id="25" name="Freeform: Shape 24">
             <a:extLst>
               <a:ext uri="{FF2B5EF4-FFF2-40B4-BE49-F238E27FC236}">
-                <a16:creationId xmlns="" xmlns:a16="http://schemas.microsoft.com/office/drawing/2014/main" id="{45350A6A-6F84-47F4-AE00-8295D96D08C8}"/>
+                <a16:creationId xmlns:a16="http://schemas.microsoft.com/office/drawing/2014/main" xmlns="" id="{45350A6A-6F84-47F4-AE00-8295D96D08C8}"/>
               </a:ext>
             </a:extLst>
           </p:cNvPr>
@@ -7971,7 +7971,7 @@
           <p:cNvPr id="20" name="Text Placeholder 3">
             <a:extLst>
               <a:ext uri="{FF2B5EF4-FFF2-40B4-BE49-F238E27FC236}">
-                <a16:creationId xmlns="" xmlns:a16="http://schemas.microsoft.com/office/drawing/2014/main" id="{6A395197-9758-40F0-B747-F8B134C175EB}"/>
+                <a16:creationId xmlns:a16="http://schemas.microsoft.com/office/drawing/2014/main" xmlns="" id="{6A395197-9758-40F0-B747-F8B134C175EB}"/>
               </a:ext>
             </a:extLst>
           </p:cNvPr>
@@ -8210,7 +8210,7 @@
           <p:cNvPr id="2" name="Title 1">
             <a:extLst>
               <a:ext uri="{FF2B5EF4-FFF2-40B4-BE49-F238E27FC236}">
-                <a16:creationId xmlns="" xmlns:a16="http://schemas.microsoft.com/office/drawing/2014/main" id="{DF797B74-E645-46F4-8F77-49AF7F0D443F}"/>
+                <a16:creationId xmlns:a16="http://schemas.microsoft.com/office/drawing/2014/main" xmlns="" id="{DF797B74-E645-46F4-8F77-49AF7F0D443F}"/>
               </a:ext>
             </a:extLst>
           </p:cNvPr>
@@ -8251,7 +8251,7 @@
           <p:cNvPr id="7" name="Footer Placeholder 6">
             <a:extLst>
               <a:ext uri="{FF2B5EF4-FFF2-40B4-BE49-F238E27FC236}">
-                <a16:creationId xmlns="" xmlns:a16="http://schemas.microsoft.com/office/drawing/2014/main" id="{A557D1A2-E2DD-4CD8-B7DB-2864D4A97E02}"/>
+                <a16:creationId xmlns:a16="http://schemas.microsoft.com/office/drawing/2014/main" xmlns="" id="{A557D1A2-E2DD-4CD8-B7DB-2864D4A97E02}"/>
               </a:ext>
             </a:extLst>
           </p:cNvPr>
@@ -8276,7 +8276,7 @@
           <p:cNvPr id="8" name="Slide Number Placeholder 7">
             <a:extLst>
               <a:ext uri="{FF2B5EF4-FFF2-40B4-BE49-F238E27FC236}">
-                <a16:creationId xmlns="" xmlns:a16="http://schemas.microsoft.com/office/drawing/2014/main" id="{86B08B7A-4219-4973-8C9B-BF5BCC64480F}"/>
+                <a16:creationId xmlns:a16="http://schemas.microsoft.com/office/drawing/2014/main" xmlns="" id="{86B08B7A-4219-4973-8C9B-BF5BCC64480F}"/>
               </a:ext>
             </a:extLst>
           </p:cNvPr>
@@ -8306,7 +8306,7 @@
           <p:cNvPr id="5" name="Text Placeholder 4">
             <a:extLst>
               <a:ext uri="{FF2B5EF4-FFF2-40B4-BE49-F238E27FC236}">
-                <a16:creationId xmlns="" xmlns:a16="http://schemas.microsoft.com/office/drawing/2014/main" id="{C430C70C-09F9-40EE-9A89-ED9A5DCFD98D}"/>
+                <a16:creationId xmlns:a16="http://schemas.microsoft.com/office/drawing/2014/main" xmlns="" id="{C430C70C-09F9-40EE-9A89-ED9A5DCFD98D}"/>
               </a:ext>
             </a:extLst>
           </p:cNvPr>
@@ -8385,7 +8385,7 @@
           <p:cNvPr id="13" name="Text Placeholder 12">
             <a:extLst>
               <a:ext uri="{FF2B5EF4-FFF2-40B4-BE49-F238E27FC236}">
-                <a16:creationId xmlns="" xmlns:a16="http://schemas.microsoft.com/office/drawing/2014/main" id="{278D9ACA-AB64-4D04-A5E0-23AC8B81EC2C}"/>
+                <a16:creationId xmlns:a16="http://schemas.microsoft.com/office/drawing/2014/main" xmlns="" id="{278D9ACA-AB64-4D04-A5E0-23AC8B81EC2C}"/>
               </a:ext>
             </a:extLst>
           </p:cNvPr>
@@ -8464,7 +8464,7 @@
           <p:cNvPr id="15" name="Text Placeholder 4">
             <a:extLst>
               <a:ext uri="{FF2B5EF4-FFF2-40B4-BE49-F238E27FC236}">
-                <a16:creationId xmlns="" xmlns:a16="http://schemas.microsoft.com/office/drawing/2014/main" id="{F3B4EB62-0A18-46F9-98F0-E8FC5EBAF37E}"/>
+                <a16:creationId xmlns:a16="http://schemas.microsoft.com/office/drawing/2014/main" xmlns="" id="{F3B4EB62-0A18-46F9-98F0-E8FC5EBAF37E}"/>
               </a:ext>
             </a:extLst>
           </p:cNvPr>
@@ -8543,7 +8543,7 @@
           <p:cNvPr id="16" name="Text Placeholder 12">
             <a:extLst>
               <a:ext uri="{FF2B5EF4-FFF2-40B4-BE49-F238E27FC236}">
-                <a16:creationId xmlns="" xmlns:a16="http://schemas.microsoft.com/office/drawing/2014/main" id="{A3B2D4DF-9952-49C7-B850-559AD0DF27D5}"/>
+                <a16:creationId xmlns:a16="http://schemas.microsoft.com/office/drawing/2014/main" xmlns="" id="{A3B2D4DF-9952-49C7-B850-559AD0DF27D5}"/>
               </a:ext>
             </a:extLst>
           </p:cNvPr>
@@ -8622,7 +8622,7 @@
           <p:cNvPr id="17" name="Text Placeholder 4">
             <a:extLst>
               <a:ext uri="{FF2B5EF4-FFF2-40B4-BE49-F238E27FC236}">
-                <a16:creationId xmlns="" xmlns:a16="http://schemas.microsoft.com/office/drawing/2014/main" id="{BCE373B8-7ADE-4DC4-9900-59147BFA16E7}"/>
+                <a16:creationId xmlns:a16="http://schemas.microsoft.com/office/drawing/2014/main" xmlns="" id="{BCE373B8-7ADE-4DC4-9900-59147BFA16E7}"/>
               </a:ext>
             </a:extLst>
           </p:cNvPr>
@@ -8701,7 +8701,7 @@
           <p:cNvPr id="18" name="Text Placeholder 12">
             <a:extLst>
               <a:ext uri="{FF2B5EF4-FFF2-40B4-BE49-F238E27FC236}">
-                <a16:creationId xmlns="" xmlns:a16="http://schemas.microsoft.com/office/drawing/2014/main" id="{28F027FF-E9AF-4E49-AC44-48D21AD761AA}"/>
+                <a16:creationId xmlns:a16="http://schemas.microsoft.com/office/drawing/2014/main" xmlns="" id="{28F027FF-E9AF-4E49-AC44-48D21AD761AA}"/>
               </a:ext>
             </a:extLst>
           </p:cNvPr>
@@ -8780,7 +8780,7 @@
           <p:cNvPr id="29" name="Picture Placeholder 25">
             <a:extLst>
               <a:ext uri="{FF2B5EF4-FFF2-40B4-BE49-F238E27FC236}">
-                <a16:creationId xmlns="" xmlns:a16="http://schemas.microsoft.com/office/drawing/2014/main" id="{8989EC4C-4E3F-457F-8CF6-8A88DE68A930}"/>
+                <a16:creationId xmlns:a16="http://schemas.microsoft.com/office/drawing/2014/main" xmlns="" id="{8989EC4C-4E3F-457F-8CF6-8A88DE68A930}"/>
               </a:ext>
             </a:extLst>
           </p:cNvPr>
@@ -8822,7 +8822,7 @@
           <p:cNvPr id="30" name="Picture Placeholder 25">
             <a:extLst>
               <a:ext uri="{FF2B5EF4-FFF2-40B4-BE49-F238E27FC236}">
-                <a16:creationId xmlns="" xmlns:a16="http://schemas.microsoft.com/office/drawing/2014/main" id="{67FB2730-3D12-4D72-AE64-AC3955C5CD99}"/>
+                <a16:creationId xmlns:a16="http://schemas.microsoft.com/office/drawing/2014/main" xmlns="" id="{67FB2730-3D12-4D72-AE64-AC3955C5CD99}"/>
               </a:ext>
             </a:extLst>
           </p:cNvPr>
@@ -8864,7 +8864,7 @@
           <p:cNvPr id="31" name="Picture Placeholder 25">
             <a:extLst>
               <a:ext uri="{FF2B5EF4-FFF2-40B4-BE49-F238E27FC236}">
-                <a16:creationId xmlns="" xmlns:a16="http://schemas.microsoft.com/office/drawing/2014/main" id="{4F2BB90C-4866-4DB3-B05C-0BB7DBFF8EA3}"/>
+                <a16:creationId xmlns:a16="http://schemas.microsoft.com/office/drawing/2014/main" xmlns="" id="{4F2BB90C-4866-4DB3-B05C-0BB7DBFF8EA3}"/>
               </a:ext>
             </a:extLst>
           </p:cNvPr>
@@ -8906,7 +8906,7 @@
           <p:cNvPr id="21" name="Text Placeholder 3">
             <a:extLst>
               <a:ext uri="{FF2B5EF4-FFF2-40B4-BE49-F238E27FC236}">
-                <a16:creationId xmlns="" xmlns:a16="http://schemas.microsoft.com/office/drawing/2014/main" id="{7A3E4BF3-C44A-4FB6-B64A-05FB5AEC7577}"/>
+                <a16:creationId xmlns:a16="http://schemas.microsoft.com/office/drawing/2014/main" xmlns="" id="{7A3E4BF3-C44A-4FB6-B64A-05FB5AEC7577}"/>
               </a:ext>
             </a:extLst>
           </p:cNvPr>
@@ -8950,7 +8950,7 @@
           <p:cNvPr id="26" name="Freeform: Shape 25">
             <a:extLst>
               <a:ext uri="{FF2B5EF4-FFF2-40B4-BE49-F238E27FC236}">
-                <a16:creationId xmlns="" xmlns:a16="http://schemas.microsoft.com/office/drawing/2014/main" id="{AEA98CFA-B2A7-4BCC-B1DC-01CFAD2DD65E}"/>
+                <a16:creationId xmlns:a16="http://schemas.microsoft.com/office/drawing/2014/main" xmlns="" id="{AEA98CFA-B2A7-4BCC-B1DC-01CFAD2DD65E}"/>
               </a:ext>
             </a:extLst>
           </p:cNvPr>
@@ -9113,7 +9113,7 @@
           <p:cNvPr id="25" name="Freeform: Shape 24">
             <a:extLst>
               <a:ext uri="{FF2B5EF4-FFF2-40B4-BE49-F238E27FC236}">
-                <a16:creationId xmlns="" xmlns:a16="http://schemas.microsoft.com/office/drawing/2014/main" id="{E752CBEE-7696-40FC-AB0E-8790B179D18C}"/>
+                <a16:creationId xmlns:a16="http://schemas.microsoft.com/office/drawing/2014/main" xmlns="" id="{E752CBEE-7696-40FC-AB0E-8790B179D18C}"/>
               </a:ext>
             </a:extLst>
           </p:cNvPr>
@@ -9246,7 +9246,7 @@
           <p:cNvPr id="20" name="Text Placeholder 3">
             <a:extLst>
               <a:ext uri="{FF2B5EF4-FFF2-40B4-BE49-F238E27FC236}">
-                <a16:creationId xmlns="" xmlns:a16="http://schemas.microsoft.com/office/drawing/2014/main" id="{6A395197-9758-40F0-B747-F8B134C175EB}"/>
+                <a16:creationId xmlns:a16="http://schemas.microsoft.com/office/drawing/2014/main" xmlns="" id="{6A395197-9758-40F0-B747-F8B134C175EB}"/>
               </a:ext>
             </a:extLst>
           </p:cNvPr>
@@ -9485,7 +9485,7 @@
           <p:cNvPr id="2" name="Title 1">
             <a:extLst>
               <a:ext uri="{FF2B5EF4-FFF2-40B4-BE49-F238E27FC236}">
-                <a16:creationId xmlns="" xmlns:a16="http://schemas.microsoft.com/office/drawing/2014/main" id="{DF797B74-E645-46F4-8F77-49AF7F0D443F}"/>
+                <a16:creationId xmlns:a16="http://schemas.microsoft.com/office/drawing/2014/main" xmlns="" id="{DF797B74-E645-46F4-8F77-49AF7F0D443F}"/>
               </a:ext>
             </a:extLst>
           </p:cNvPr>
@@ -9526,7 +9526,7 @@
           <p:cNvPr id="21" name="Text Placeholder 3">
             <a:extLst>
               <a:ext uri="{FF2B5EF4-FFF2-40B4-BE49-F238E27FC236}">
-                <a16:creationId xmlns="" xmlns:a16="http://schemas.microsoft.com/office/drawing/2014/main" id="{7A3E4BF3-C44A-4FB6-B64A-05FB5AEC7577}"/>
+                <a16:creationId xmlns:a16="http://schemas.microsoft.com/office/drawing/2014/main" xmlns="" id="{7A3E4BF3-C44A-4FB6-B64A-05FB5AEC7577}"/>
               </a:ext>
             </a:extLst>
           </p:cNvPr>
@@ -9570,7 +9570,7 @@
           <p:cNvPr id="7" name="Footer Placeholder 6">
             <a:extLst>
               <a:ext uri="{FF2B5EF4-FFF2-40B4-BE49-F238E27FC236}">
-                <a16:creationId xmlns="" xmlns:a16="http://schemas.microsoft.com/office/drawing/2014/main" id="{A557D1A2-E2DD-4CD8-B7DB-2864D4A97E02}"/>
+                <a16:creationId xmlns:a16="http://schemas.microsoft.com/office/drawing/2014/main" xmlns="" id="{A557D1A2-E2DD-4CD8-B7DB-2864D4A97E02}"/>
               </a:ext>
             </a:extLst>
           </p:cNvPr>
@@ -9595,7 +9595,7 @@
           <p:cNvPr id="8" name="Slide Number Placeholder 7">
             <a:extLst>
               <a:ext uri="{FF2B5EF4-FFF2-40B4-BE49-F238E27FC236}">
-                <a16:creationId xmlns="" xmlns:a16="http://schemas.microsoft.com/office/drawing/2014/main" id="{86B08B7A-4219-4973-8C9B-BF5BCC64480F}"/>
+                <a16:creationId xmlns:a16="http://schemas.microsoft.com/office/drawing/2014/main" xmlns="" id="{86B08B7A-4219-4973-8C9B-BF5BCC64480F}"/>
               </a:ext>
             </a:extLst>
           </p:cNvPr>
@@ -9625,7 +9625,7 @@
           <p:cNvPr id="26" name="Freeform: Shape 25">
             <a:extLst>
               <a:ext uri="{FF2B5EF4-FFF2-40B4-BE49-F238E27FC236}">
-                <a16:creationId xmlns="" xmlns:a16="http://schemas.microsoft.com/office/drawing/2014/main" id="{89445125-53D2-43B3-8ABC-C88E463BE7DD}"/>
+                <a16:creationId xmlns:a16="http://schemas.microsoft.com/office/drawing/2014/main" xmlns="" id="{89445125-53D2-43B3-8ABC-C88E463BE7DD}"/>
               </a:ext>
             </a:extLst>
           </p:cNvPr>
@@ -9788,7 +9788,7 @@
           <p:cNvPr id="24" name="Picture Placeholder 23">
             <a:extLst>
               <a:ext uri="{FF2B5EF4-FFF2-40B4-BE49-F238E27FC236}">
-                <a16:creationId xmlns="" xmlns:a16="http://schemas.microsoft.com/office/drawing/2014/main" id="{767CE6DD-011B-4E2D-9E8A-EFF414E39EEA}"/>
+                <a16:creationId xmlns:a16="http://schemas.microsoft.com/office/drawing/2014/main" xmlns="" id="{767CE6DD-011B-4E2D-9E8A-EFF414E39EEA}"/>
               </a:ext>
             </a:extLst>
           </p:cNvPr>
@@ -9926,7 +9926,7 @@
           <p:cNvPr id="2" name="Title 1">
             <a:extLst>
               <a:ext uri="{FF2B5EF4-FFF2-40B4-BE49-F238E27FC236}">
-                <a16:creationId xmlns="" xmlns:a16="http://schemas.microsoft.com/office/drawing/2014/main" id="{DF797B74-E645-46F4-8F77-49AF7F0D443F}"/>
+                <a16:creationId xmlns:a16="http://schemas.microsoft.com/office/drawing/2014/main" xmlns="" id="{DF797B74-E645-46F4-8F77-49AF7F0D443F}"/>
               </a:ext>
             </a:extLst>
           </p:cNvPr>
@@ -9968,7 +9968,7 @@
           <p:cNvPr id="7" name="Footer Placeholder 6">
             <a:extLst>
               <a:ext uri="{FF2B5EF4-FFF2-40B4-BE49-F238E27FC236}">
-                <a16:creationId xmlns="" xmlns:a16="http://schemas.microsoft.com/office/drawing/2014/main" id="{A557D1A2-E2DD-4CD8-B7DB-2864D4A97E02}"/>
+                <a16:creationId xmlns:a16="http://schemas.microsoft.com/office/drawing/2014/main" xmlns="" id="{A557D1A2-E2DD-4CD8-B7DB-2864D4A97E02}"/>
               </a:ext>
             </a:extLst>
           </p:cNvPr>
@@ -10001,7 +10001,7 @@
           <p:cNvPr id="8" name="Slide Number Placeholder 7">
             <a:extLst>
               <a:ext uri="{FF2B5EF4-FFF2-40B4-BE49-F238E27FC236}">
-                <a16:creationId xmlns="" xmlns:a16="http://schemas.microsoft.com/office/drawing/2014/main" id="{86B08B7A-4219-4973-8C9B-BF5BCC64480F}"/>
+                <a16:creationId xmlns:a16="http://schemas.microsoft.com/office/drawing/2014/main" xmlns="" id="{86B08B7A-4219-4973-8C9B-BF5BCC64480F}"/>
               </a:ext>
             </a:extLst>
           </p:cNvPr>
@@ -10031,7 +10031,7 @@
           <p:cNvPr id="9" name="Freeform: Shape 8">
             <a:extLst>
               <a:ext uri="{FF2B5EF4-FFF2-40B4-BE49-F238E27FC236}">
-                <a16:creationId xmlns="" xmlns:a16="http://schemas.microsoft.com/office/drawing/2014/main" id="{C6E75A4B-2655-4B0E-8D3B-0068F57D3D9B}"/>
+                <a16:creationId xmlns:a16="http://schemas.microsoft.com/office/drawing/2014/main" xmlns="" id="{C6E75A4B-2655-4B0E-8D3B-0068F57D3D9B}"/>
               </a:ext>
             </a:extLst>
           </p:cNvPr>
@@ -10190,7 +10190,7 @@
           <p:cNvPr id="23" name="Text Placeholder 3">
             <a:extLst>
               <a:ext uri="{FF2B5EF4-FFF2-40B4-BE49-F238E27FC236}">
-                <a16:creationId xmlns="" xmlns:a16="http://schemas.microsoft.com/office/drawing/2014/main" id="{0A18EF7D-14D0-4362-B8BD-722D3D54D429}"/>
+                <a16:creationId xmlns:a16="http://schemas.microsoft.com/office/drawing/2014/main" xmlns="" id="{0A18EF7D-14D0-4362-B8BD-722D3D54D429}"/>
               </a:ext>
             </a:extLst>
           </p:cNvPr>
@@ -10272,7 +10272,7 @@
           <p:cNvPr id="11" name="Rectangle 10">
             <a:extLst>
               <a:ext uri="{FF2B5EF4-FFF2-40B4-BE49-F238E27FC236}">
-                <a16:creationId xmlns="" xmlns:a16="http://schemas.microsoft.com/office/drawing/2014/main" id="{567FF01B-795B-4F5D-87AF-6CAA8DD5D48A}"/>
+                <a16:creationId xmlns:a16="http://schemas.microsoft.com/office/drawing/2014/main" xmlns="" id="{567FF01B-795B-4F5D-87AF-6CAA8DD5D48A}"/>
               </a:ext>
             </a:extLst>
           </p:cNvPr>
@@ -10330,7 +10330,7 @@
           <p:cNvPr id="21" name="Text Placeholder 3">
             <a:extLst>
               <a:ext uri="{FF2B5EF4-FFF2-40B4-BE49-F238E27FC236}">
-                <a16:creationId xmlns="" xmlns:a16="http://schemas.microsoft.com/office/drawing/2014/main" id="{7A3E4BF3-C44A-4FB6-B64A-05FB5AEC7577}"/>
+                <a16:creationId xmlns:a16="http://schemas.microsoft.com/office/drawing/2014/main" xmlns="" id="{7A3E4BF3-C44A-4FB6-B64A-05FB5AEC7577}"/>
               </a:ext>
             </a:extLst>
           </p:cNvPr>
@@ -10374,7 +10374,7 @@
           <p:cNvPr id="7" name="Footer Placeholder 6">
             <a:extLst>
               <a:ext uri="{FF2B5EF4-FFF2-40B4-BE49-F238E27FC236}">
-                <a16:creationId xmlns="" xmlns:a16="http://schemas.microsoft.com/office/drawing/2014/main" id="{A557D1A2-E2DD-4CD8-B7DB-2864D4A97E02}"/>
+                <a16:creationId xmlns:a16="http://schemas.microsoft.com/office/drawing/2014/main" xmlns="" id="{A557D1A2-E2DD-4CD8-B7DB-2864D4A97E02}"/>
               </a:ext>
             </a:extLst>
           </p:cNvPr>
@@ -10399,7 +10399,7 @@
           <p:cNvPr id="8" name="Slide Number Placeholder 7">
             <a:extLst>
               <a:ext uri="{FF2B5EF4-FFF2-40B4-BE49-F238E27FC236}">
-                <a16:creationId xmlns="" xmlns:a16="http://schemas.microsoft.com/office/drawing/2014/main" id="{86B08B7A-4219-4973-8C9B-BF5BCC64480F}"/>
+                <a16:creationId xmlns:a16="http://schemas.microsoft.com/office/drawing/2014/main" xmlns="" id="{86B08B7A-4219-4973-8C9B-BF5BCC64480F}"/>
               </a:ext>
             </a:extLst>
           </p:cNvPr>
@@ -10429,7 +10429,7 @@
           <p:cNvPr id="3" name="Title 2">
             <a:extLst>
               <a:ext uri="{FF2B5EF4-FFF2-40B4-BE49-F238E27FC236}">
-                <a16:creationId xmlns="" xmlns:a16="http://schemas.microsoft.com/office/drawing/2014/main" id="{72F32FC1-1FF6-4874-9835-EB1A90F7E9F5}"/>
+                <a16:creationId xmlns:a16="http://schemas.microsoft.com/office/drawing/2014/main" xmlns="" id="{72F32FC1-1FF6-4874-9835-EB1A90F7E9F5}"/>
               </a:ext>
             </a:extLst>
           </p:cNvPr>
@@ -10457,7 +10457,7 @@
           <p:cNvPr id="10" name="Freeform: Shape 9">
             <a:extLst>
               <a:ext uri="{FF2B5EF4-FFF2-40B4-BE49-F238E27FC236}">
-                <a16:creationId xmlns="" xmlns:a16="http://schemas.microsoft.com/office/drawing/2014/main" id="{83039E70-36A3-46C1-B30E-CA4CC0B36C5D}"/>
+                <a16:creationId xmlns:a16="http://schemas.microsoft.com/office/drawing/2014/main" xmlns="" id="{83039E70-36A3-46C1-B30E-CA4CC0B36C5D}"/>
               </a:ext>
             </a:extLst>
           </p:cNvPr>
@@ -10659,7 +10659,7 @@
           <p:cNvPr id="2" name="Title Placeholder 1">
             <a:extLst>
               <a:ext uri="{FF2B5EF4-FFF2-40B4-BE49-F238E27FC236}">
-                <a16:creationId xmlns="" xmlns:a16="http://schemas.microsoft.com/office/drawing/2014/main" id="{59A5246D-ECE9-473C-953D-D56C3F7B32F8}"/>
+                <a16:creationId xmlns:a16="http://schemas.microsoft.com/office/drawing/2014/main" xmlns="" id="{59A5246D-ECE9-473C-953D-D56C3F7B32F8}"/>
               </a:ext>
             </a:extLst>
           </p:cNvPr>
@@ -10698,7 +10698,7 @@
           <p:cNvPr id="3" name="Text Placeholder 2">
             <a:extLst>
               <a:ext uri="{FF2B5EF4-FFF2-40B4-BE49-F238E27FC236}">
-                <a16:creationId xmlns="" xmlns:a16="http://schemas.microsoft.com/office/drawing/2014/main" id="{65D946F0-677D-45B4-83B9-FD3BD3FFCA3C}"/>
+                <a16:creationId xmlns:a16="http://schemas.microsoft.com/office/drawing/2014/main" xmlns="" id="{65D946F0-677D-45B4-83B9-FD3BD3FFCA3C}"/>
               </a:ext>
             </a:extLst>
           </p:cNvPr>
@@ -10765,7 +10765,7 @@
           <p:cNvPr id="5" name="Footer Placeholder 4">
             <a:extLst>
               <a:ext uri="{FF2B5EF4-FFF2-40B4-BE49-F238E27FC236}">
-                <a16:creationId xmlns="" xmlns:a16="http://schemas.microsoft.com/office/drawing/2014/main" id="{1445BE21-FA72-48F5-9A53-134902BF63DC}"/>
+                <a16:creationId xmlns:a16="http://schemas.microsoft.com/office/drawing/2014/main" xmlns="" id="{1445BE21-FA72-48F5-9A53-134902BF63DC}"/>
               </a:ext>
             </a:extLst>
           </p:cNvPr>
@@ -10808,7 +10808,7 @@
           <p:cNvPr id="6" name="Slide Number Placeholder 5">
             <a:extLst>
               <a:ext uri="{FF2B5EF4-FFF2-40B4-BE49-F238E27FC236}">
-                <a16:creationId xmlns="" xmlns:a16="http://schemas.microsoft.com/office/drawing/2014/main" id="{70F79B29-5421-49A7-A511-D916B66A8890}"/>
+                <a16:creationId xmlns:a16="http://schemas.microsoft.com/office/drawing/2014/main" xmlns="" id="{70F79B29-5421-49A7-A511-D916B66A8890}"/>
               </a:ext>
             </a:extLst>
           </p:cNvPr>
@@ -11215,7 +11215,7 @@
           <p:cNvPr id="14" name="Picture Placeholder 13">
             <a:extLst>
               <a:ext uri="{FF2B5EF4-FFF2-40B4-BE49-F238E27FC236}">
-                <a16:creationId xmlns="" xmlns:a16="http://schemas.microsoft.com/office/drawing/2014/main" id="{8F02F647-7DBC-4618-AFF3-8CED69C5CDEF}"/>
+                <a16:creationId xmlns:a16="http://schemas.microsoft.com/office/drawing/2014/main" xmlns="" id="{8F02F647-7DBC-4618-AFF3-8CED69C5CDEF}"/>
               </a:ext>
             </a:extLst>
           </p:cNvPr>
@@ -11250,7 +11250,7 @@
           <p:cNvPr id="3" name="Title 2">
             <a:extLst>
               <a:ext uri="{FF2B5EF4-FFF2-40B4-BE49-F238E27FC236}">
-                <a16:creationId xmlns="" xmlns:a16="http://schemas.microsoft.com/office/drawing/2014/main" id="{B8D8E648-93B0-47FF-A306-492EFF7FC499}"/>
+                <a16:creationId xmlns:a16="http://schemas.microsoft.com/office/drawing/2014/main" xmlns="" id="{B8D8E648-93B0-47FF-A306-492EFF7FC499}"/>
               </a:ext>
             </a:extLst>
           </p:cNvPr>
@@ -11295,7 +11295,7 @@
           <p:cNvPr id="4" name="Subtitle 3">
             <a:extLst>
               <a:ext uri="{FF2B5EF4-FFF2-40B4-BE49-F238E27FC236}">
-                <a16:creationId xmlns="" xmlns:a16="http://schemas.microsoft.com/office/drawing/2014/main" id="{64857D70-F12B-4E1B-99F8-92DAD4349846}"/>
+                <a16:creationId xmlns:a16="http://schemas.microsoft.com/office/drawing/2014/main" xmlns="" id="{64857D70-F12B-4E1B-99F8-92DAD4349846}"/>
               </a:ext>
             </a:extLst>
           </p:cNvPr>
@@ -11328,12 +11328,20 @@
           <a:lstStyle/>
           <a:p>
             <a:r>
+              <a:rPr lang="en-US" smtClean="0">
+                <a:solidFill>
+                  <a:schemeClr val="bg1"/>
+                </a:solidFill>
+              </a:rPr>
+              <a:t>Holmes </a:t>
+            </a:r>
+            <a:r>
               <a:rPr lang="en-US" dirty="0" smtClean="0">
                 <a:solidFill>
                   <a:schemeClr val="bg1"/>
                 </a:solidFill>
               </a:rPr>
-              <a:t>Blake and Schwan</a:t>
+              <a:t>and Schwan</a:t>
             </a:r>
             <a:endParaRPr lang="en-US" dirty="0">
               <a:solidFill>
@@ -11348,7 +11356,7 @@
           <p:cNvPr id="5" name="object 7" descr="Beige rectangle">
             <a:extLst>
               <a:ext uri="{FF2B5EF4-FFF2-40B4-BE49-F238E27FC236}">
-                <a16:creationId xmlns="" xmlns:a16="http://schemas.microsoft.com/office/drawing/2014/main" id="{C85C272F-FCB2-478D-9E03-EC734D1AB6C0}"/>
+                <a16:creationId xmlns:a16="http://schemas.microsoft.com/office/drawing/2014/main" xmlns="" id="{C85C272F-FCB2-478D-9E03-EC734D1AB6C0}"/>
               </a:ext>
             </a:extLst>
           </p:cNvPr>
@@ -11396,10 +11404,10 @@
           <p:cNvPr id="15" name="Rectangle 14">
             <a:extLst>
               <a:ext uri="{FF2B5EF4-FFF2-40B4-BE49-F238E27FC236}">
-                <a16:creationId xmlns="" xmlns:a16="http://schemas.microsoft.com/office/drawing/2014/main" id="{DA136CB0-4ED9-43FA-81D5-6D3225795A7D}"/>
+                <a16:creationId xmlns:a16="http://schemas.microsoft.com/office/drawing/2014/main" xmlns="" id="{DA136CB0-4ED9-43FA-81D5-6D3225795A7D}"/>
               </a:ext>
               <a:ext uri="{C183D7F6-B498-43B3-948B-1728B52AA6E4}">
-                <adec:decorative xmlns="" xmlns:adec="http://schemas.microsoft.com/office/drawing/2017/decorative" val="1"/>
+                <adec:decorative xmlns:adec="http://schemas.microsoft.com/office/drawing/2017/decorative" xmlns="" val="1"/>
               </a:ext>
             </a:extLst>
           </p:cNvPr>
@@ -11483,7 +11491,7 @@
           <p:cNvPr id="28" name="Picture Placeholder 27" descr="Woman walking through a door">
             <a:extLst>
               <a:ext uri="{FF2B5EF4-FFF2-40B4-BE49-F238E27FC236}">
-                <a16:creationId xmlns="" xmlns:a16="http://schemas.microsoft.com/office/drawing/2014/main" id="{86D7D4AC-BE7B-45B9-AF4A-E2AF1B6C796D}"/>
+                <a16:creationId xmlns:a16="http://schemas.microsoft.com/office/drawing/2014/main" xmlns="" id="{86D7D4AC-BE7B-45B9-AF4A-E2AF1B6C796D}"/>
               </a:ext>
             </a:extLst>
           </p:cNvPr>
@@ -11517,10 +11525,10 @@
           <p:cNvPr id="15" name="Rectangle 14">
             <a:extLst>
               <a:ext uri="{FF2B5EF4-FFF2-40B4-BE49-F238E27FC236}">
-                <a16:creationId xmlns="" xmlns:a16="http://schemas.microsoft.com/office/drawing/2014/main" id="{DD509E5E-F68C-4F2B-8EC7-4325958603E7}"/>
+                <a16:creationId xmlns:a16="http://schemas.microsoft.com/office/drawing/2014/main" xmlns="" id="{DD509E5E-F68C-4F2B-8EC7-4325958603E7}"/>
               </a:ext>
               <a:ext uri="{C183D7F6-B498-43B3-948B-1728B52AA6E4}">
-                <adec:decorative xmlns="" xmlns:adec="http://schemas.microsoft.com/office/drawing/2017/decorative" val="1"/>
+                <adec:decorative xmlns:adec="http://schemas.microsoft.com/office/drawing/2017/decorative" xmlns="" val="1"/>
               </a:ext>
             </a:extLst>
           </p:cNvPr>
@@ -11574,7 +11582,7 @@
           <p:cNvPr id="4" name="Text Placeholder 3">
             <a:extLst>
               <a:ext uri="{FF2B5EF4-FFF2-40B4-BE49-F238E27FC236}">
-                <a16:creationId xmlns="" xmlns:a16="http://schemas.microsoft.com/office/drawing/2014/main" id="{9AF7E39F-041F-4A45-A1CF-F8C269887D5A}"/>
+                <a16:creationId xmlns:a16="http://schemas.microsoft.com/office/drawing/2014/main" xmlns="" id="{9AF7E39F-041F-4A45-A1CF-F8C269887D5A}"/>
               </a:ext>
             </a:extLst>
           </p:cNvPr>
@@ -11629,7 +11637,7 @@
           <p:cNvPr id="3" name="Title 2">
             <a:extLst>
               <a:ext uri="{FF2B5EF4-FFF2-40B4-BE49-F238E27FC236}">
-                <a16:creationId xmlns="" xmlns:a16="http://schemas.microsoft.com/office/drawing/2014/main" id="{E9BE4A06-2673-41EF-AF84-96B0EDEC0F01}"/>
+                <a16:creationId xmlns:a16="http://schemas.microsoft.com/office/drawing/2014/main" xmlns="" id="{E9BE4A06-2673-41EF-AF84-96B0EDEC0F01}"/>
               </a:ext>
             </a:extLst>
           </p:cNvPr>
@@ -11663,7 +11671,7 @@
           <p:cNvPr id="9" name="object 7" descr="Beige rectangle">
             <a:extLst>
               <a:ext uri="{FF2B5EF4-FFF2-40B4-BE49-F238E27FC236}">
-                <a16:creationId xmlns="" xmlns:a16="http://schemas.microsoft.com/office/drawing/2014/main" id="{400AB11A-4D5E-4CDE-BB60-C8578F59C3E0}"/>
+                <a16:creationId xmlns:a16="http://schemas.microsoft.com/office/drawing/2014/main" xmlns="" id="{400AB11A-4D5E-4CDE-BB60-C8578F59C3E0}"/>
               </a:ext>
             </a:extLst>
           </p:cNvPr>
@@ -11711,10 +11719,10 @@
           <p:cNvPr id="48" name="Rectangle 47">
             <a:extLst>
               <a:ext uri="{FF2B5EF4-FFF2-40B4-BE49-F238E27FC236}">
-                <a16:creationId xmlns="" xmlns:a16="http://schemas.microsoft.com/office/drawing/2014/main" id="{C3FC51DE-D10A-4DE8-A7E3-22FA2E4FC194}"/>
+                <a16:creationId xmlns:a16="http://schemas.microsoft.com/office/drawing/2014/main" xmlns="" id="{C3FC51DE-D10A-4DE8-A7E3-22FA2E4FC194}"/>
               </a:ext>
               <a:ext uri="{C183D7F6-B498-43B3-948B-1728B52AA6E4}">
-                <adec:decorative xmlns="" xmlns:adec="http://schemas.microsoft.com/office/drawing/2017/decorative" val="1"/>
+                <adec:decorative xmlns:adec="http://schemas.microsoft.com/office/drawing/2017/decorative" xmlns="" val="1"/>
               </a:ext>
             </a:extLst>
           </p:cNvPr>
@@ -11768,7 +11776,7 @@
           <p:cNvPr id="52" name="Slide Number Placeholder 51">
             <a:extLst>
               <a:ext uri="{FF2B5EF4-FFF2-40B4-BE49-F238E27FC236}">
-                <a16:creationId xmlns="" xmlns:a16="http://schemas.microsoft.com/office/drawing/2014/main" id="{947A81F6-261F-44F4-B660-7BD323AE2991}"/>
+                <a16:creationId xmlns:a16="http://schemas.microsoft.com/office/drawing/2014/main" xmlns="" id="{947A81F6-261F-44F4-B660-7BD323AE2991}"/>
               </a:ext>
             </a:extLst>
           </p:cNvPr>
@@ -12060,7 +12068,7 @@
           <p:cNvPr id="7" name="Picture Placeholder 6" descr="Group of people in a science lab working">
             <a:extLst>
               <a:ext uri="{FF2B5EF4-FFF2-40B4-BE49-F238E27FC236}">
-                <a16:creationId xmlns="" xmlns:a16="http://schemas.microsoft.com/office/drawing/2014/main" id="{634673D1-FDF8-445C-9EC3-CEE2865DFD8A}"/>
+                <a16:creationId xmlns:a16="http://schemas.microsoft.com/office/drawing/2014/main" xmlns="" id="{634673D1-FDF8-445C-9EC3-CEE2865DFD8A}"/>
               </a:ext>
             </a:extLst>
           </p:cNvPr>
@@ -12096,10 +12104,10 @@
           <p:cNvPr id="8" name="Rectangle 7">
             <a:extLst>
               <a:ext uri="{FF2B5EF4-FFF2-40B4-BE49-F238E27FC236}">
-                <a16:creationId xmlns="" xmlns:a16="http://schemas.microsoft.com/office/drawing/2014/main" id="{5D25444F-B85F-42E8-9E0A-A625CA1FDA16}"/>
+                <a16:creationId xmlns:a16="http://schemas.microsoft.com/office/drawing/2014/main" xmlns="" id="{5D25444F-B85F-42E8-9E0A-A625CA1FDA16}"/>
               </a:ext>
               <a:ext uri="{C183D7F6-B498-43B3-948B-1728B52AA6E4}">
-                <adec:decorative xmlns="" xmlns:adec="http://schemas.microsoft.com/office/drawing/2017/decorative" val="1"/>
+                <adec:decorative xmlns:adec="http://schemas.microsoft.com/office/drawing/2017/decorative" xmlns="" val="1"/>
               </a:ext>
             </a:extLst>
           </p:cNvPr>
@@ -12153,7 +12161,7 @@
           <p:cNvPr id="3" name="Title 2">
             <a:extLst>
               <a:ext uri="{FF2B5EF4-FFF2-40B4-BE49-F238E27FC236}">
-                <a16:creationId xmlns="" xmlns:a16="http://schemas.microsoft.com/office/drawing/2014/main" id="{8AD0FB06-2085-443B-B5B7-9CF837FCEA61}"/>
+                <a16:creationId xmlns:a16="http://schemas.microsoft.com/office/drawing/2014/main" xmlns="" id="{8AD0FB06-2085-443B-B5B7-9CF837FCEA61}"/>
               </a:ext>
             </a:extLst>
           </p:cNvPr>
@@ -12182,7 +12190,7 @@
           <p:cNvPr id="4" name="Slide Number Placeholder 3">
             <a:extLst>
               <a:ext uri="{FF2B5EF4-FFF2-40B4-BE49-F238E27FC236}">
-                <a16:creationId xmlns="" xmlns:a16="http://schemas.microsoft.com/office/drawing/2014/main" id="{3B609C69-D3CD-4837-8831-CFA5A72454EF}"/>
+                <a16:creationId xmlns:a16="http://schemas.microsoft.com/office/drawing/2014/main" xmlns="" id="{3B609C69-D3CD-4837-8831-CFA5A72454EF}"/>
               </a:ext>
             </a:extLst>
           </p:cNvPr>
@@ -12212,7 +12220,7 @@
           <p:cNvPr id="5" name="Text Placeholder 4">
             <a:extLst>
               <a:ext uri="{FF2B5EF4-FFF2-40B4-BE49-F238E27FC236}">
-                <a16:creationId xmlns="" xmlns:a16="http://schemas.microsoft.com/office/drawing/2014/main" id="{0E2C3F0E-4EA4-4D41-8E53-5D29742851DB}"/>
+                <a16:creationId xmlns:a16="http://schemas.microsoft.com/office/drawing/2014/main" xmlns="" id="{0E2C3F0E-4EA4-4D41-8E53-5D29742851DB}"/>
               </a:ext>
             </a:extLst>
           </p:cNvPr>
@@ -12241,7 +12249,7 @@
           <p:cNvPr id="9" name="object 7" descr="Beige rectangle">
             <a:extLst>
               <a:ext uri="{FF2B5EF4-FFF2-40B4-BE49-F238E27FC236}">
-                <a16:creationId xmlns="" xmlns:a16="http://schemas.microsoft.com/office/drawing/2014/main" id="{C18D4C80-3351-4CE2-81E2-859CB0ED6E33}"/>
+                <a16:creationId xmlns:a16="http://schemas.microsoft.com/office/drawing/2014/main" xmlns="" id="{C18D4C80-3351-4CE2-81E2-859CB0ED6E33}"/>
               </a:ext>
             </a:extLst>
           </p:cNvPr>
@@ -12865,11 +12873,12 @@
 </file>
 
 <file path=customXml/item1.xml><?xml version="1.0" encoding="utf-8"?>
-<p:properties xmlns:p="http://schemas.microsoft.com/office/2006/metadata/properties" xmlns:xsi="http://www.w3.org/2001/XMLSchema-instance" xmlns:pc="http://schemas.microsoft.com/office/infopath/2007/PartnerControls">
-  <documentManagement>
-    <MediaServiceKeyPoints xmlns="71af3243-3dd4-4a8d-8c0d-dd76da1f02a5" xsi:nil="true"/>
-  </documentManagement>
-</p:properties>
+<?mso-contentType ?>
+<FormTemplates xmlns="http://schemas.microsoft.com/sharepoint/v3/contenttype/forms">
+  <Display>DocumentLibraryForm</Display>
+  <Edit>DocumentLibraryForm</Edit>
+  <New>DocumentLibraryForm</New>
+</FormTemplates>
 </file>
 
 <file path=customXml/item2.xml><?xml version="1.0" encoding="utf-8"?>
@@ -13084,27 +13093,17 @@
 </file>
 
 <file path=customXml/item3.xml><?xml version="1.0" encoding="utf-8"?>
-<?mso-contentType ?>
-<FormTemplates xmlns="http://schemas.microsoft.com/sharepoint/v3/contenttype/forms">
-  <Display>DocumentLibraryForm</Display>
-  <Edit>DocumentLibraryForm</Edit>
-  <New>DocumentLibraryForm</New>
-</FormTemplates>
+<p:properties xmlns:p="http://schemas.microsoft.com/office/2006/metadata/properties" xmlns:xsi="http://www.w3.org/2001/XMLSchema-instance" xmlns:pc="http://schemas.microsoft.com/office/infopath/2007/PartnerControls">
+  <documentManagement>
+    <MediaServiceKeyPoints xmlns="71af3243-3dd4-4a8d-8c0d-dd76da1f02a5" xsi:nil="true"/>
+  </documentManagement>
+</p:properties>
 </file>
 
 <file path=customXml/itemProps1.xml><?xml version="1.0" encoding="utf-8"?>
-<ds:datastoreItem xmlns:ds="http://schemas.openxmlformats.org/officeDocument/2006/customXml" ds:itemID="{BCB5A128-369C-4902-8D4C-DC78A7EDE1C2}">
+<ds:datastoreItem xmlns:ds="http://schemas.openxmlformats.org/officeDocument/2006/customXml" ds:itemID="{A3A7569E-E204-496A-95C5-F6E51FB4AB11}">
   <ds:schemaRefs>
-    <ds:schemaRef ds:uri="71af3243-3dd4-4a8d-8c0d-dd76da1f02a5"/>
-    <ds:schemaRef ds:uri="http://purl.org/dc/elements/1.1/"/>
-    <ds:schemaRef ds:uri="http://schemas.microsoft.com/office/2006/metadata/properties"/>
-    <ds:schemaRef ds:uri="http://schemas.microsoft.com/office/2006/documentManagement/types"/>
-    <ds:schemaRef ds:uri="http://schemas.openxmlformats.org/package/2006/metadata/core-properties"/>
-    <ds:schemaRef ds:uri="16c05727-aa75-4e4a-9b5f-8a80a1165891"/>
-    <ds:schemaRef ds:uri="http://purl.org/dc/terms/"/>
-    <ds:schemaRef ds:uri="http://schemas.microsoft.com/office/infopath/2007/PartnerControls"/>
-    <ds:schemaRef ds:uri="http://purl.org/dc/dcmitype/"/>
-    <ds:schemaRef ds:uri="http://www.w3.org/XML/1998/namespace"/>
+    <ds:schemaRef ds:uri="http://schemas.microsoft.com/sharepoint/v3/contenttype/forms"/>
   </ds:schemaRefs>
 </ds:datastoreItem>
 </file>
@@ -13129,9 +13128,18 @@
 </file>
 
 <file path=customXml/itemProps3.xml><?xml version="1.0" encoding="utf-8"?>
-<ds:datastoreItem xmlns:ds="http://schemas.openxmlformats.org/officeDocument/2006/customXml" ds:itemID="{A3A7569E-E204-496A-95C5-F6E51FB4AB11}">
+<ds:datastoreItem xmlns:ds="http://schemas.openxmlformats.org/officeDocument/2006/customXml" ds:itemID="{BCB5A128-369C-4902-8D4C-DC78A7EDE1C2}">
   <ds:schemaRefs>
-    <ds:schemaRef ds:uri="http://schemas.microsoft.com/sharepoint/v3/contenttype/forms"/>
+    <ds:schemaRef ds:uri="71af3243-3dd4-4a8d-8c0d-dd76da1f02a5"/>
+    <ds:schemaRef ds:uri="http://purl.org/dc/elements/1.1/"/>
+    <ds:schemaRef ds:uri="http://schemas.microsoft.com/office/2006/metadata/properties"/>
+    <ds:schemaRef ds:uri="http://schemas.microsoft.com/office/2006/documentManagement/types"/>
+    <ds:schemaRef ds:uri="http://schemas.openxmlformats.org/package/2006/metadata/core-properties"/>
+    <ds:schemaRef ds:uri="16c05727-aa75-4e4a-9b5f-8a80a1165891"/>
+    <ds:schemaRef ds:uri="http://purl.org/dc/terms/"/>
+    <ds:schemaRef ds:uri="http://schemas.microsoft.com/office/infopath/2007/PartnerControls"/>
+    <ds:schemaRef ds:uri="http://purl.org/dc/dcmitype/"/>
+    <ds:schemaRef ds:uri="http://www.w3.org/XML/1998/namespace"/>
   </ds:schemaRefs>
 </ds:datastoreItem>
 </file>
</xml_diff>